<commit_message>
Added Latest changes in PPT file
</commit_message>
<xml_diff>
--- a/DevOpsDoc.pptx
+++ b/DevOpsDoc.pptx
@@ -167,7 +167,7 @@
           <p:cNvPr id="2" name="Header Placeholder 1">
             <a:extLst>
               <a:ext uri="{FF2B5EF4-FFF2-40B4-BE49-F238E27FC236}">
-                <a16:creationId xmlns:a16="http://schemas.microsoft.com/office/drawing/2014/main" xmlns="" id="{D6E57326-DB19-46CE-A32F-DBE2D832CAE7}"/>
+                <a16:creationId xmlns="" xmlns:a16="http://schemas.microsoft.com/office/drawing/2014/main" id="{D6E57326-DB19-46CE-A32F-DBE2D832CAE7}"/>
               </a:ext>
             </a:extLst>
           </p:cNvPr>
@@ -230,7 +230,7 @@
           <p:cNvPr id="3" name="Date Placeholder 2">
             <a:extLst>
               <a:ext uri="{FF2B5EF4-FFF2-40B4-BE49-F238E27FC236}">
-                <a16:creationId xmlns:a16="http://schemas.microsoft.com/office/drawing/2014/main" xmlns="" id="{7941F8D2-1872-4FD3-A085-C16E4659FF3C}"/>
+                <a16:creationId xmlns="" xmlns:a16="http://schemas.microsoft.com/office/drawing/2014/main" id="{7941F8D2-1872-4FD3-A085-C16E4659FF3C}"/>
               </a:ext>
             </a:extLst>
           </p:cNvPr>
@@ -293,7 +293,7 @@
           <p:cNvPr id="4" name="Footer Placeholder 3">
             <a:extLst>
               <a:ext uri="{FF2B5EF4-FFF2-40B4-BE49-F238E27FC236}">
-                <a16:creationId xmlns:a16="http://schemas.microsoft.com/office/drawing/2014/main" xmlns="" id="{8301A39F-B341-4BA4-9BD5-9BC42F49A7E6}"/>
+                <a16:creationId xmlns="" xmlns:a16="http://schemas.microsoft.com/office/drawing/2014/main" id="{8301A39F-B341-4BA4-9BD5-9BC42F49A7E6}"/>
               </a:ext>
             </a:extLst>
           </p:cNvPr>
@@ -356,7 +356,7 @@
           <p:cNvPr id="5" name="Slide Number Placeholder 4">
             <a:extLst>
               <a:ext uri="{FF2B5EF4-FFF2-40B4-BE49-F238E27FC236}">
-                <a16:creationId xmlns:a16="http://schemas.microsoft.com/office/drawing/2014/main" xmlns="" id="{A40ECEAC-6346-435E-B575-E92B9314519F}"/>
+                <a16:creationId xmlns="" xmlns:a16="http://schemas.microsoft.com/office/drawing/2014/main" id="{A40ECEAC-6346-435E-B575-E92B9314519F}"/>
               </a:ext>
             </a:extLst>
           </p:cNvPr>
@@ -455,7 +455,7 @@
           <p:cNvPr id="2" name="Slide Image Placeholder 1">
             <a:extLst>
               <a:ext uri="{FF2B5EF4-FFF2-40B4-BE49-F238E27FC236}">
-                <a16:creationId xmlns:a16="http://schemas.microsoft.com/office/drawing/2014/main" xmlns="" id="{56B3EE74-0C48-46B9-93FB-F8EE8C0E2D78}"/>
+                <a16:creationId xmlns="" xmlns:a16="http://schemas.microsoft.com/office/drawing/2014/main" id="{56B3EE74-0C48-46B9-93FB-F8EE8C0E2D78}"/>
               </a:ext>
             </a:extLst>
           </p:cNvPr>
@@ -488,7 +488,7 @@
           <p:cNvPr id="3" name="Notes Placeholder 2">
             <a:extLst>
               <a:ext uri="{FF2B5EF4-FFF2-40B4-BE49-F238E27FC236}">
-                <a16:creationId xmlns:a16="http://schemas.microsoft.com/office/drawing/2014/main" xmlns="" id="{840AE385-00D5-4C25-9566-AC4A2B1326E1}"/>
+                <a16:creationId xmlns="" xmlns:a16="http://schemas.microsoft.com/office/drawing/2014/main" id="{840AE385-00D5-4C25-9566-AC4A2B1326E1}"/>
               </a:ext>
             </a:extLst>
           </p:cNvPr>
@@ -525,7 +525,7 @@
           <p:cNvPr id="4" name="Header Placeholder 3">
             <a:extLst>
               <a:ext uri="{FF2B5EF4-FFF2-40B4-BE49-F238E27FC236}">
-                <a16:creationId xmlns:a16="http://schemas.microsoft.com/office/drawing/2014/main" xmlns="" id="{F9BD74F9-2EE8-488F-9993-FD40BA9A2E9B}"/>
+                <a16:creationId xmlns="" xmlns:a16="http://schemas.microsoft.com/office/drawing/2014/main" id="{F9BD74F9-2EE8-488F-9993-FD40BA9A2E9B}"/>
               </a:ext>
             </a:extLst>
           </p:cNvPr>
@@ -575,7 +575,7 @@
           <p:cNvPr id="5" name="Date Placeholder 4">
             <a:extLst>
               <a:ext uri="{FF2B5EF4-FFF2-40B4-BE49-F238E27FC236}">
-                <a16:creationId xmlns:a16="http://schemas.microsoft.com/office/drawing/2014/main" xmlns="" id="{66EFB3E6-A928-4B0D-91B8-FB847B4EFEC5}"/>
+                <a16:creationId xmlns="" xmlns:a16="http://schemas.microsoft.com/office/drawing/2014/main" id="{66EFB3E6-A928-4B0D-91B8-FB847B4EFEC5}"/>
               </a:ext>
             </a:extLst>
           </p:cNvPr>
@@ -625,7 +625,7 @@
           <p:cNvPr id="6" name="Footer Placeholder 5">
             <a:extLst>
               <a:ext uri="{FF2B5EF4-FFF2-40B4-BE49-F238E27FC236}">
-                <a16:creationId xmlns:a16="http://schemas.microsoft.com/office/drawing/2014/main" xmlns="" id="{2D610C91-2178-4F85-9333-B569AFCFA8F6}"/>
+                <a16:creationId xmlns="" xmlns:a16="http://schemas.microsoft.com/office/drawing/2014/main" id="{2D610C91-2178-4F85-9333-B569AFCFA8F6}"/>
               </a:ext>
             </a:extLst>
           </p:cNvPr>
@@ -675,7 +675,7 @@
           <p:cNvPr id="7" name="Slide Number Placeholder 6">
             <a:extLst>
               <a:ext uri="{FF2B5EF4-FFF2-40B4-BE49-F238E27FC236}">
-                <a16:creationId xmlns:a16="http://schemas.microsoft.com/office/drawing/2014/main" xmlns="" id="{C56F61DA-B0A4-4EF4-A0FA-C0FB49888F65}"/>
+                <a16:creationId xmlns="" xmlns:a16="http://schemas.microsoft.com/office/drawing/2014/main" id="{C56F61DA-B0A4-4EF4-A0FA-C0FB49888F65}"/>
               </a:ext>
             </a:extLst>
           </p:cNvPr>
@@ -847,7 +847,7 @@
           <p:cNvPr id="7" name="Slide Number Placeholder 6">
             <a:extLst>
               <a:ext uri="{FF2B5EF4-FFF2-40B4-BE49-F238E27FC236}">
-                <a16:creationId xmlns:a16="http://schemas.microsoft.com/office/drawing/2014/main" xmlns="" id="{40F5852B-0720-4086-849B-721EF582D662}"/>
+                <a16:creationId xmlns="" xmlns:a16="http://schemas.microsoft.com/office/drawing/2014/main" id="{40F5852B-0720-4086-849B-721EF582D662}"/>
               </a:ext>
             </a:extLst>
           </p:cNvPr>
@@ -880,7 +880,7 @@
           <p:cNvPr id="2" name="Slide Image Placeholder 1">
             <a:extLst>
               <a:ext uri="{FF2B5EF4-FFF2-40B4-BE49-F238E27FC236}">
-                <a16:creationId xmlns:a16="http://schemas.microsoft.com/office/drawing/2014/main" xmlns="" id="{B6DFC263-1176-4B5C-9F38-D7F1E33000D5}"/>
+                <a16:creationId xmlns="" xmlns:a16="http://schemas.microsoft.com/office/drawing/2014/main" id="{B6DFC263-1176-4B5C-9F38-D7F1E33000D5}"/>
               </a:ext>
             </a:extLst>
           </p:cNvPr>
@@ -912,7 +912,7 @@
           <p:cNvPr id="3" name="Notes Placeholder 2">
             <a:extLst>
               <a:ext uri="{FF2B5EF4-FFF2-40B4-BE49-F238E27FC236}">
-                <a16:creationId xmlns:a16="http://schemas.microsoft.com/office/drawing/2014/main" xmlns="" id="{1E19155A-80DE-4CAB-96DF-8C31B16BD7E4}"/>
+                <a16:creationId xmlns="" xmlns:a16="http://schemas.microsoft.com/office/drawing/2014/main" id="{1E19155A-80DE-4CAB-96DF-8C31B16BD7E4}"/>
               </a:ext>
             </a:extLst>
           </p:cNvPr>
@@ -969,7 +969,7 @@
           <p:cNvPr id="7" name="Slide Number Placeholder 6">
             <a:extLst>
               <a:ext uri="{FF2B5EF4-FFF2-40B4-BE49-F238E27FC236}">
-                <a16:creationId xmlns:a16="http://schemas.microsoft.com/office/drawing/2014/main" xmlns="" id="{02A79D88-D201-4A16-B7FE-80D3644FDA06}"/>
+                <a16:creationId xmlns="" xmlns:a16="http://schemas.microsoft.com/office/drawing/2014/main" id="{02A79D88-D201-4A16-B7FE-80D3644FDA06}"/>
               </a:ext>
             </a:extLst>
           </p:cNvPr>
@@ -1002,7 +1002,7 @@
           <p:cNvPr id="2" name="Slide Image Placeholder 1">
             <a:extLst>
               <a:ext uri="{FF2B5EF4-FFF2-40B4-BE49-F238E27FC236}">
-                <a16:creationId xmlns:a16="http://schemas.microsoft.com/office/drawing/2014/main" xmlns="" id="{519DB808-0089-4EF7-8217-23C290D413D7}"/>
+                <a16:creationId xmlns="" xmlns:a16="http://schemas.microsoft.com/office/drawing/2014/main" id="{519DB808-0089-4EF7-8217-23C290D413D7}"/>
               </a:ext>
             </a:extLst>
           </p:cNvPr>
@@ -1034,7 +1034,7 @@
           <p:cNvPr id="3" name="Notes Placeholder 2">
             <a:extLst>
               <a:ext uri="{FF2B5EF4-FFF2-40B4-BE49-F238E27FC236}">
-                <a16:creationId xmlns:a16="http://schemas.microsoft.com/office/drawing/2014/main" xmlns="" id="{C05682BE-8C80-4B1E-A5E1-96116972309C}"/>
+                <a16:creationId xmlns="" xmlns:a16="http://schemas.microsoft.com/office/drawing/2014/main" id="{C05682BE-8C80-4B1E-A5E1-96116972309C}"/>
               </a:ext>
             </a:extLst>
           </p:cNvPr>
@@ -1089,7 +1089,7 @@
           <p:cNvPr id="7" name="Slide Number Placeholder 6">
             <a:extLst>
               <a:ext uri="{FF2B5EF4-FFF2-40B4-BE49-F238E27FC236}">
-                <a16:creationId xmlns:a16="http://schemas.microsoft.com/office/drawing/2014/main" xmlns="" id="{78F17026-31F0-47F1-8450-2CF9A2ADAB1A}"/>
+                <a16:creationId xmlns="" xmlns:a16="http://schemas.microsoft.com/office/drawing/2014/main" id="{78F17026-31F0-47F1-8450-2CF9A2ADAB1A}"/>
               </a:ext>
             </a:extLst>
           </p:cNvPr>
@@ -1122,7 +1122,7 @@
           <p:cNvPr id="2" name="Slide Image Placeholder 1">
             <a:extLst>
               <a:ext uri="{FF2B5EF4-FFF2-40B4-BE49-F238E27FC236}">
-                <a16:creationId xmlns:a16="http://schemas.microsoft.com/office/drawing/2014/main" xmlns="" id="{38EDD86D-63F0-44FB-9362-F47DDCAC77E9}"/>
+                <a16:creationId xmlns="" xmlns:a16="http://schemas.microsoft.com/office/drawing/2014/main" id="{38EDD86D-63F0-44FB-9362-F47DDCAC77E9}"/>
               </a:ext>
             </a:extLst>
           </p:cNvPr>
@@ -1154,7 +1154,7 @@
           <p:cNvPr id="3" name="Notes Placeholder 2">
             <a:extLst>
               <a:ext uri="{FF2B5EF4-FFF2-40B4-BE49-F238E27FC236}">
-                <a16:creationId xmlns:a16="http://schemas.microsoft.com/office/drawing/2014/main" xmlns="" id="{3FDAB228-C575-45E3-BEEC-CA235CADB7B8}"/>
+                <a16:creationId xmlns="" xmlns:a16="http://schemas.microsoft.com/office/drawing/2014/main" id="{3FDAB228-C575-45E3-BEEC-CA235CADB7B8}"/>
               </a:ext>
             </a:extLst>
           </p:cNvPr>
@@ -1209,7 +1209,7 @@
           <p:cNvPr id="7" name="Slide Number Placeholder 6">
             <a:extLst>
               <a:ext uri="{FF2B5EF4-FFF2-40B4-BE49-F238E27FC236}">
-                <a16:creationId xmlns:a16="http://schemas.microsoft.com/office/drawing/2014/main" xmlns="" id="{10C50BB5-A608-4897-BAFE-94C2273D7B88}"/>
+                <a16:creationId xmlns="" xmlns:a16="http://schemas.microsoft.com/office/drawing/2014/main" id="{10C50BB5-A608-4897-BAFE-94C2273D7B88}"/>
               </a:ext>
             </a:extLst>
           </p:cNvPr>
@@ -1242,7 +1242,7 @@
           <p:cNvPr id="2" name="Slide Image Placeholder 1">
             <a:extLst>
               <a:ext uri="{FF2B5EF4-FFF2-40B4-BE49-F238E27FC236}">
-                <a16:creationId xmlns:a16="http://schemas.microsoft.com/office/drawing/2014/main" xmlns="" id="{A91DAB28-D654-4386-8842-4F0DFDC206CF}"/>
+                <a16:creationId xmlns="" xmlns:a16="http://schemas.microsoft.com/office/drawing/2014/main" id="{A91DAB28-D654-4386-8842-4F0DFDC206CF}"/>
               </a:ext>
             </a:extLst>
           </p:cNvPr>
@@ -1274,7 +1274,7 @@
           <p:cNvPr id="3" name="Notes Placeholder 2">
             <a:extLst>
               <a:ext uri="{FF2B5EF4-FFF2-40B4-BE49-F238E27FC236}">
-                <a16:creationId xmlns:a16="http://schemas.microsoft.com/office/drawing/2014/main" xmlns="" id="{57C76618-2830-44D8-98B2-9EDCD781B5D2}"/>
+                <a16:creationId xmlns="" xmlns:a16="http://schemas.microsoft.com/office/drawing/2014/main" id="{57C76618-2830-44D8-98B2-9EDCD781B5D2}"/>
               </a:ext>
             </a:extLst>
           </p:cNvPr>
@@ -1329,7 +1329,7 @@
           <p:cNvPr id="7" name="Slide Number Placeholder 6">
             <a:extLst>
               <a:ext uri="{FF2B5EF4-FFF2-40B4-BE49-F238E27FC236}">
-                <a16:creationId xmlns:a16="http://schemas.microsoft.com/office/drawing/2014/main" xmlns="" id="{FB1A4F53-8F74-45A6-A35D-53A417DEE47C}"/>
+                <a16:creationId xmlns="" xmlns:a16="http://schemas.microsoft.com/office/drawing/2014/main" id="{FB1A4F53-8F74-45A6-A35D-53A417DEE47C}"/>
               </a:ext>
             </a:extLst>
           </p:cNvPr>
@@ -1362,7 +1362,7 @@
           <p:cNvPr id="2" name="Slide Image Placeholder 1">
             <a:extLst>
               <a:ext uri="{FF2B5EF4-FFF2-40B4-BE49-F238E27FC236}">
-                <a16:creationId xmlns:a16="http://schemas.microsoft.com/office/drawing/2014/main" xmlns="" id="{3B0BD0BD-DB55-40A0-BA2E-8C7ABBC4C05D}"/>
+                <a16:creationId xmlns="" xmlns:a16="http://schemas.microsoft.com/office/drawing/2014/main" id="{3B0BD0BD-DB55-40A0-BA2E-8C7ABBC4C05D}"/>
               </a:ext>
             </a:extLst>
           </p:cNvPr>
@@ -1394,7 +1394,7 @@
           <p:cNvPr id="3" name="Notes Placeholder 2">
             <a:extLst>
               <a:ext uri="{FF2B5EF4-FFF2-40B4-BE49-F238E27FC236}">
-                <a16:creationId xmlns:a16="http://schemas.microsoft.com/office/drawing/2014/main" xmlns="" id="{4D2A1057-477A-475E-8E8A-A9DFB7E51555}"/>
+                <a16:creationId xmlns="" xmlns:a16="http://schemas.microsoft.com/office/drawing/2014/main" id="{4D2A1057-477A-475E-8E8A-A9DFB7E51555}"/>
               </a:ext>
             </a:extLst>
           </p:cNvPr>
@@ -1449,7 +1449,7 @@
           <p:cNvPr id="7" name="Slide Number Placeholder 6">
             <a:extLst>
               <a:ext uri="{FF2B5EF4-FFF2-40B4-BE49-F238E27FC236}">
-                <a16:creationId xmlns:a16="http://schemas.microsoft.com/office/drawing/2014/main" xmlns="" id="{D36E1796-CF27-4BA6-A633-8F6EC2548F4D}"/>
+                <a16:creationId xmlns="" xmlns:a16="http://schemas.microsoft.com/office/drawing/2014/main" id="{D36E1796-CF27-4BA6-A633-8F6EC2548F4D}"/>
               </a:ext>
             </a:extLst>
           </p:cNvPr>
@@ -1482,7 +1482,7 @@
           <p:cNvPr id="2" name="Slide Image Placeholder 1">
             <a:extLst>
               <a:ext uri="{FF2B5EF4-FFF2-40B4-BE49-F238E27FC236}">
-                <a16:creationId xmlns:a16="http://schemas.microsoft.com/office/drawing/2014/main" xmlns="" id="{0A617C37-65A7-4208-9F12-2E134433CB69}"/>
+                <a16:creationId xmlns="" xmlns:a16="http://schemas.microsoft.com/office/drawing/2014/main" id="{0A617C37-65A7-4208-9F12-2E134433CB69}"/>
               </a:ext>
             </a:extLst>
           </p:cNvPr>
@@ -1514,7 +1514,7 @@
           <p:cNvPr id="3" name="Notes Placeholder 2">
             <a:extLst>
               <a:ext uri="{FF2B5EF4-FFF2-40B4-BE49-F238E27FC236}">
-                <a16:creationId xmlns:a16="http://schemas.microsoft.com/office/drawing/2014/main" xmlns="" id="{A5421BA2-C514-4146-9AC1-2FF398A8C648}"/>
+                <a16:creationId xmlns="" xmlns:a16="http://schemas.microsoft.com/office/drawing/2014/main" id="{A5421BA2-C514-4146-9AC1-2FF398A8C648}"/>
               </a:ext>
             </a:extLst>
           </p:cNvPr>
@@ -1569,7 +1569,7 @@
           <p:cNvPr id="7" name="Slide Number Placeholder 6">
             <a:extLst>
               <a:ext uri="{FF2B5EF4-FFF2-40B4-BE49-F238E27FC236}">
-                <a16:creationId xmlns:a16="http://schemas.microsoft.com/office/drawing/2014/main" xmlns="" id="{6F9B2246-67AD-4B43-B466-097047178A79}"/>
+                <a16:creationId xmlns="" xmlns:a16="http://schemas.microsoft.com/office/drawing/2014/main" id="{6F9B2246-67AD-4B43-B466-097047178A79}"/>
               </a:ext>
             </a:extLst>
           </p:cNvPr>
@@ -1602,7 +1602,7 @@
           <p:cNvPr id="2" name="Slide Image Placeholder 1">
             <a:extLst>
               <a:ext uri="{FF2B5EF4-FFF2-40B4-BE49-F238E27FC236}">
-                <a16:creationId xmlns:a16="http://schemas.microsoft.com/office/drawing/2014/main" xmlns="" id="{EF10BE1B-A4E7-4273-97C7-51383BB1F2F8}"/>
+                <a16:creationId xmlns="" xmlns:a16="http://schemas.microsoft.com/office/drawing/2014/main" id="{EF10BE1B-A4E7-4273-97C7-51383BB1F2F8}"/>
               </a:ext>
             </a:extLst>
           </p:cNvPr>
@@ -1634,7 +1634,7 @@
           <p:cNvPr id="3" name="Notes Placeholder 2">
             <a:extLst>
               <a:ext uri="{FF2B5EF4-FFF2-40B4-BE49-F238E27FC236}">
-                <a16:creationId xmlns:a16="http://schemas.microsoft.com/office/drawing/2014/main" xmlns="" id="{ED29ABD6-AC27-44E7-A9B0-8BAF7728F2DC}"/>
+                <a16:creationId xmlns="" xmlns:a16="http://schemas.microsoft.com/office/drawing/2014/main" id="{ED29ABD6-AC27-44E7-A9B0-8BAF7728F2DC}"/>
               </a:ext>
             </a:extLst>
           </p:cNvPr>
@@ -1689,7 +1689,7 @@
           <p:cNvPr id="7" name="Slide Number Placeholder 6">
             <a:extLst>
               <a:ext uri="{FF2B5EF4-FFF2-40B4-BE49-F238E27FC236}">
-                <a16:creationId xmlns:a16="http://schemas.microsoft.com/office/drawing/2014/main" xmlns="" id="{192CE25F-8BDE-4D2B-9536-638EE2504A59}"/>
+                <a16:creationId xmlns="" xmlns:a16="http://schemas.microsoft.com/office/drawing/2014/main" id="{192CE25F-8BDE-4D2B-9536-638EE2504A59}"/>
               </a:ext>
             </a:extLst>
           </p:cNvPr>
@@ -1722,7 +1722,7 @@
           <p:cNvPr id="2" name="Slide Image Placeholder 1">
             <a:extLst>
               <a:ext uri="{FF2B5EF4-FFF2-40B4-BE49-F238E27FC236}">
-                <a16:creationId xmlns:a16="http://schemas.microsoft.com/office/drawing/2014/main" xmlns="" id="{6A845858-CBC4-46D5-8A4B-6A43616BD7F8}"/>
+                <a16:creationId xmlns="" xmlns:a16="http://schemas.microsoft.com/office/drawing/2014/main" id="{6A845858-CBC4-46D5-8A4B-6A43616BD7F8}"/>
               </a:ext>
             </a:extLst>
           </p:cNvPr>
@@ -1754,7 +1754,7 @@
           <p:cNvPr id="3" name="Notes Placeholder 2">
             <a:extLst>
               <a:ext uri="{FF2B5EF4-FFF2-40B4-BE49-F238E27FC236}">
-                <a16:creationId xmlns:a16="http://schemas.microsoft.com/office/drawing/2014/main" xmlns="" id="{EFBF61DF-CBC0-4F31-B7E9-EBF625572FB5}"/>
+                <a16:creationId xmlns="" xmlns:a16="http://schemas.microsoft.com/office/drawing/2014/main" id="{EFBF61DF-CBC0-4F31-B7E9-EBF625572FB5}"/>
               </a:ext>
             </a:extLst>
           </p:cNvPr>
@@ -1811,7 +1811,7 @@
           <p:cNvPr id="7" name="Slide Number Placeholder 6">
             <a:extLst>
               <a:ext uri="{FF2B5EF4-FFF2-40B4-BE49-F238E27FC236}">
-                <a16:creationId xmlns:a16="http://schemas.microsoft.com/office/drawing/2014/main" xmlns="" id="{9E68A892-EA2E-40CD-BC74-281EF1AB011B}"/>
+                <a16:creationId xmlns="" xmlns:a16="http://schemas.microsoft.com/office/drawing/2014/main" id="{9E68A892-EA2E-40CD-BC74-281EF1AB011B}"/>
               </a:ext>
             </a:extLst>
           </p:cNvPr>
@@ -1844,7 +1844,7 @@
           <p:cNvPr id="2" name="Slide Image Placeholder 1">
             <a:extLst>
               <a:ext uri="{FF2B5EF4-FFF2-40B4-BE49-F238E27FC236}">
-                <a16:creationId xmlns:a16="http://schemas.microsoft.com/office/drawing/2014/main" xmlns="" id="{ADC2CDF4-47BE-4042-AAD2-A6E1A85AEE6A}"/>
+                <a16:creationId xmlns="" xmlns:a16="http://schemas.microsoft.com/office/drawing/2014/main" id="{ADC2CDF4-47BE-4042-AAD2-A6E1A85AEE6A}"/>
               </a:ext>
             </a:extLst>
           </p:cNvPr>
@@ -1876,7 +1876,7 @@
           <p:cNvPr id="3" name="Notes Placeholder 2">
             <a:extLst>
               <a:ext uri="{FF2B5EF4-FFF2-40B4-BE49-F238E27FC236}">
-                <a16:creationId xmlns:a16="http://schemas.microsoft.com/office/drawing/2014/main" xmlns="" id="{BF395D89-B3C3-4CDD-8B4C-2541848E5109}"/>
+                <a16:creationId xmlns="" xmlns:a16="http://schemas.microsoft.com/office/drawing/2014/main" id="{BF395D89-B3C3-4CDD-8B4C-2541848E5109}"/>
               </a:ext>
             </a:extLst>
           </p:cNvPr>
@@ -1931,7 +1931,7 @@
           <p:cNvPr id="7" name="Slide Number Placeholder 6">
             <a:extLst>
               <a:ext uri="{FF2B5EF4-FFF2-40B4-BE49-F238E27FC236}">
-                <a16:creationId xmlns:a16="http://schemas.microsoft.com/office/drawing/2014/main" xmlns="" id="{DE15E4C3-5698-4C0B-87BA-91C7740D6D6C}"/>
+                <a16:creationId xmlns="" xmlns:a16="http://schemas.microsoft.com/office/drawing/2014/main" id="{DE15E4C3-5698-4C0B-87BA-91C7740D6D6C}"/>
               </a:ext>
             </a:extLst>
           </p:cNvPr>
@@ -1964,7 +1964,7 @@
           <p:cNvPr id="2" name="Slide Image Placeholder 1">
             <a:extLst>
               <a:ext uri="{FF2B5EF4-FFF2-40B4-BE49-F238E27FC236}">
-                <a16:creationId xmlns:a16="http://schemas.microsoft.com/office/drawing/2014/main" xmlns="" id="{98E02FF0-6F2C-4A70-B23D-36C53C788602}"/>
+                <a16:creationId xmlns="" xmlns:a16="http://schemas.microsoft.com/office/drawing/2014/main" id="{98E02FF0-6F2C-4A70-B23D-36C53C788602}"/>
               </a:ext>
             </a:extLst>
           </p:cNvPr>
@@ -1996,7 +1996,7 @@
           <p:cNvPr id="3" name="Notes Placeholder 2">
             <a:extLst>
               <a:ext uri="{FF2B5EF4-FFF2-40B4-BE49-F238E27FC236}">
-                <a16:creationId xmlns:a16="http://schemas.microsoft.com/office/drawing/2014/main" xmlns="" id="{F490394B-79F8-4165-8E01-7AD2C92B5304}"/>
+                <a16:creationId xmlns="" xmlns:a16="http://schemas.microsoft.com/office/drawing/2014/main" id="{F490394B-79F8-4165-8E01-7AD2C92B5304}"/>
               </a:ext>
             </a:extLst>
           </p:cNvPr>
@@ -2051,7 +2051,7 @@
           <p:cNvPr id="7" name="Slide Number Placeholder 6">
             <a:extLst>
               <a:ext uri="{FF2B5EF4-FFF2-40B4-BE49-F238E27FC236}">
-                <a16:creationId xmlns:a16="http://schemas.microsoft.com/office/drawing/2014/main" xmlns="" id="{DAAF2217-88FE-4FC0-932E-0CE3F9BA57F1}"/>
+                <a16:creationId xmlns="" xmlns:a16="http://schemas.microsoft.com/office/drawing/2014/main" id="{DAAF2217-88FE-4FC0-932E-0CE3F9BA57F1}"/>
               </a:ext>
             </a:extLst>
           </p:cNvPr>
@@ -2084,7 +2084,7 @@
           <p:cNvPr id="2" name="Slide Image Placeholder 1">
             <a:extLst>
               <a:ext uri="{FF2B5EF4-FFF2-40B4-BE49-F238E27FC236}">
-                <a16:creationId xmlns:a16="http://schemas.microsoft.com/office/drawing/2014/main" xmlns="" id="{083753C1-522D-43A8-9636-C2584CE318D7}"/>
+                <a16:creationId xmlns="" xmlns:a16="http://schemas.microsoft.com/office/drawing/2014/main" id="{083753C1-522D-43A8-9636-C2584CE318D7}"/>
               </a:ext>
             </a:extLst>
           </p:cNvPr>
@@ -2116,7 +2116,7 @@
           <p:cNvPr id="3" name="Notes Placeholder 2">
             <a:extLst>
               <a:ext uri="{FF2B5EF4-FFF2-40B4-BE49-F238E27FC236}">
-                <a16:creationId xmlns:a16="http://schemas.microsoft.com/office/drawing/2014/main" xmlns="" id="{141C88B2-4E3C-44CB-9FAE-4571D9A9F80C}"/>
+                <a16:creationId xmlns="" xmlns:a16="http://schemas.microsoft.com/office/drawing/2014/main" id="{141C88B2-4E3C-44CB-9FAE-4571D9A9F80C}"/>
               </a:ext>
             </a:extLst>
           </p:cNvPr>
@@ -2171,7 +2171,7 @@
           <p:cNvPr id="7" name="Slide Number Placeholder 6">
             <a:extLst>
               <a:ext uri="{FF2B5EF4-FFF2-40B4-BE49-F238E27FC236}">
-                <a16:creationId xmlns:a16="http://schemas.microsoft.com/office/drawing/2014/main" xmlns="" id="{31565ACF-9B15-4F71-9B04-D8F67D1FA37D}"/>
+                <a16:creationId xmlns="" xmlns:a16="http://schemas.microsoft.com/office/drawing/2014/main" id="{31565ACF-9B15-4F71-9B04-D8F67D1FA37D}"/>
               </a:ext>
             </a:extLst>
           </p:cNvPr>
@@ -2204,7 +2204,7 @@
           <p:cNvPr id="2" name="Slide Image Placeholder 1">
             <a:extLst>
               <a:ext uri="{FF2B5EF4-FFF2-40B4-BE49-F238E27FC236}">
-                <a16:creationId xmlns:a16="http://schemas.microsoft.com/office/drawing/2014/main" xmlns="" id="{8C17EC3D-BE8E-491E-BBD3-E421D70F3A6E}"/>
+                <a16:creationId xmlns="" xmlns:a16="http://schemas.microsoft.com/office/drawing/2014/main" id="{8C17EC3D-BE8E-491E-BBD3-E421D70F3A6E}"/>
               </a:ext>
             </a:extLst>
           </p:cNvPr>
@@ -2236,7 +2236,7 @@
           <p:cNvPr id="3" name="Notes Placeholder 2">
             <a:extLst>
               <a:ext uri="{FF2B5EF4-FFF2-40B4-BE49-F238E27FC236}">
-                <a16:creationId xmlns:a16="http://schemas.microsoft.com/office/drawing/2014/main" xmlns="" id="{617FB194-E9DC-421B-888D-BA7D7F6D39A9}"/>
+                <a16:creationId xmlns="" xmlns:a16="http://schemas.microsoft.com/office/drawing/2014/main" id="{617FB194-E9DC-421B-888D-BA7D7F6D39A9}"/>
               </a:ext>
             </a:extLst>
           </p:cNvPr>
@@ -2291,7 +2291,7 @@
           <p:cNvPr id="7" name="Slide Number Placeholder 6">
             <a:extLst>
               <a:ext uri="{FF2B5EF4-FFF2-40B4-BE49-F238E27FC236}">
-                <a16:creationId xmlns:a16="http://schemas.microsoft.com/office/drawing/2014/main" xmlns="" id="{8F649087-A288-4176-BE67-248FA60A4DD0}"/>
+                <a16:creationId xmlns="" xmlns:a16="http://schemas.microsoft.com/office/drawing/2014/main" id="{8F649087-A288-4176-BE67-248FA60A4DD0}"/>
               </a:ext>
             </a:extLst>
           </p:cNvPr>
@@ -2324,7 +2324,7 @@
           <p:cNvPr id="2" name="Slide Image Placeholder 1">
             <a:extLst>
               <a:ext uri="{FF2B5EF4-FFF2-40B4-BE49-F238E27FC236}">
-                <a16:creationId xmlns:a16="http://schemas.microsoft.com/office/drawing/2014/main" xmlns="" id="{09B24CC2-6B04-49E6-B36C-F6471F971ECE}"/>
+                <a16:creationId xmlns="" xmlns:a16="http://schemas.microsoft.com/office/drawing/2014/main" id="{09B24CC2-6B04-49E6-B36C-F6471F971ECE}"/>
               </a:ext>
             </a:extLst>
           </p:cNvPr>
@@ -2356,7 +2356,7 @@
           <p:cNvPr id="3" name="Notes Placeholder 2">
             <a:extLst>
               <a:ext uri="{FF2B5EF4-FFF2-40B4-BE49-F238E27FC236}">
-                <a16:creationId xmlns:a16="http://schemas.microsoft.com/office/drawing/2014/main" xmlns="" id="{F0D7765F-C1E1-429E-AAF6-1800A52868DA}"/>
+                <a16:creationId xmlns="" xmlns:a16="http://schemas.microsoft.com/office/drawing/2014/main" id="{F0D7765F-C1E1-429E-AAF6-1800A52868DA}"/>
               </a:ext>
             </a:extLst>
           </p:cNvPr>
@@ -2411,7 +2411,7 @@
           <p:cNvPr id="7" name="Slide Number Placeholder 6">
             <a:extLst>
               <a:ext uri="{FF2B5EF4-FFF2-40B4-BE49-F238E27FC236}">
-                <a16:creationId xmlns:a16="http://schemas.microsoft.com/office/drawing/2014/main" xmlns="" id="{C27D4597-F4F1-4562-BDAF-CB0745E326AD}"/>
+                <a16:creationId xmlns="" xmlns:a16="http://schemas.microsoft.com/office/drawing/2014/main" id="{C27D4597-F4F1-4562-BDAF-CB0745E326AD}"/>
               </a:ext>
             </a:extLst>
           </p:cNvPr>
@@ -2444,7 +2444,7 @@
           <p:cNvPr id="2" name="Slide Image Placeholder 1">
             <a:extLst>
               <a:ext uri="{FF2B5EF4-FFF2-40B4-BE49-F238E27FC236}">
-                <a16:creationId xmlns:a16="http://schemas.microsoft.com/office/drawing/2014/main" xmlns="" id="{656E3635-F752-4900-A883-20AF998493D0}"/>
+                <a16:creationId xmlns="" xmlns:a16="http://schemas.microsoft.com/office/drawing/2014/main" id="{656E3635-F752-4900-A883-20AF998493D0}"/>
               </a:ext>
             </a:extLst>
           </p:cNvPr>
@@ -2476,7 +2476,7 @@
           <p:cNvPr id="3" name="Notes Placeholder 2">
             <a:extLst>
               <a:ext uri="{FF2B5EF4-FFF2-40B4-BE49-F238E27FC236}">
-                <a16:creationId xmlns:a16="http://schemas.microsoft.com/office/drawing/2014/main" xmlns="" id="{AEB79890-228C-4BC0-B92F-6919256F71C1}"/>
+                <a16:creationId xmlns="" xmlns:a16="http://schemas.microsoft.com/office/drawing/2014/main" id="{AEB79890-228C-4BC0-B92F-6919256F71C1}"/>
               </a:ext>
             </a:extLst>
           </p:cNvPr>
@@ -2531,7 +2531,7 @@
           <p:cNvPr id="7" name="Slide Number Placeholder 6">
             <a:extLst>
               <a:ext uri="{FF2B5EF4-FFF2-40B4-BE49-F238E27FC236}">
-                <a16:creationId xmlns:a16="http://schemas.microsoft.com/office/drawing/2014/main" xmlns="" id="{E224EB75-AE75-4303-86AF-AEF820DE604E}"/>
+                <a16:creationId xmlns="" xmlns:a16="http://schemas.microsoft.com/office/drawing/2014/main" id="{E224EB75-AE75-4303-86AF-AEF820DE604E}"/>
               </a:ext>
             </a:extLst>
           </p:cNvPr>
@@ -2564,7 +2564,7 @@
           <p:cNvPr id="2" name="Slide Image Placeholder 1">
             <a:extLst>
               <a:ext uri="{FF2B5EF4-FFF2-40B4-BE49-F238E27FC236}">
-                <a16:creationId xmlns:a16="http://schemas.microsoft.com/office/drawing/2014/main" xmlns="" id="{20A542D5-7053-42C3-AB83-9CE5648B5794}"/>
+                <a16:creationId xmlns="" xmlns:a16="http://schemas.microsoft.com/office/drawing/2014/main" id="{20A542D5-7053-42C3-AB83-9CE5648B5794}"/>
               </a:ext>
             </a:extLst>
           </p:cNvPr>
@@ -2596,7 +2596,7 @@
           <p:cNvPr id="3" name="Notes Placeholder 2">
             <a:extLst>
               <a:ext uri="{FF2B5EF4-FFF2-40B4-BE49-F238E27FC236}">
-                <a16:creationId xmlns:a16="http://schemas.microsoft.com/office/drawing/2014/main" xmlns="" id="{A433F834-6A3C-4988-8512-C5F4F66200DD}"/>
+                <a16:creationId xmlns="" xmlns:a16="http://schemas.microsoft.com/office/drawing/2014/main" id="{A433F834-6A3C-4988-8512-C5F4F66200DD}"/>
               </a:ext>
             </a:extLst>
           </p:cNvPr>
@@ -2651,7 +2651,7 @@
           <p:cNvPr id="2" name="Title 1">
             <a:extLst>
               <a:ext uri="{FF2B5EF4-FFF2-40B4-BE49-F238E27FC236}">
-                <a16:creationId xmlns:a16="http://schemas.microsoft.com/office/drawing/2014/main" xmlns="" id="{94687584-054E-4387-A0AE-8C159EC23556}"/>
+                <a16:creationId xmlns="" xmlns:a16="http://schemas.microsoft.com/office/drawing/2014/main" id="{94687584-054E-4387-A0AE-8C159EC23556}"/>
               </a:ext>
             </a:extLst>
           </p:cNvPr>
@@ -2689,7 +2689,7 @@
           <p:cNvPr id="3" name="Subtitle 2">
             <a:extLst>
               <a:ext uri="{FF2B5EF4-FFF2-40B4-BE49-F238E27FC236}">
-                <a16:creationId xmlns:a16="http://schemas.microsoft.com/office/drawing/2014/main" xmlns="" id="{8DDD8572-14E5-4F62-97B0-46200F3B9F01}"/>
+                <a16:creationId xmlns="" xmlns:a16="http://schemas.microsoft.com/office/drawing/2014/main" id="{8DDD8572-14E5-4F62-97B0-46200F3B9F01}"/>
               </a:ext>
             </a:extLst>
           </p:cNvPr>
@@ -2760,7 +2760,7 @@
           <p:cNvPr id="4" name="Date Placeholder 3">
             <a:extLst>
               <a:ext uri="{FF2B5EF4-FFF2-40B4-BE49-F238E27FC236}">
-                <a16:creationId xmlns:a16="http://schemas.microsoft.com/office/drawing/2014/main" xmlns="" id="{53955512-8EC5-44CA-B2B4-2DA5FDB42103}"/>
+                <a16:creationId xmlns="" xmlns:a16="http://schemas.microsoft.com/office/drawing/2014/main" id="{53955512-8EC5-44CA-B2B4-2DA5FDB42103}"/>
               </a:ext>
             </a:extLst>
           </p:cNvPr>
@@ -2786,7 +2786,7 @@
           <p:cNvPr id="5" name="Footer Placeholder 4">
             <a:extLst>
               <a:ext uri="{FF2B5EF4-FFF2-40B4-BE49-F238E27FC236}">
-                <a16:creationId xmlns:a16="http://schemas.microsoft.com/office/drawing/2014/main" xmlns="" id="{21287E7B-BCEA-463E-ABE7-288FBA9B22CB}"/>
+                <a16:creationId xmlns="" xmlns:a16="http://schemas.microsoft.com/office/drawing/2014/main" id="{21287E7B-BCEA-463E-ABE7-288FBA9B22CB}"/>
               </a:ext>
             </a:extLst>
           </p:cNvPr>
@@ -2812,7 +2812,7 @@
           <p:cNvPr id="6" name="Slide Number Placeholder 5">
             <a:extLst>
               <a:ext uri="{FF2B5EF4-FFF2-40B4-BE49-F238E27FC236}">
-                <a16:creationId xmlns:a16="http://schemas.microsoft.com/office/drawing/2014/main" xmlns="" id="{C02073FA-D23C-42FA-A18C-447358C2E9B5}"/>
+                <a16:creationId xmlns="" xmlns:a16="http://schemas.microsoft.com/office/drawing/2014/main" id="{C02073FA-D23C-42FA-A18C-447358C2E9B5}"/>
               </a:ext>
             </a:extLst>
           </p:cNvPr>
@@ -2871,7 +2871,7 @@
           <p:cNvPr id="2" name="Title 1">
             <a:extLst>
               <a:ext uri="{FF2B5EF4-FFF2-40B4-BE49-F238E27FC236}">
-                <a16:creationId xmlns:a16="http://schemas.microsoft.com/office/drawing/2014/main" xmlns="" id="{F224D66A-05B3-468F-BBBB-BD0FB27048FB}"/>
+                <a16:creationId xmlns="" xmlns:a16="http://schemas.microsoft.com/office/drawing/2014/main" id="{F224D66A-05B3-468F-BBBB-BD0FB27048FB}"/>
               </a:ext>
             </a:extLst>
           </p:cNvPr>
@@ -2900,7 +2900,7 @@
           <p:cNvPr id="3" name="Vertical Text Placeholder 2">
             <a:extLst>
               <a:ext uri="{FF2B5EF4-FFF2-40B4-BE49-F238E27FC236}">
-                <a16:creationId xmlns:a16="http://schemas.microsoft.com/office/drawing/2014/main" xmlns="" id="{E58F7F4E-D070-4025-8327-A3083BB98E16}"/>
+                <a16:creationId xmlns="" xmlns:a16="http://schemas.microsoft.com/office/drawing/2014/main" id="{E58F7F4E-D070-4025-8327-A3083BB98E16}"/>
               </a:ext>
             </a:extLst>
           </p:cNvPr>
@@ -2958,7 +2958,7 @@
           <p:cNvPr id="4" name="Date Placeholder 3">
             <a:extLst>
               <a:ext uri="{FF2B5EF4-FFF2-40B4-BE49-F238E27FC236}">
-                <a16:creationId xmlns:a16="http://schemas.microsoft.com/office/drawing/2014/main" xmlns="" id="{20E11B5D-E39C-4982-8061-9ED6CBD2120A}"/>
+                <a16:creationId xmlns="" xmlns:a16="http://schemas.microsoft.com/office/drawing/2014/main" id="{20E11B5D-E39C-4982-8061-9ED6CBD2120A}"/>
               </a:ext>
             </a:extLst>
           </p:cNvPr>
@@ -2984,7 +2984,7 @@
           <p:cNvPr id="5" name="Footer Placeholder 4">
             <a:extLst>
               <a:ext uri="{FF2B5EF4-FFF2-40B4-BE49-F238E27FC236}">
-                <a16:creationId xmlns:a16="http://schemas.microsoft.com/office/drawing/2014/main" xmlns="" id="{17413EE1-CF5C-4394-A27F-6FFE1F94E54E}"/>
+                <a16:creationId xmlns="" xmlns:a16="http://schemas.microsoft.com/office/drawing/2014/main" id="{17413EE1-CF5C-4394-A27F-6FFE1F94E54E}"/>
               </a:ext>
             </a:extLst>
           </p:cNvPr>
@@ -3010,7 +3010,7 @@
           <p:cNvPr id="6" name="Slide Number Placeholder 5">
             <a:extLst>
               <a:ext uri="{FF2B5EF4-FFF2-40B4-BE49-F238E27FC236}">
-                <a16:creationId xmlns:a16="http://schemas.microsoft.com/office/drawing/2014/main" xmlns="" id="{9EDF2B26-C41D-4D57-BB2B-AA4E9239DDD5}"/>
+                <a16:creationId xmlns="" xmlns:a16="http://schemas.microsoft.com/office/drawing/2014/main" id="{9EDF2B26-C41D-4D57-BB2B-AA4E9239DDD5}"/>
               </a:ext>
             </a:extLst>
           </p:cNvPr>
@@ -3069,7 +3069,7 @@
           <p:cNvPr id="2" name="Vertical Title 1">
             <a:extLst>
               <a:ext uri="{FF2B5EF4-FFF2-40B4-BE49-F238E27FC236}">
-                <a16:creationId xmlns:a16="http://schemas.microsoft.com/office/drawing/2014/main" xmlns="" id="{2567F8C7-D414-40DE-8D48-20815CA6B181}"/>
+                <a16:creationId xmlns="" xmlns:a16="http://schemas.microsoft.com/office/drawing/2014/main" id="{2567F8C7-D414-40DE-8D48-20815CA6B181}"/>
               </a:ext>
             </a:extLst>
           </p:cNvPr>
@@ -3103,7 +3103,7 @@
           <p:cNvPr id="3" name="Vertical Text Placeholder 2">
             <a:extLst>
               <a:ext uri="{FF2B5EF4-FFF2-40B4-BE49-F238E27FC236}">
-                <a16:creationId xmlns:a16="http://schemas.microsoft.com/office/drawing/2014/main" xmlns="" id="{45023D3E-CAD7-47BD-9366-D1D842C84A89}"/>
+                <a16:creationId xmlns="" xmlns:a16="http://schemas.microsoft.com/office/drawing/2014/main" id="{45023D3E-CAD7-47BD-9366-D1D842C84A89}"/>
               </a:ext>
             </a:extLst>
           </p:cNvPr>
@@ -3166,7 +3166,7 @@
           <p:cNvPr id="4" name="Date Placeholder 3">
             <a:extLst>
               <a:ext uri="{FF2B5EF4-FFF2-40B4-BE49-F238E27FC236}">
-                <a16:creationId xmlns:a16="http://schemas.microsoft.com/office/drawing/2014/main" xmlns="" id="{5E31D682-619A-463B-B258-5D88A143541D}"/>
+                <a16:creationId xmlns="" xmlns:a16="http://schemas.microsoft.com/office/drawing/2014/main" id="{5E31D682-619A-463B-B258-5D88A143541D}"/>
               </a:ext>
             </a:extLst>
           </p:cNvPr>
@@ -3192,7 +3192,7 @@
           <p:cNvPr id="5" name="Footer Placeholder 4">
             <a:extLst>
               <a:ext uri="{FF2B5EF4-FFF2-40B4-BE49-F238E27FC236}">
-                <a16:creationId xmlns:a16="http://schemas.microsoft.com/office/drawing/2014/main" xmlns="" id="{23AEBC51-533E-462F-BBE4-15D9BB5AEAAC}"/>
+                <a16:creationId xmlns="" xmlns:a16="http://schemas.microsoft.com/office/drawing/2014/main" id="{23AEBC51-533E-462F-BBE4-15D9BB5AEAAC}"/>
               </a:ext>
             </a:extLst>
           </p:cNvPr>
@@ -3218,7 +3218,7 @@
           <p:cNvPr id="6" name="Slide Number Placeholder 5">
             <a:extLst>
               <a:ext uri="{FF2B5EF4-FFF2-40B4-BE49-F238E27FC236}">
-                <a16:creationId xmlns:a16="http://schemas.microsoft.com/office/drawing/2014/main" xmlns="" id="{AB1C2604-A1DC-43CF-9148-140D7F1C87BF}"/>
+                <a16:creationId xmlns="" xmlns:a16="http://schemas.microsoft.com/office/drawing/2014/main" id="{AB1C2604-A1DC-43CF-9148-140D7F1C87BF}"/>
               </a:ext>
             </a:extLst>
           </p:cNvPr>
@@ -3277,7 +3277,7 @@
           <p:cNvPr id="2" name="Title 1">
             <a:extLst>
               <a:ext uri="{FF2B5EF4-FFF2-40B4-BE49-F238E27FC236}">
-                <a16:creationId xmlns:a16="http://schemas.microsoft.com/office/drawing/2014/main" xmlns="" id="{E271155E-8860-4411-9E6F-95ACF128F3FF}"/>
+                <a16:creationId xmlns="" xmlns:a16="http://schemas.microsoft.com/office/drawing/2014/main" id="{E271155E-8860-4411-9E6F-95ACF128F3FF}"/>
               </a:ext>
             </a:extLst>
           </p:cNvPr>
@@ -3315,7 +3315,7 @@
           <p:cNvPr id="3" name="Subtitle 2">
             <a:extLst>
               <a:ext uri="{FF2B5EF4-FFF2-40B4-BE49-F238E27FC236}">
-                <a16:creationId xmlns:a16="http://schemas.microsoft.com/office/drawing/2014/main" xmlns="" id="{D3549FFE-173C-4507-8B7A-A5DE53F35EC1}"/>
+                <a16:creationId xmlns="" xmlns:a16="http://schemas.microsoft.com/office/drawing/2014/main" id="{D3549FFE-173C-4507-8B7A-A5DE53F35EC1}"/>
               </a:ext>
             </a:extLst>
           </p:cNvPr>
@@ -3386,7 +3386,7 @@
           <p:cNvPr id="4" name="Date Placeholder 3">
             <a:extLst>
               <a:ext uri="{FF2B5EF4-FFF2-40B4-BE49-F238E27FC236}">
-                <a16:creationId xmlns:a16="http://schemas.microsoft.com/office/drawing/2014/main" xmlns="" id="{E98C4F3D-E47A-44A7-ADE8-CFECE966C2E9}"/>
+                <a16:creationId xmlns="" xmlns:a16="http://schemas.microsoft.com/office/drawing/2014/main" id="{E98C4F3D-E47A-44A7-ADE8-CFECE966C2E9}"/>
               </a:ext>
             </a:extLst>
           </p:cNvPr>
@@ -3442,7 +3442,7 @@
           <p:cNvPr id="2" name="Title 1">
             <a:extLst>
               <a:ext uri="{FF2B5EF4-FFF2-40B4-BE49-F238E27FC236}">
-                <a16:creationId xmlns:a16="http://schemas.microsoft.com/office/drawing/2014/main" xmlns="" id="{74B47A0A-7671-4D73-8614-CAE27215A9F1}"/>
+                <a16:creationId xmlns="" xmlns:a16="http://schemas.microsoft.com/office/drawing/2014/main" id="{74B47A0A-7671-4D73-8614-CAE27215A9F1}"/>
               </a:ext>
             </a:extLst>
           </p:cNvPr>
@@ -3471,7 +3471,7 @@
           <p:cNvPr id="3" name="Content Placeholder 2">
             <a:extLst>
               <a:ext uri="{FF2B5EF4-FFF2-40B4-BE49-F238E27FC236}">
-                <a16:creationId xmlns:a16="http://schemas.microsoft.com/office/drawing/2014/main" xmlns="" id="{7D47535E-19AC-4A22-A7D2-5910BBEF6850}"/>
+                <a16:creationId xmlns="" xmlns:a16="http://schemas.microsoft.com/office/drawing/2014/main" id="{7D47535E-19AC-4A22-A7D2-5910BBEF6850}"/>
               </a:ext>
             </a:extLst>
           </p:cNvPr>
@@ -3529,7 +3529,7 @@
           <p:cNvPr id="4" name="Date Placeholder 3">
             <a:extLst>
               <a:ext uri="{FF2B5EF4-FFF2-40B4-BE49-F238E27FC236}">
-                <a16:creationId xmlns:a16="http://schemas.microsoft.com/office/drawing/2014/main" xmlns="" id="{0D4BA1CF-D768-4CD5-91F1-2021A70525D7}"/>
+                <a16:creationId xmlns="" xmlns:a16="http://schemas.microsoft.com/office/drawing/2014/main" id="{0D4BA1CF-D768-4CD5-91F1-2021A70525D7}"/>
               </a:ext>
             </a:extLst>
           </p:cNvPr>
@@ -3585,7 +3585,7 @@
           <p:cNvPr id="2" name="Title 1">
             <a:extLst>
               <a:ext uri="{FF2B5EF4-FFF2-40B4-BE49-F238E27FC236}">
-                <a16:creationId xmlns:a16="http://schemas.microsoft.com/office/drawing/2014/main" xmlns="" id="{86F7385A-08CA-42ED-8A1E-208DFF64FDBD}"/>
+                <a16:creationId xmlns="" xmlns:a16="http://schemas.microsoft.com/office/drawing/2014/main" id="{86F7385A-08CA-42ED-8A1E-208DFF64FDBD}"/>
               </a:ext>
             </a:extLst>
           </p:cNvPr>
@@ -3623,7 +3623,7 @@
           <p:cNvPr id="3" name="Text Placeholder 2">
             <a:extLst>
               <a:ext uri="{FF2B5EF4-FFF2-40B4-BE49-F238E27FC236}">
-                <a16:creationId xmlns:a16="http://schemas.microsoft.com/office/drawing/2014/main" xmlns="" id="{1D7FFC9C-BF26-4FD5-AAF4-D8044D49A48D}"/>
+                <a16:creationId xmlns="" xmlns:a16="http://schemas.microsoft.com/office/drawing/2014/main" id="{1D7FFC9C-BF26-4FD5-AAF4-D8044D49A48D}"/>
               </a:ext>
             </a:extLst>
           </p:cNvPr>
@@ -3748,7 +3748,7 @@
           <p:cNvPr id="4" name="Date Placeholder 3">
             <a:extLst>
               <a:ext uri="{FF2B5EF4-FFF2-40B4-BE49-F238E27FC236}">
-                <a16:creationId xmlns:a16="http://schemas.microsoft.com/office/drawing/2014/main" xmlns="" id="{C3531DD4-9914-49D0-A99B-902B450AA6EB}"/>
+                <a16:creationId xmlns="" xmlns:a16="http://schemas.microsoft.com/office/drawing/2014/main" id="{C3531DD4-9914-49D0-A99B-902B450AA6EB}"/>
               </a:ext>
             </a:extLst>
           </p:cNvPr>
@@ -3804,7 +3804,7 @@
           <p:cNvPr id="2" name="Title 1">
             <a:extLst>
               <a:ext uri="{FF2B5EF4-FFF2-40B4-BE49-F238E27FC236}">
-                <a16:creationId xmlns:a16="http://schemas.microsoft.com/office/drawing/2014/main" xmlns="" id="{369B62DF-9C17-4F7C-A28B-C0068E7229A0}"/>
+                <a16:creationId xmlns="" xmlns:a16="http://schemas.microsoft.com/office/drawing/2014/main" id="{369B62DF-9C17-4F7C-A28B-C0068E7229A0}"/>
               </a:ext>
             </a:extLst>
           </p:cNvPr>
@@ -3833,7 +3833,7 @@
           <p:cNvPr id="3" name="Content Placeholder 2">
             <a:extLst>
               <a:ext uri="{FF2B5EF4-FFF2-40B4-BE49-F238E27FC236}">
-                <a16:creationId xmlns:a16="http://schemas.microsoft.com/office/drawing/2014/main" xmlns="" id="{CE6AE1AB-5246-4540-B512-5F5BB27420EB}"/>
+                <a16:creationId xmlns="" xmlns:a16="http://schemas.microsoft.com/office/drawing/2014/main" id="{CE6AE1AB-5246-4540-B512-5F5BB27420EB}"/>
               </a:ext>
             </a:extLst>
           </p:cNvPr>
@@ -3896,7 +3896,7 @@
           <p:cNvPr id="4" name="Content Placeholder 3">
             <a:extLst>
               <a:ext uri="{FF2B5EF4-FFF2-40B4-BE49-F238E27FC236}">
-                <a16:creationId xmlns:a16="http://schemas.microsoft.com/office/drawing/2014/main" xmlns="" id="{06031C8D-7353-445C-B2C8-132F09781625}"/>
+                <a16:creationId xmlns="" xmlns:a16="http://schemas.microsoft.com/office/drawing/2014/main" id="{06031C8D-7353-445C-B2C8-132F09781625}"/>
               </a:ext>
             </a:extLst>
           </p:cNvPr>
@@ -3959,7 +3959,7 @@
           <p:cNvPr id="5" name="Date Placeholder 4">
             <a:extLst>
               <a:ext uri="{FF2B5EF4-FFF2-40B4-BE49-F238E27FC236}">
-                <a16:creationId xmlns:a16="http://schemas.microsoft.com/office/drawing/2014/main" xmlns="" id="{D4910BEF-9B1A-4E29-BE79-4197DAC95625}"/>
+                <a16:creationId xmlns="" xmlns:a16="http://schemas.microsoft.com/office/drawing/2014/main" id="{D4910BEF-9B1A-4E29-BE79-4197DAC95625}"/>
               </a:ext>
             </a:extLst>
           </p:cNvPr>
@@ -4015,7 +4015,7 @@
           <p:cNvPr id="2" name="Title 1">
             <a:extLst>
               <a:ext uri="{FF2B5EF4-FFF2-40B4-BE49-F238E27FC236}">
-                <a16:creationId xmlns:a16="http://schemas.microsoft.com/office/drawing/2014/main" xmlns="" id="{2B9E1F05-7AB6-4622-8128-C86AD605EAB4}"/>
+                <a16:creationId xmlns="" xmlns:a16="http://schemas.microsoft.com/office/drawing/2014/main" id="{2B9E1F05-7AB6-4622-8128-C86AD605EAB4}"/>
               </a:ext>
             </a:extLst>
           </p:cNvPr>
@@ -4049,7 +4049,7 @@
           <p:cNvPr id="3" name="Text Placeholder 2">
             <a:extLst>
               <a:ext uri="{FF2B5EF4-FFF2-40B4-BE49-F238E27FC236}">
-                <a16:creationId xmlns:a16="http://schemas.microsoft.com/office/drawing/2014/main" xmlns="" id="{844E5F14-700E-4F69-BFEF-8A9D7A94F93E}"/>
+                <a16:creationId xmlns="" xmlns:a16="http://schemas.microsoft.com/office/drawing/2014/main" id="{844E5F14-700E-4F69-BFEF-8A9D7A94F93E}"/>
               </a:ext>
             </a:extLst>
           </p:cNvPr>
@@ -4120,7 +4120,7 @@
           <p:cNvPr id="4" name="Content Placeholder 3">
             <a:extLst>
               <a:ext uri="{FF2B5EF4-FFF2-40B4-BE49-F238E27FC236}">
-                <a16:creationId xmlns:a16="http://schemas.microsoft.com/office/drawing/2014/main" xmlns="" id="{4876AA2B-AE18-4221-8192-7FCD1B4FEC24}"/>
+                <a16:creationId xmlns="" xmlns:a16="http://schemas.microsoft.com/office/drawing/2014/main" id="{4876AA2B-AE18-4221-8192-7FCD1B4FEC24}"/>
               </a:ext>
             </a:extLst>
           </p:cNvPr>
@@ -4183,7 +4183,7 @@
           <p:cNvPr id="5" name="Text Placeholder 4">
             <a:extLst>
               <a:ext uri="{FF2B5EF4-FFF2-40B4-BE49-F238E27FC236}">
-                <a16:creationId xmlns:a16="http://schemas.microsoft.com/office/drawing/2014/main" xmlns="" id="{D15321CC-E60F-450F-97DF-AFBEA26542F2}"/>
+                <a16:creationId xmlns="" xmlns:a16="http://schemas.microsoft.com/office/drawing/2014/main" id="{D15321CC-E60F-450F-97DF-AFBEA26542F2}"/>
               </a:ext>
             </a:extLst>
           </p:cNvPr>
@@ -4254,7 +4254,7 @@
           <p:cNvPr id="6" name="Content Placeholder 5">
             <a:extLst>
               <a:ext uri="{FF2B5EF4-FFF2-40B4-BE49-F238E27FC236}">
-                <a16:creationId xmlns:a16="http://schemas.microsoft.com/office/drawing/2014/main" xmlns="" id="{2CB6A620-2CA7-4D3B-AA56-D974514B8BF2}"/>
+                <a16:creationId xmlns="" xmlns:a16="http://schemas.microsoft.com/office/drawing/2014/main" id="{2CB6A620-2CA7-4D3B-AA56-D974514B8BF2}"/>
               </a:ext>
             </a:extLst>
           </p:cNvPr>
@@ -4317,7 +4317,7 @@
           <p:cNvPr id="7" name="Date Placeholder 6">
             <a:extLst>
               <a:ext uri="{FF2B5EF4-FFF2-40B4-BE49-F238E27FC236}">
-                <a16:creationId xmlns:a16="http://schemas.microsoft.com/office/drawing/2014/main" xmlns="" id="{1688402C-C3D2-456D-8233-0B2A26BE0D04}"/>
+                <a16:creationId xmlns="" xmlns:a16="http://schemas.microsoft.com/office/drawing/2014/main" id="{1688402C-C3D2-456D-8233-0B2A26BE0D04}"/>
               </a:ext>
             </a:extLst>
           </p:cNvPr>
@@ -4373,7 +4373,7 @@
           <p:cNvPr id="2" name="Title 1">
             <a:extLst>
               <a:ext uri="{FF2B5EF4-FFF2-40B4-BE49-F238E27FC236}">
-                <a16:creationId xmlns:a16="http://schemas.microsoft.com/office/drawing/2014/main" xmlns="" id="{77525CDA-1074-4184-9841-D947BD222F31}"/>
+                <a16:creationId xmlns="" xmlns:a16="http://schemas.microsoft.com/office/drawing/2014/main" id="{77525CDA-1074-4184-9841-D947BD222F31}"/>
               </a:ext>
             </a:extLst>
           </p:cNvPr>
@@ -4402,7 +4402,7 @@
           <p:cNvPr id="3" name="Date Placeholder 2">
             <a:extLst>
               <a:ext uri="{FF2B5EF4-FFF2-40B4-BE49-F238E27FC236}">
-                <a16:creationId xmlns:a16="http://schemas.microsoft.com/office/drawing/2014/main" xmlns="" id="{66C844D6-B083-4512-B69B-DCE97C3A2073}"/>
+                <a16:creationId xmlns="" xmlns:a16="http://schemas.microsoft.com/office/drawing/2014/main" id="{66C844D6-B083-4512-B69B-DCE97C3A2073}"/>
               </a:ext>
             </a:extLst>
           </p:cNvPr>
@@ -4458,7 +4458,7 @@
           <p:cNvPr id="2" name="Date Placeholder 1">
             <a:extLst>
               <a:ext uri="{FF2B5EF4-FFF2-40B4-BE49-F238E27FC236}">
-                <a16:creationId xmlns:a16="http://schemas.microsoft.com/office/drawing/2014/main" xmlns="" id="{017FB9A3-711C-4BFC-8909-5BD8B28D4E96}"/>
+                <a16:creationId xmlns="" xmlns:a16="http://schemas.microsoft.com/office/drawing/2014/main" id="{017FB9A3-711C-4BFC-8909-5BD8B28D4E96}"/>
               </a:ext>
             </a:extLst>
           </p:cNvPr>
@@ -4515,7 +4515,7 @@
           <p:cNvPr id="2" name="Title 1">
             <a:extLst>
               <a:ext uri="{FF2B5EF4-FFF2-40B4-BE49-F238E27FC236}">
-                <a16:creationId xmlns:a16="http://schemas.microsoft.com/office/drawing/2014/main" xmlns="" id="{B618D9E1-88B0-4321-9800-5A1D9196D27B}"/>
+                <a16:creationId xmlns="" xmlns:a16="http://schemas.microsoft.com/office/drawing/2014/main" id="{B618D9E1-88B0-4321-9800-5A1D9196D27B}"/>
               </a:ext>
             </a:extLst>
           </p:cNvPr>
@@ -4553,7 +4553,7 @@
           <p:cNvPr id="3" name="Content Placeholder 2">
             <a:extLst>
               <a:ext uri="{FF2B5EF4-FFF2-40B4-BE49-F238E27FC236}">
-                <a16:creationId xmlns:a16="http://schemas.microsoft.com/office/drawing/2014/main" xmlns="" id="{AD000F8F-ACDE-4B15-BC3A-B8A12F298DA0}"/>
+                <a16:creationId xmlns="" xmlns:a16="http://schemas.microsoft.com/office/drawing/2014/main" id="{AD000F8F-ACDE-4B15-BC3A-B8A12F298DA0}"/>
               </a:ext>
             </a:extLst>
           </p:cNvPr>
@@ -4644,7 +4644,7 @@
           <p:cNvPr id="4" name="Text Placeholder 3">
             <a:extLst>
               <a:ext uri="{FF2B5EF4-FFF2-40B4-BE49-F238E27FC236}">
-                <a16:creationId xmlns:a16="http://schemas.microsoft.com/office/drawing/2014/main" xmlns="" id="{ACBD422B-FE4F-4E88-A0AC-43AF732EB30A}"/>
+                <a16:creationId xmlns="" xmlns:a16="http://schemas.microsoft.com/office/drawing/2014/main" id="{ACBD422B-FE4F-4E88-A0AC-43AF732EB30A}"/>
               </a:ext>
             </a:extLst>
           </p:cNvPr>
@@ -4715,7 +4715,7 @@
           <p:cNvPr id="5" name="Date Placeholder 4">
             <a:extLst>
               <a:ext uri="{FF2B5EF4-FFF2-40B4-BE49-F238E27FC236}">
-                <a16:creationId xmlns:a16="http://schemas.microsoft.com/office/drawing/2014/main" xmlns="" id="{E73EFBAE-7932-4ACE-ABB2-A2E4C4441901}"/>
+                <a16:creationId xmlns="" xmlns:a16="http://schemas.microsoft.com/office/drawing/2014/main" id="{E73EFBAE-7932-4ACE-ABB2-A2E4C4441901}"/>
               </a:ext>
             </a:extLst>
           </p:cNvPr>
@@ -4771,7 +4771,7 @@
           <p:cNvPr id="2" name="Title 1">
             <a:extLst>
               <a:ext uri="{FF2B5EF4-FFF2-40B4-BE49-F238E27FC236}">
-                <a16:creationId xmlns:a16="http://schemas.microsoft.com/office/drawing/2014/main" xmlns="" id="{1BAACB76-BFDF-497D-955D-A1E96D9ECCAF}"/>
+                <a16:creationId xmlns="" xmlns:a16="http://schemas.microsoft.com/office/drawing/2014/main" id="{1BAACB76-BFDF-497D-955D-A1E96D9ECCAF}"/>
               </a:ext>
             </a:extLst>
           </p:cNvPr>
@@ -4800,7 +4800,7 @@
           <p:cNvPr id="3" name="Content Placeholder 2">
             <a:extLst>
               <a:ext uri="{FF2B5EF4-FFF2-40B4-BE49-F238E27FC236}">
-                <a16:creationId xmlns:a16="http://schemas.microsoft.com/office/drawing/2014/main" xmlns="" id="{597A0892-82A4-4389-9D60-856B90BADFD2}"/>
+                <a16:creationId xmlns="" xmlns:a16="http://schemas.microsoft.com/office/drawing/2014/main" id="{597A0892-82A4-4389-9D60-856B90BADFD2}"/>
               </a:ext>
             </a:extLst>
           </p:cNvPr>
@@ -4858,7 +4858,7 @@
           <p:cNvPr id="4" name="Date Placeholder 3">
             <a:extLst>
               <a:ext uri="{FF2B5EF4-FFF2-40B4-BE49-F238E27FC236}">
-                <a16:creationId xmlns:a16="http://schemas.microsoft.com/office/drawing/2014/main" xmlns="" id="{17DB5FF4-0D7B-4EDA-BE24-D35EE77B06B5}"/>
+                <a16:creationId xmlns="" xmlns:a16="http://schemas.microsoft.com/office/drawing/2014/main" id="{17DB5FF4-0D7B-4EDA-BE24-D35EE77B06B5}"/>
               </a:ext>
             </a:extLst>
           </p:cNvPr>
@@ -4884,7 +4884,7 @@
           <p:cNvPr id="5" name="Footer Placeholder 4">
             <a:extLst>
               <a:ext uri="{FF2B5EF4-FFF2-40B4-BE49-F238E27FC236}">
-                <a16:creationId xmlns:a16="http://schemas.microsoft.com/office/drawing/2014/main" xmlns="" id="{B6D66EB3-B33A-4B43-805F-B63DB4EA6EEC}"/>
+                <a16:creationId xmlns="" xmlns:a16="http://schemas.microsoft.com/office/drawing/2014/main" id="{B6D66EB3-B33A-4B43-805F-B63DB4EA6EEC}"/>
               </a:ext>
             </a:extLst>
           </p:cNvPr>
@@ -4910,7 +4910,7 @@
           <p:cNvPr id="6" name="Slide Number Placeholder 5">
             <a:extLst>
               <a:ext uri="{FF2B5EF4-FFF2-40B4-BE49-F238E27FC236}">
-                <a16:creationId xmlns:a16="http://schemas.microsoft.com/office/drawing/2014/main" xmlns="" id="{27FDCBD6-55D5-454A-98C4-1CADD7257D7B}"/>
+                <a16:creationId xmlns="" xmlns:a16="http://schemas.microsoft.com/office/drawing/2014/main" id="{27FDCBD6-55D5-454A-98C4-1CADD7257D7B}"/>
               </a:ext>
             </a:extLst>
           </p:cNvPr>
@@ -4969,7 +4969,7 @@
           <p:cNvPr id="2" name="Title 1">
             <a:extLst>
               <a:ext uri="{FF2B5EF4-FFF2-40B4-BE49-F238E27FC236}">
-                <a16:creationId xmlns:a16="http://schemas.microsoft.com/office/drawing/2014/main" xmlns="" id="{5D3CB6B1-6E34-45D0-9BD1-3F87515C4AC4}"/>
+                <a16:creationId xmlns="" xmlns:a16="http://schemas.microsoft.com/office/drawing/2014/main" id="{5D3CB6B1-6E34-45D0-9BD1-3F87515C4AC4}"/>
               </a:ext>
             </a:extLst>
           </p:cNvPr>
@@ -5007,7 +5007,7 @@
           <p:cNvPr id="3" name="Picture Placeholder 2">
             <a:extLst>
               <a:ext uri="{FF2B5EF4-FFF2-40B4-BE49-F238E27FC236}">
-                <a16:creationId xmlns:a16="http://schemas.microsoft.com/office/drawing/2014/main" xmlns="" id="{B01C2629-B10B-44CD-AE5C-C8CC1E87F5F9}"/>
+                <a16:creationId xmlns="" xmlns:a16="http://schemas.microsoft.com/office/drawing/2014/main" id="{B01C2629-B10B-44CD-AE5C-C8CC1E87F5F9}"/>
               </a:ext>
             </a:extLst>
           </p:cNvPr>
@@ -5074,7 +5074,7 @@
           <p:cNvPr id="4" name="Text Placeholder 3">
             <a:extLst>
               <a:ext uri="{FF2B5EF4-FFF2-40B4-BE49-F238E27FC236}">
-                <a16:creationId xmlns:a16="http://schemas.microsoft.com/office/drawing/2014/main" xmlns="" id="{41193340-0D01-4D92-9223-19386E22F456}"/>
+                <a16:creationId xmlns="" xmlns:a16="http://schemas.microsoft.com/office/drawing/2014/main" id="{41193340-0D01-4D92-9223-19386E22F456}"/>
               </a:ext>
             </a:extLst>
           </p:cNvPr>
@@ -5145,7 +5145,7 @@
           <p:cNvPr id="5" name="Date Placeholder 4">
             <a:extLst>
               <a:ext uri="{FF2B5EF4-FFF2-40B4-BE49-F238E27FC236}">
-                <a16:creationId xmlns:a16="http://schemas.microsoft.com/office/drawing/2014/main" xmlns="" id="{5631C6C7-2DC6-4711-B5B7-21FAA3ED4A0C}"/>
+                <a16:creationId xmlns="" xmlns:a16="http://schemas.microsoft.com/office/drawing/2014/main" id="{5631C6C7-2DC6-4711-B5B7-21FAA3ED4A0C}"/>
               </a:ext>
             </a:extLst>
           </p:cNvPr>
@@ -5201,7 +5201,7 @@
           <p:cNvPr id="2" name="Title 1">
             <a:extLst>
               <a:ext uri="{FF2B5EF4-FFF2-40B4-BE49-F238E27FC236}">
-                <a16:creationId xmlns:a16="http://schemas.microsoft.com/office/drawing/2014/main" xmlns="" id="{99F7CF15-EDE1-40C6-9632-9C94330A31E7}"/>
+                <a16:creationId xmlns="" xmlns:a16="http://schemas.microsoft.com/office/drawing/2014/main" id="{99F7CF15-EDE1-40C6-9632-9C94330A31E7}"/>
               </a:ext>
             </a:extLst>
           </p:cNvPr>
@@ -5230,7 +5230,7 @@
           <p:cNvPr id="3" name="Vertical Text Placeholder 2">
             <a:extLst>
               <a:ext uri="{FF2B5EF4-FFF2-40B4-BE49-F238E27FC236}">
-                <a16:creationId xmlns:a16="http://schemas.microsoft.com/office/drawing/2014/main" xmlns="" id="{572C011F-145A-45F0-856E-40C2D7009BDC}"/>
+                <a16:creationId xmlns="" xmlns:a16="http://schemas.microsoft.com/office/drawing/2014/main" id="{572C011F-145A-45F0-856E-40C2D7009BDC}"/>
               </a:ext>
             </a:extLst>
           </p:cNvPr>
@@ -5288,7 +5288,7 @@
           <p:cNvPr id="4" name="Date Placeholder 3">
             <a:extLst>
               <a:ext uri="{FF2B5EF4-FFF2-40B4-BE49-F238E27FC236}">
-                <a16:creationId xmlns:a16="http://schemas.microsoft.com/office/drawing/2014/main" xmlns="" id="{BE316984-F8E3-4BBB-891A-B768CC19EF13}"/>
+                <a16:creationId xmlns="" xmlns:a16="http://schemas.microsoft.com/office/drawing/2014/main" id="{BE316984-F8E3-4BBB-891A-B768CC19EF13}"/>
               </a:ext>
             </a:extLst>
           </p:cNvPr>
@@ -5344,7 +5344,7 @@
           <p:cNvPr id="2" name="Vertical Title 1">
             <a:extLst>
               <a:ext uri="{FF2B5EF4-FFF2-40B4-BE49-F238E27FC236}">
-                <a16:creationId xmlns:a16="http://schemas.microsoft.com/office/drawing/2014/main" xmlns="" id="{4F67AE17-5E3E-4C66-8D02-2745F0DDFFA9}"/>
+                <a16:creationId xmlns="" xmlns:a16="http://schemas.microsoft.com/office/drawing/2014/main" id="{4F67AE17-5E3E-4C66-8D02-2745F0DDFFA9}"/>
               </a:ext>
             </a:extLst>
           </p:cNvPr>
@@ -5378,7 +5378,7 @@
           <p:cNvPr id="3" name="Vertical Text Placeholder 2">
             <a:extLst>
               <a:ext uri="{FF2B5EF4-FFF2-40B4-BE49-F238E27FC236}">
-                <a16:creationId xmlns:a16="http://schemas.microsoft.com/office/drawing/2014/main" xmlns="" id="{03F14FF1-D574-4EC3-B789-D91DBBA9F9C0}"/>
+                <a16:creationId xmlns="" xmlns:a16="http://schemas.microsoft.com/office/drawing/2014/main" id="{03F14FF1-D574-4EC3-B789-D91DBBA9F9C0}"/>
               </a:ext>
             </a:extLst>
           </p:cNvPr>
@@ -5441,7 +5441,7 @@
           <p:cNvPr id="4" name="Date Placeholder 3">
             <a:extLst>
               <a:ext uri="{FF2B5EF4-FFF2-40B4-BE49-F238E27FC236}">
-                <a16:creationId xmlns:a16="http://schemas.microsoft.com/office/drawing/2014/main" xmlns="" id="{8EB547ED-A9E4-40E2-AE30-02BC637176B4}"/>
+                <a16:creationId xmlns="" xmlns:a16="http://schemas.microsoft.com/office/drawing/2014/main" id="{8EB547ED-A9E4-40E2-AE30-02BC637176B4}"/>
               </a:ext>
             </a:extLst>
           </p:cNvPr>
@@ -5497,7 +5497,7 @@
           <p:cNvPr id="2" name="Title 1">
             <a:extLst>
               <a:ext uri="{FF2B5EF4-FFF2-40B4-BE49-F238E27FC236}">
-                <a16:creationId xmlns:a16="http://schemas.microsoft.com/office/drawing/2014/main" xmlns="" id="{D9D6855A-49AD-43DF-AFB5-26CEE6584415}"/>
+                <a16:creationId xmlns="" xmlns:a16="http://schemas.microsoft.com/office/drawing/2014/main" id="{D9D6855A-49AD-43DF-AFB5-26CEE6584415}"/>
               </a:ext>
             </a:extLst>
           </p:cNvPr>
@@ -5535,7 +5535,7 @@
           <p:cNvPr id="3" name="Text Placeholder 2">
             <a:extLst>
               <a:ext uri="{FF2B5EF4-FFF2-40B4-BE49-F238E27FC236}">
-                <a16:creationId xmlns:a16="http://schemas.microsoft.com/office/drawing/2014/main" xmlns="" id="{9CE04F08-061E-40D4-95FA-C8D3942E202D}"/>
+                <a16:creationId xmlns="" xmlns:a16="http://schemas.microsoft.com/office/drawing/2014/main" id="{9CE04F08-061E-40D4-95FA-C8D3942E202D}"/>
               </a:ext>
             </a:extLst>
           </p:cNvPr>
@@ -5660,7 +5660,7 @@
           <p:cNvPr id="4" name="Date Placeholder 3">
             <a:extLst>
               <a:ext uri="{FF2B5EF4-FFF2-40B4-BE49-F238E27FC236}">
-                <a16:creationId xmlns:a16="http://schemas.microsoft.com/office/drawing/2014/main" xmlns="" id="{FCCBCC3F-1149-4378-A833-37E20CB6C359}"/>
+                <a16:creationId xmlns="" xmlns:a16="http://schemas.microsoft.com/office/drawing/2014/main" id="{FCCBCC3F-1149-4378-A833-37E20CB6C359}"/>
               </a:ext>
             </a:extLst>
           </p:cNvPr>
@@ -5686,7 +5686,7 @@
           <p:cNvPr id="5" name="Footer Placeholder 4">
             <a:extLst>
               <a:ext uri="{FF2B5EF4-FFF2-40B4-BE49-F238E27FC236}">
-                <a16:creationId xmlns:a16="http://schemas.microsoft.com/office/drawing/2014/main" xmlns="" id="{9D1A91DE-8C7C-40AD-8836-62072D99411A}"/>
+                <a16:creationId xmlns="" xmlns:a16="http://schemas.microsoft.com/office/drawing/2014/main" id="{9D1A91DE-8C7C-40AD-8836-62072D99411A}"/>
               </a:ext>
             </a:extLst>
           </p:cNvPr>
@@ -5712,7 +5712,7 @@
           <p:cNvPr id="6" name="Slide Number Placeholder 5">
             <a:extLst>
               <a:ext uri="{FF2B5EF4-FFF2-40B4-BE49-F238E27FC236}">
-                <a16:creationId xmlns:a16="http://schemas.microsoft.com/office/drawing/2014/main" xmlns="" id="{FD330BEF-7F5C-49EF-97CB-D0453D40C104}"/>
+                <a16:creationId xmlns="" xmlns:a16="http://schemas.microsoft.com/office/drawing/2014/main" id="{FD330BEF-7F5C-49EF-97CB-D0453D40C104}"/>
               </a:ext>
             </a:extLst>
           </p:cNvPr>
@@ -5771,7 +5771,7 @@
           <p:cNvPr id="2" name="Title 1">
             <a:extLst>
               <a:ext uri="{FF2B5EF4-FFF2-40B4-BE49-F238E27FC236}">
-                <a16:creationId xmlns:a16="http://schemas.microsoft.com/office/drawing/2014/main" xmlns="" id="{7FFD13EB-93D3-4084-916F-4F5B23E99E49}"/>
+                <a16:creationId xmlns="" xmlns:a16="http://schemas.microsoft.com/office/drawing/2014/main" id="{7FFD13EB-93D3-4084-916F-4F5B23E99E49}"/>
               </a:ext>
             </a:extLst>
           </p:cNvPr>
@@ -5800,7 +5800,7 @@
           <p:cNvPr id="3" name="Content Placeholder 2">
             <a:extLst>
               <a:ext uri="{FF2B5EF4-FFF2-40B4-BE49-F238E27FC236}">
-                <a16:creationId xmlns:a16="http://schemas.microsoft.com/office/drawing/2014/main" xmlns="" id="{055040FF-C5C0-4E22-920B-4928A7F29536}"/>
+                <a16:creationId xmlns="" xmlns:a16="http://schemas.microsoft.com/office/drawing/2014/main" id="{055040FF-C5C0-4E22-920B-4928A7F29536}"/>
               </a:ext>
             </a:extLst>
           </p:cNvPr>
@@ -5863,7 +5863,7 @@
           <p:cNvPr id="4" name="Content Placeholder 3">
             <a:extLst>
               <a:ext uri="{FF2B5EF4-FFF2-40B4-BE49-F238E27FC236}">
-                <a16:creationId xmlns:a16="http://schemas.microsoft.com/office/drawing/2014/main" xmlns="" id="{A410DC22-3687-4238-A625-AEDD9DE014E9}"/>
+                <a16:creationId xmlns="" xmlns:a16="http://schemas.microsoft.com/office/drawing/2014/main" id="{A410DC22-3687-4238-A625-AEDD9DE014E9}"/>
               </a:ext>
             </a:extLst>
           </p:cNvPr>
@@ -5926,7 +5926,7 @@
           <p:cNvPr id="5" name="Date Placeholder 4">
             <a:extLst>
               <a:ext uri="{FF2B5EF4-FFF2-40B4-BE49-F238E27FC236}">
-                <a16:creationId xmlns:a16="http://schemas.microsoft.com/office/drawing/2014/main" xmlns="" id="{BC4E559F-3021-4BAA-A96B-CD657B93E716}"/>
+                <a16:creationId xmlns="" xmlns:a16="http://schemas.microsoft.com/office/drawing/2014/main" id="{BC4E559F-3021-4BAA-A96B-CD657B93E716}"/>
               </a:ext>
             </a:extLst>
           </p:cNvPr>
@@ -5952,7 +5952,7 @@
           <p:cNvPr id="6" name="Footer Placeholder 5">
             <a:extLst>
               <a:ext uri="{FF2B5EF4-FFF2-40B4-BE49-F238E27FC236}">
-                <a16:creationId xmlns:a16="http://schemas.microsoft.com/office/drawing/2014/main" xmlns="" id="{C7678617-F999-4ECE-8D0E-FB4F1180562C}"/>
+                <a16:creationId xmlns="" xmlns:a16="http://schemas.microsoft.com/office/drawing/2014/main" id="{C7678617-F999-4ECE-8D0E-FB4F1180562C}"/>
               </a:ext>
             </a:extLst>
           </p:cNvPr>
@@ -5978,7 +5978,7 @@
           <p:cNvPr id="7" name="Slide Number Placeholder 6">
             <a:extLst>
               <a:ext uri="{FF2B5EF4-FFF2-40B4-BE49-F238E27FC236}">
-                <a16:creationId xmlns:a16="http://schemas.microsoft.com/office/drawing/2014/main" xmlns="" id="{F3225577-1B3A-4F87-AE70-A35DF13EEC04}"/>
+                <a16:creationId xmlns="" xmlns:a16="http://schemas.microsoft.com/office/drawing/2014/main" id="{F3225577-1B3A-4F87-AE70-A35DF13EEC04}"/>
               </a:ext>
             </a:extLst>
           </p:cNvPr>
@@ -6037,7 +6037,7 @@
           <p:cNvPr id="2" name="Title 1">
             <a:extLst>
               <a:ext uri="{FF2B5EF4-FFF2-40B4-BE49-F238E27FC236}">
-                <a16:creationId xmlns:a16="http://schemas.microsoft.com/office/drawing/2014/main" xmlns="" id="{C21BE728-C522-4AAF-9410-9F270985DB0C}"/>
+                <a16:creationId xmlns="" xmlns:a16="http://schemas.microsoft.com/office/drawing/2014/main" id="{C21BE728-C522-4AAF-9410-9F270985DB0C}"/>
               </a:ext>
             </a:extLst>
           </p:cNvPr>
@@ -6071,7 +6071,7 @@
           <p:cNvPr id="3" name="Text Placeholder 2">
             <a:extLst>
               <a:ext uri="{FF2B5EF4-FFF2-40B4-BE49-F238E27FC236}">
-                <a16:creationId xmlns:a16="http://schemas.microsoft.com/office/drawing/2014/main" xmlns="" id="{F667F659-E354-4921-B4C2-6D837D4FF26C}"/>
+                <a16:creationId xmlns="" xmlns:a16="http://schemas.microsoft.com/office/drawing/2014/main" id="{F667F659-E354-4921-B4C2-6D837D4FF26C}"/>
               </a:ext>
             </a:extLst>
           </p:cNvPr>
@@ -6142,7 +6142,7 @@
           <p:cNvPr id="4" name="Content Placeholder 3">
             <a:extLst>
               <a:ext uri="{FF2B5EF4-FFF2-40B4-BE49-F238E27FC236}">
-                <a16:creationId xmlns:a16="http://schemas.microsoft.com/office/drawing/2014/main" xmlns="" id="{9A7582C2-B5CC-4711-9A9D-467B3F65E7F9}"/>
+                <a16:creationId xmlns="" xmlns:a16="http://schemas.microsoft.com/office/drawing/2014/main" id="{9A7582C2-B5CC-4711-9A9D-467B3F65E7F9}"/>
               </a:ext>
             </a:extLst>
           </p:cNvPr>
@@ -6205,7 +6205,7 @@
           <p:cNvPr id="5" name="Text Placeholder 4">
             <a:extLst>
               <a:ext uri="{FF2B5EF4-FFF2-40B4-BE49-F238E27FC236}">
-                <a16:creationId xmlns:a16="http://schemas.microsoft.com/office/drawing/2014/main" xmlns="" id="{B7C39FE8-6295-4121-BCE1-88234991047B}"/>
+                <a16:creationId xmlns="" xmlns:a16="http://schemas.microsoft.com/office/drawing/2014/main" id="{B7C39FE8-6295-4121-BCE1-88234991047B}"/>
               </a:ext>
             </a:extLst>
           </p:cNvPr>
@@ -6276,7 +6276,7 @@
           <p:cNvPr id="6" name="Content Placeholder 5">
             <a:extLst>
               <a:ext uri="{FF2B5EF4-FFF2-40B4-BE49-F238E27FC236}">
-                <a16:creationId xmlns:a16="http://schemas.microsoft.com/office/drawing/2014/main" xmlns="" id="{493D5A10-2714-484D-8890-E36FB887399C}"/>
+                <a16:creationId xmlns="" xmlns:a16="http://schemas.microsoft.com/office/drawing/2014/main" id="{493D5A10-2714-484D-8890-E36FB887399C}"/>
               </a:ext>
             </a:extLst>
           </p:cNvPr>
@@ -6339,7 +6339,7 @@
           <p:cNvPr id="7" name="Date Placeholder 6">
             <a:extLst>
               <a:ext uri="{FF2B5EF4-FFF2-40B4-BE49-F238E27FC236}">
-                <a16:creationId xmlns:a16="http://schemas.microsoft.com/office/drawing/2014/main" xmlns="" id="{044C0ACC-6DB4-421D-964A-67DA3F2E1412}"/>
+                <a16:creationId xmlns="" xmlns:a16="http://schemas.microsoft.com/office/drawing/2014/main" id="{044C0ACC-6DB4-421D-964A-67DA3F2E1412}"/>
               </a:ext>
             </a:extLst>
           </p:cNvPr>
@@ -6365,7 +6365,7 @@
           <p:cNvPr id="8" name="Footer Placeholder 7">
             <a:extLst>
               <a:ext uri="{FF2B5EF4-FFF2-40B4-BE49-F238E27FC236}">
-                <a16:creationId xmlns:a16="http://schemas.microsoft.com/office/drawing/2014/main" xmlns="" id="{1746347F-C8BE-4B4B-A1D9-D1C0DF33B437}"/>
+                <a16:creationId xmlns="" xmlns:a16="http://schemas.microsoft.com/office/drawing/2014/main" id="{1746347F-C8BE-4B4B-A1D9-D1C0DF33B437}"/>
               </a:ext>
             </a:extLst>
           </p:cNvPr>
@@ -6391,7 +6391,7 @@
           <p:cNvPr id="9" name="Slide Number Placeholder 8">
             <a:extLst>
               <a:ext uri="{FF2B5EF4-FFF2-40B4-BE49-F238E27FC236}">
-                <a16:creationId xmlns:a16="http://schemas.microsoft.com/office/drawing/2014/main" xmlns="" id="{A4FFBFB5-8765-4803-B151-9522B42A1D15}"/>
+                <a16:creationId xmlns="" xmlns:a16="http://schemas.microsoft.com/office/drawing/2014/main" id="{A4FFBFB5-8765-4803-B151-9522B42A1D15}"/>
               </a:ext>
             </a:extLst>
           </p:cNvPr>
@@ -6450,7 +6450,7 @@
           <p:cNvPr id="2" name="Title 1">
             <a:extLst>
               <a:ext uri="{FF2B5EF4-FFF2-40B4-BE49-F238E27FC236}">
-                <a16:creationId xmlns:a16="http://schemas.microsoft.com/office/drawing/2014/main" xmlns="" id="{E2ACA9D4-34A0-474D-8103-7FF6B3C815B8}"/>
+                <a16:creationId xmlns="" xmlns:a16="http://schemas.microsoft.com/office/drawing/2014/main" id="{E2ACA9D4-34A0-474D-8103-7FF6B3C815B8}"/>
               </a:ext>
             </a:extLst>
           </p:cNvPr>
@@ -6479,7 +6479,7 @@
           <p:cNvPr id="3" name="Date Placeholder 2">
             <a:extLst>
               <a:ext uri="{FF2B5EF4-FFF2-40B4-BE49-F238E27FC236}">
-                <a16:creationId xmlns:a16="http://schemas.microsoft.com/office/drawing/2014/main" xmlns="" id="{69DBCBC1-D830-4EA6-9888-95EFC9B0E732}"/>
+                <a16:creationId xmlns="" xmlns:a16="http://schemas.microsoft.com/office/drawing/2014/main" id="{69DBCBC1-D830-4EA6-9888-95EFC9B0E732}"/>
               </a:ext>
             </a:extLst>
           </p:cNvPr>
@@ -6505,7 +6505,7 @@
           <p:cNvPr id="4" name="Footer Placeholder 3">
             <a:extLst>
               <a:ext uri="{FF2B5EF4-FFF2-40B4-BE49-F238E27FC236}">
-                <a16:creationId xmlns:a16="http://schemas.microsoft.com/office/drawing/2014/main" xmlns="" id="{0DDF4A73-0A96-46BD-8336-6E3B8A914FF6}"/>
+                <a16:creationId xmlns="" xmlns:a16="http://schemas.microsoft.com/office/drawing/2014/main" id="{0DDF4A73-0A96-46BD-8336-6E3B8A914FF6}"/>
               </a:ext>
             </a:extLst>
           </p:cNvPr>
@@ -6531,7 +6531,7 @@
           <p:cNvPr id="5" name="Slide Number Placeholder 4">
             <a:extLst>
               <a:ext uri="{FF2B5EF4-FFF2-40B4-BE49-F238E27FC236}">
-                <a16:creationId xmlns:a16="http://schemas.microsoft.com/office/drawing/2014/main" xmlns="" id="{104B0559-D767-4CC5-BE93-1EA77833DC3D}"/>
+                <a16:creationId xmlns="" xmlns:a16="http://schemas.microsoft.com/office/drawing/2014/main" id="{104B0559-D767-4CC5-BE93-1EA77833DC3D}"/>
               </a:ext>
             </a:extLst>
           </p:cNvPr>
@@ -6590,7 +6590,7 @@
           <p:cNvPr id="2" name="Date Placeholder 1">
             <a:extLst>
               <a:ext uri="{FF2B5EF4-FFF2-40B4-BE49-F238E27FC236}">
-                <a16:creationId xmlns:a16="http://schemas.microsoft.com/office/drawing/2014/main" xmlns="" id="{91798AE8-4B22-447B-840A-C9AE491B394D}"/>
+                <a16:creationId xmlns="" xmlns:a16="http://schemas.microsoft.com/office/drawing/2014/main" id="{91798AE8-4B22-447B-840A-C9AE491B394D}"/>
               </a:ext>
             </a:extLst>
           </p:cNvPr>
@@ -6616,7 +6616,7 @@
           <p:cNvPr id="3" name="Footer Placeholder 2">
             <a:extLst>
               <a:ext uri="{FF2B5EF4-FFF2-40B4-BE49-F238E27FC236}">
-                <a16:creationId xmlns:a16="http://schemas.microsoft.com/office/drawing/2014/main" xmlns="" id="{BF633C48-ADE8-4BCD-A140-CD6FCA64A18B}"/>
+                <a16:creationId xmlns="" xmlns:a16="http://schemas.microsoft.com/office/drawing/2014/main" id="{BF633C48-ADE8-4BCD-A140-CD6FCA64A18B}"/>
               </a:ext>
             </a:extLst>
           </p:cNvPr>
@@ -6642,7 +6642,7 @@
           <p:cNvPr id="4" name="Slide Number Placeholder 3">
             <a:extLst>
               <a:ext uri="{FF2B5EF4-FFF2-40B4-BE49-F238E27FC236}">
-                <a16:creationId xmlns:a16="http://schemas.microsoft.com/office/drawing/2014/main" xmlns="" id="{5A437E5F-0D2A-402F-A638-E6219D870D1E}"/>
+                <a16:creationId xmlns="" xmlns:a16="http://schemas.microsoft.com/office/drawing/2014/main" id="{5A437E5F-0D2A-402F-A638-E6219D870D1E}"/>
               </a:ext>
             </a:extLst>
           </p:cNvPr>
@@ -6702,7 +6702,7 @@
           <p:cNvPr id="2" name="Title 1">
             <a:extLst>
               <a:ext uri="{FF2B5EF4-FFF2-40B4-BE49-F238E27FC236}">
-                <a16:creationId xmlns:a16="http://schemas.microsoft.com/office/drawing/2014/main" xmlns="" id="{AADFE01B-DB16-43DB-B032-5A93A6111197}"/>
+                <a16:creationId xmlns="" xmlns:a16="http://schemas.microsoft.com/office/drawing/2014/main" id="{AADFE01B-DB16-43DB-B032-5A93A6111197}"/>
               </a:ext>
             </a:extLst>
           </p:cNvPr>
@@ -6740,7 +6740,7 @@
           <p:cNvPr id="3" name="Content Placeholder 2">
             <a:extLst>
               <a:ext uri="{FF2B5EF4-FFF2-40B4-BE49-F238E27FC236}">
-                <a16:creationId xmlns:a16="http://schemas.microsoft.com/office/drawing/2014/main" xmlns="" id="{867460B4-F97D-4C87-9E8D-5FAD3214C82A}"/>
+                <a16:creationId xmlns="" xmlns:a16="http://schemas.microsoft.com/office/drawing/2014/main" id="{867460B4-F97D-4C87-9E8D-5FAD3214C82A}"/>
               </a:ext>
             </a:extLst>
           </p:cNvPr>
@@ -6831,7 +6831,7 @@
           <p:cNvPr id="4" name="Text Placeholder 3">
             <a:extLst>
               <a:ext uri="{FF2B5EF4-FFF2-40B4-BE49-F238E27FC236}">
-                <a16:creationId xmlns:a16="http://schemas.microsoft.com/office/drawing/2014/main" xmlns="" id="{46238EC0-42FF-4F2F-858C-4BBE644D06B5}"/>
+                <a16:creationId xmlns="" xmlns:a16="http://schemas.microsoft.com/office/drawing/2014/main" id="{46238EC0-42FF-4F2F-858C-4BBE644D06B5}"/>
               </a:ext>
             </a:extLst>
           </p:cNvPr>
@@ -6902,7 +6902,7 @@
           <p:cNvPr id="5" name="Date Placeholder 4">
             <a:extLst>
               <a:ext uri="{FF2B5EF4-FFF2-40B4-BE49-F238E27FC236}">
-                <a16:creationId xmlns:a16="http://schemas.microsoft.com/office/drawing/2014/main" xmlns="" id="{7B4C5D92-4B63-4927-A417-B61BE17EF01F}"/>
+                <a16:creationId xmlns="" xmlns:a16="http://schemas.microsoft.com/office/drawing/2014/main" id="{7B4C5D92-4B63-4927-A417-B61BE17EF01F}"/>
               </a:ext>
             </a:extLst>
           </p:cNvPr>
@@ -6928,7 +6928,7 @@
           <p:cNvPr id="6" name="Footer Placeholder 5">
             <a:extLst>
               <a:ext uri="{FF2B5EF4-FFF2-40B4-BE49-F238E27FC236}">
-                <a16:creationId xmlns:a16="http://schemas.microsoft.com/office/drawing/2014/main" xmlns="" id="{67E2A5EF-B2D4-4516-99CB-9B0824FE35B8}"/>
+                <a16:creationId xmlns="" xmlns:a16="http://schemas.microsoft.com/office/drawing/2014/main" id="{67E2A5EF-B2D4-4516-99CB-9B0824FE35B8}"/>
               </a:ext>
             </a:extLst>
           </p:cNvPr>
@@ -6954,7 +6954,7 @@
           <p:cNvPr id="7" name="Slide Number Placeholder 6">
             <a:extLst>
               <a:ext uri="{FF2B5EF4-FFF2-40B4-BE49-F238E27FC236}">
-                <a16:creationId xmlns:a16="http://schemas.microsoft.com/office/drawing/2014/main" xmlns="" id="{8F85532E-9B60-4F6E-824E-6EA1F3C55D1E}"/>
+                <a16:creationId xmlns="" xmlns:a16="http://schemas.microsoft.com/office/drawing/2014/main" id="{8F85532E-9B60-4F6E-824E-6EA1F3C55D1E}"/>
               </a:ext>
             </a:extLst>
           </p:cNvPr>
@@ -7013,7 +7013,7 @@
           <p:cNvPr id="2" name="Title 1">
             <a:extLst>
               <a:ext uri="{FF2B5EF4-FFF2-40B4-BE49-F238E27FC236}">
-                <a16:creationId xmlns:a16="http://schemas.microsoft.com/office/drawing/2014/main" xmlns="" id="{074AB8FB-BD6C-4BC7-994C-FC5ED1ADE20C}"/>
+                <a16:creationId xmlns="" xmlns:a16="http://schemas.microsoft.com/office/drawing/2014/main" id="{074AB8FB-BD6C-4BC7-994C-FC5ED1ADE20C}"/>
               </a:ext>
             </a:extLst>
           </p:cNvPr>
@@ -7051,7 +7051,7 @@
           <p:cNvPr id="3" name="Picture Placeholder 2">
             <a:extLst>
               <a:ext uri="{FF2B5EF4-FFF2-40B4-BE49-F238E27FC236}">
-                <a16:creationId xmlns:a16="http://schemas.microsoft.com/office/drawing/2014/main" xmlns="" id="{6DB84D36-3C2A-4655-83F9-A5655720DE62}"/>
+                <a16:creationId xmlns="" xmlns:a16="http://schemas.microsoft.com/office/drawing/2014/main" id="{6DB84D36-3C2A-4655-83F9-A5655720DE62}"/>
               </a:ext>
             </a:extLst>
           </p:cNvPr>
@@ -7118,7 +7118,7 @@
           <p:cNvPr id="4" name="Text Placeholder 3">
             <a:extLst>
               <a:ext uri="{FF2B5EF4-FFF2-40B4-BE49-F238E27FC236}">
-                <a16:creationId xmlns:a16="http://schemas.microsoft.com/office/drawing/2014/main" xmlns="" id="{7BEF2EA5-9F1E-4971-82DC-2017F3205D93}"/>
+                <a16:creationId xmlns="" xmlns:a16="http://schemas.microsoft.com/office/drawing/2014/main" id="{7BEF2EA5-9F1E-4971-82DC-2017F3205D93}"/>
               </a:ext>
             </a:extLst>
           </p:cNvPr>
@@ -7189,7 +7189,7 @@
           <p:cNvPr id="5" name="Date Placeholder 4">
             <a:extLst>
               <a:ext uri="{FF2B5EF4-FFF2-40B4-BE49-F238E27FC236}">
-                <a16:creationId xmlns:a16="http://schemas.microsoft.com/office/drawing/2014/main" xmlns="" id="{02F37736-77B3-492F-9600-3EE9D6F4B203}"/>
+                <a16:creationId xmlns="" xmlns:a16="http://schemas.microsoft.com/office/drawing/2014/main" id="{02F37736-77B3-492F-9600-3EE9D6F4B203}"/>
               </a:ext>
             </a:extLst>
           </p:cNvPr>
@@ -7215,7 +7215,7 @@
           <p:cNvPr id="6" name="Footer Placeholder 5">
             <a:extLst>
               <a:ext uri="{FF2B5EF4-FFF2-40B4-BE49-F238E27FC236}">
-                <a16:creationId xmlns:a16="http://schemas.microsoft.com/office/drawing/2014/main" xmlns="" id="{744CBED0-0B25-4110-9D0F-BB8F8E84C85B}"/>
+                <a16:creationId xmlns="" xmlns:a16="http://schemas.microsoft.com/office/drawing/2014/main" id="{744CBED0-0B25-4110-9D0F-BB8F8E84C85B}"/>
               </a:ext>
             </a:extLst>
           </p:cNvPr>
@@ -7241,7 +7241,7 @@
           <p:cNvPr id="7" name="Slide Number Placeholder 6">
             <a:extLst>
               <a:ext uri="{FF2B5EF4-FFF2-40B4-BE49-F238E27FC236}">
-                <a16:creationId xmlns:a16="http://schemas.microsoft.com/office/drawing/2014/main" xmlns="" id="{36D9B507-F7D4-437D-A0DE-0F3F20DD77C0}"/>
+                <a16:creationId xmlns="" xmlns:a16="http://schemas.microsoft.com/office/drawing/2014/main" id="{36D9B507-F7D4-437D-A0DE-0F3F20DD77C0}"/>
               </a:ext>
             </a:extLst>
           </p:cNvPr>
@@ -7306,7 +7306,7 @@
           <p:cNvPr id="2" name="Picture 1">
             <a:extLst>
               <a:ext uri="{FF2B5EF4-FFF2-40B4-BE49-F238E27FC236}">
-                <a16:creationId xmlns:a16="http://schemas.microsoft.com/office/drawing/2014/main" xmlns="" id="{C9CFD144-2481-41BF-B3E6-72CDD3DB6005}"/>
+                <a16:creationId xmlns="" xmlns:a16="http://schemas.microsoft.com/office/drawing/2014/main" id="{C9CFD144-2481-41BF-B3E6-72CDD3DB6005}"/>
               </a:ext>
             </a:extLst>
           </p:cNvPr>
@@ -7344,7 +7344,7 @@
           <p:cNvPr id="3" name="Title Placeholder 2">
             <a:extLst>
               <a:ext uri="{FF2B5EF4-FFF2-40B4-BE49-F238E27FC236}">
-                <a16:creationId xmlns:a16="http://schemas.microsoft.com/office/drawing/2014/main" xmlns="" id="{0A81FFCD-9064-415F-B75C-D7BDA1528F01}"/>
+                <a16:creationId xmlns="" xmlns:a16="http://schemas.microsoft.com/office/drawing/2014/main" id="{0A81FFCD-9064-415F-B75C-D7BDA1528F01}"/>
               </a:ext>
             </a:extLst>
           </p:cNvPr>
@@ -7383,7 +7383,7 @@
           <p:cNvPr id="4" name="Text Placeholder 3">
             <a:extLst>
               <a:ext uri="{FF2B5EF4-FFF2-40B4-BE49-F238E27FC236}">
-                <a16:creationId xmlns:a16="http://schemas.microsoft.com/office/drawing/2014/main" xmlns="" id="{95D643FD-C334-4B25-A967-795137C50EF3}"/>
+                <a16:creationId xmlns="" xmlns:a16="http://schemas.microsoft.com/office/drawing/2014/main" id="{95D643FD-C334-4B25-A967-795137C50EF3}"/>
               </a:ext>
             </a:extLst>
           </p:cNvPr>
@@ -7455,7 +7455,7 @@
           <p:cNvPr id="5" name="Date Placeholder 4">
             <a:extLst>
               <a:ext uri="{FF2B5EF4-FFF2-40B4-BE49-F238E27FC236}">
-                <a16:creationId xmlns:a16="http://schemas.microsoft.com/office/drawing/2014/main" xmlns="" id="{04200538-592E-4E7B-83D4-71242B8FBF2E}"/>
+                <a16:creationId xmlns="" xmlns:a16="http://schemas.microsoft.com/office/drawing/2014/main" id="{04200538-592E-4E7B-83D4-71242B8FBF2E}"/>
               </a:ext>
             </a:extLst>
           </p:cNvPr>
@@ -7508,7 +7508,7 @@
           <p:cNvPr id="6" name="Footer Placeholder 5">
             <a:extLst>
               <a:ext uri="{FF2B5EF4-FFF2-40B4-BE49-F238E27FC236}">
-                <a16:creationId xmlns:a16="http://schemas.microsoft.com/office/drawing/2014/main" xmlns="" id="{FD73B696-90F0-40F5-B262-AB517FE80FB1}"/>
+                <a16:creationId xmlns="" xmlns:a16="http://schemas.microsoft.com/office/drawing/2014/main" id="{FD73B696-90F0-40F5-B262-AB517FE80FB1}"/>
               </a:ext>
             </a:extLst>
           </p:cNvPr>
@@ -7561,7 +7561,7 @@
           <p:cNvPr id="7" name="Slide Number Placeholder 6">
             <a:extLst>
               <a:ext uri="{FF2B5EF4-FFF2-40B4-BE49-F238E27FC236}">
-                <a16:creationId xmlns:a16="http://schemas.microsoft.com/office/drawing/2014/main" xmlns="" id="{D3A400BB-55BC-4DF1-A6DE-B743EA088748}"/>
+                <a16:creationId xmlns="" xmlns:a16="http://schemas.microsoft.com/office/drawing/2014/main" id="{D3A400BB-55BC-4DF1-A6DE-B743EA088748}"/>
               </a:ext>
             </a:extLst>
           </p:cNvPr>
@@ -7617,7 +7617,7 @@
           <p:cNvPr id="8" name="Picture 7">
             <a:extLst>
               <a:ext uri="{FF2B5EF4-FFF2-40B4-BE49-F238E27FC236}">
-                <a16:creationId xmlns:a16="http://schemas.microsoft.com/office/drawing/2014/main" xmlns="" id="{EAFBDD54-8C5A-4084-9547-F9ABA1A099D3}"/>
+                <a16:creationId xmlns="" xmlns:a16="http://schemas.microsoft.com/office/drawing/2014/main" id="{EAFBDD54-8C5A-4084-9547-F9ABA1A099D3}"/>
               </a:ext>
             </a:extLst>
           </p:cNvPr>
@@ -7969,7 +7969,7 @@
           <p:cNvPr id="2" name="Picture 1">
             <a:extLst>
               <a:ext uri="{FF2B5EF4-FFF2-40B4-BE49-F238E27FC236}">
-                <a16:creationId xmlns:a16="http://schemas.microsoft.com/office/drawing/2014/main" xmlns="" id="{BF28FB87-1D84-4A19-9386-1376E432A025}"/>
+                <a16:creationId xmlns="" xmlns:a16="http://schemas.microsoft.com/office/drawing/2014/main" id="{BF28FB87-1D84-4A19-9386-1376E432A025}"/>
               </a:ext>
             </a:extLst>
           </p:cNvPr>
@@ -8007,7 +8007,7 @@
           <p:cNvPr id="3" name="Picture 2">
             <a:extLst>
               <a:ext uri="{FF2B5EF4-FFF2-40B4-BE49-F238E27FC236}">
-                <a16:creationId xmlns:a16="http://schemas.microsoft.com/office/drawing/2014/main" xmlns="" id="{9CA362F5-D86C-4B88-B187-57191570D4E8}"/>
+                <a16:creationId xmlns="" xmlns:a16="http://schemas.microsoft.com/office/drawing/2014/main" id="{9CA362F5-D86C-4B88-B187-57191570D4E8}"/>
               </a:ext>
             </a:extLst>
           </p:cNvPr>
@@ -8045,7 +8045,7 @@
           <p:cNvPr id="4" name="Title Placeholder 3">
             <a:extLst>
               <a:ext uri="{FF2B5EF4-FFF2-40B4-BE49-F238E27FC236}">
-                <a16:creationId xmlns:a16="http://schemas.microsoft.com/office/drawing/2014/main" xmlns="" id="{694CBD95-455C-4308-A58D-1DAE10B7CE7C}"/>
+                <a16:creationId xmlns="" xmlns:a16="http://schemas.microsoft.com/office/drawing/2014/main" id="{694CBD95-455C-4308-A58D-1DAE10B7CE7C}"/>
               </a:ext>
             </a:extLst>
           </p:cNvPr>
@@ -8082,7 +8082,7 @@
           <p:cNvPr id="5" name="Text Placeholder 4">
             <a:extLst>
               <a:ext uri="{FF2B5EF4-FFF2-40B4-BE49-F238E27FC236}">
-                <a16:creationId xmlns:a16="http://schemas.microsoft.com/office/drawing/2014/main" xmlns="" id="{39AB785B-A173-40EB-9610-3A55700F2FF7}"/>
+                <a16:creationId xmlns="" xmlns:a16="http://schemas.microsoft.com/office/drawing/2014/main" id="{39AB785B-A173-40EB-9610-3A55700F2FF7}"/>
               </a:ext>
             </a:extLst>
           </p:cNvPr>
@@ -8154,7 +8154,7 @@
           <p:cNvPr id="6" name="Date Placeholder 5">
             <a:extLst>
               <a:ext uri="{FF2B5EF4-FFF2-40B4-BE49-F238E27FC236}">
-                <a16:creationId xmlns:a16="http://schemas.microsoft.com/office/drawing/2014/main" xmlns="" id="{85E089E5-E7C3-422D-BACA-7E9BDA13DDE7}"/>
+                <a16:creationId xmlns="" xmlns:a16="http://schemas.microsoft.com/office/drawing/2014/main" id="{85E089E5-E7C3-422D-BACA-7E9BDA13DDE7}"/>
               </a:ext>
             </a:extLst>
           </p:cNvPr>
@@ -8204,7 +8204,7 @@
           <p:cNvPr id="7" name="TextBox 6">
             <a:extLst>
               <a:ext uri="{FF2B5EF4-FFF2-40B4-BE49-F238E27FC236}">
-                <a16:creationId xmlns:a16="http://schemas.microsoft.com/office/drawing/2014/main" xmlns="" id="{00BB770F-8C8F-458D-8E32-2FAEDAD83DE2}"/>
+                <a16:creationId xmlns="" xmlns:a16="http://schemas.microsoft.com/office/drawing/2014/main" id="{00BB770F-8C8F-458D-8E32-2FAEDAD83DE2}"/>
               </a:ext>
             </a:extLst>
           </p:cNvPr>
@@ -8250,7 +8250,7 @@
           <p:cNvPr id="8" name="TextBox 7">
             <a:extLst>
               <a:ext uri="{FF2B5EF4-FFF2-40B4-BE49-F238E27FC236}">
-                <a16:creationId xmlns:a16="http://schemas.microsoft.com/office/drawing/2014/main" xmlns="" id="{A2734B8D-563C-4A35-92EC-D5173CB9A8F9}"/>
+                <a16:creationId xmlns="" xmlns:a16="http://schemas.microsoft.com/office/drawing/2014/main" id="{A2734B8D-563C-4A35-92EC-D5173CB9A8F9}"/>
               </a:ext>
             </a:extLst>
           </p:cNvPr>
@@ -8296,7 +8296,7 @@
           <p:cNvPr id="9" name="TextBox 8">
             <a:extLst>
               <a:ext uri="{FF2B5EF4-FFF2-40B4-BE49-F238E27FC236}">
-                <a16:creationId xmlns:a16="http://schemas.microsoft.com/office/drawing/2014/main" xmlns="" id="{66765670-DA0B-44CF-A062-76D607CD68FB}"/>
+                <a16:creationId xmlns="" xmlns:a16="http://schemas.microsoft.com/office/drawing/2014/main" id="{66765670-DA0B-44CF-A062-76D607CD68FB}"/>
               </a:ext>
             </a:extLst>
           </p:cNvPr>
@@ -8653,7 +8653,7 @@
           <p:cNvPr id="2" name="Title 1">
             <a:extLst>
               <a:ext uri="{FF2B5EF4-FFF2-40B4-BE49-F238E27FC236}">
-                <a16:creationId xmlns:a16="http://schemas.microsoft.com/office/drawing/2014/main" xmlns="" id="{05011E12-7150-4C36-BBA8-F106C588CBBD}"/>
+                <a16:creationId xmlns="" xmlns:a16="http://schemas.microsoft.com/office/drawing/2014/main" id="{05011E12-7150-4C36-BBA8-F106C588CBBD}"/>
               </a:ext>
             </a:extLst>
           </p:cNvPr>
@@ -8698,7 +8698,7 @@
           <p:cNvPr id="3" name="TextBox 2">
             <a:extLst>
               <a:ext uri="{FF2B5EF4-FFF2-40B4-BE49-F238E27FC236}">
-                <a16:creationId xmlns:a16="http://schemas.microsoft.com/office/drawing/2014/main" xmlns="" id="{0A8F9668-7009-4920-888F-FBEF04A785B5}"/>
+                <a16:creationId xmlns="" xmlns:a16="http://schemas.microsoft.com/office/drawing/2014/main" id="{0A8F9668-7009-4920-888F-FBEF04A785B5}"/>
               </a:ext>
             </a:extLst>
           </p:cNvPr>
@@ -8940,7 +8940,7 @@
           <p:cNvPr id="7" name="TextBox 6">
             <a:extLst>
               <a:ext uri="{FF2B5EF4-FFF2-40B4-BE49-F238E27FC236}">
-                <a16:creationId xmlns:a16="http://schemas.microsoft.com/office/drawing/2014/main" xmlns="" id="{AB631E0B-CBFA-445A-B6D7-EBB2CBD60FBE}"/>
+                <a16:creationId xmlns="" xmlns:a16="http://schemas.microsoft.com/office/drawing/2014/main" id="{AB631E0B-CBFA-445A-B6D7-EBB2CBD60FBE}"/>
               </a:ext>
             </a:extLst>
           </p:cNvPr>
@@ -11501,7 +11501,7 @@
           <p:cNvPr id="2" name="Text Placeholder 1">
             <a:extLst>
               <a:ext uri="{FF2B5EF4-FFF2-40B4-BE49-F238E27FC236}">
-                <a16:creationId xmlns:a16="http://schemas.microsoft.com/office/drawing/2014/main" xmlns="" id="{EDD1A4F7-5140-4806-AAC6-A62599D30848}"/>
+                <a16:creationId xmlns="" xmlns:a16="http://schemas.microsoft.com/office/drawing/2014/main" id="{EDD1A4F7-5140-4806-AAC6-A62599D30848}"/>
               </a:ext>
             </a:extLst>
           </p:cNvPr>
@@ -11817,7 +11817,7 @@
           <p:cNvPr id="2" name="Title 1">
             <a:extLst>
               <a:ext uri="{FF2B5EF4-FFF2-40B4-BE49-F238E27FC236}">
-                <a16:creationId xmlns:a16="http://schemas.microsoft.com/office/drawing/2014/main" xmlns="" id="{8B40FE1C-B941-41B6-BE8A-B92E5071EA34}"/>
+                <a16:creationId xmlns="" xmlns:a16="http://schemas.microsoft.com/office/drawing/2014/main" id="{8B40FE1C-B941-41B6-BE8A-B92E5071EA34}"/>
               </a:ext>
             </a:extLst>
           </p:cNvPr>
@@ -11851,7 +11851,7 @@
           <p:cNvPr id="3" name="Text Placeholder 2">
             <a:extLst>
               <a:ext uri="{FF2B5EF4-FFF2-40B4-BE49-F238E27FC236}">
-                <a16:creationId xmlns:a16="http://schemas.microsoft.com/office/drawing/2014/main" xmlns="" id="{B1A800F4-7B45-4E8B-8E73-1F3CE53DD688}"/>
+                <a16:creationId xmlns="" xmlns:a16="http://schemas.microsoft.com/office/drawing/2014/main" id="{B1A800F4-7B45-4E8B-8E73-1F3CE53DD688}"/>
               </a:ext>
             </a:extLst>
           </p:cNvPr>
@@ -11957,7 +11957,7 @@
           <p:cNvPr id="2" name="Title 1">
             <a:extLst>
               <a:ext uri="{FF2B5EF4-FFF2-40B4-BE49-F238E27FC236}">
-                <a16:creationId xmlns:a16="http://schemas.microsoft.com/office/drawing/2014/main" xmlns="" id="{BB2D6542-FCC7-46F3-BA25-4D395007C678}"/>
+                <a16:creationId xmlns="" xmlns:a16="http://schemas.microsoft.com/office/drawing/2014/main" id="{BB2D6542-FCC7-46F3-BA25-4D395007C678}"/>
               </a:ext>
             </a:extLst>
           </p:cNvPr>
@@ -11991,7 +11991,7 @@
           <p:cNvPr id="3" name="Text Placeholder 2">
             <a:extLst>
               <a:ext uri="{FF2B5EF4-FFF2-40B4-BE49-F238E27FC236}">
-                <a16:creationId xmlns:a16="http://schemas.microsoft.com/office/drawing/2014/main" xmlns="" id="{A7DF62E9-C9DC-431C-8017-84C721E0190C}"/>
+                <a16:creationId xmlns="" xmlns:a16="http://schemas.microsoft.com/office/drawing/2014/main" id="{A7DF62E9-C9DC-431C-8017-84C721E0190C}"/>
               </a:ext>
             </a:extLst>
           </p:cNvPr>
@@ -12344,7 +12344,7 @@
           <p:cNvPr id="2" name="Title 1">
             <a:extLst>
               <a:ext uri="{FF2B5EF4-FFF2-40B4-BE49-F238E27FC236}">
-                <a16:creationId xmlns:a16="http://schemas.microsoft.com/office/drawing/2014/main" xmlns="" id="{07DA3091-5982-4260-921E-1C967D7A4B5B}"/>
+                <a16:creationId xmlns="" xmlns:a16="http://schemas.microsoft.com/office/drawing/2014/main" id="{07DA3091-5982-4260-921E-1C967D7A4B5B}"/>
               </a:ext>
             </a:extLst>
           </p:cNvPr>
@@ -12378,7 +12378,7 @@
           <p:cNvPr id="3" name="Text Placeholder 2">
             <a:extLst>
               <a:ext uri="{FF2B5EF4-FFF2-40B4-BE49-F238E27FC236}">
-                <a16:creationId xmlns:a16="http://schemas.microsoft.com/office/drawing/2014/main" xmlns="" id="{E8388A85-DB26-4BD1-B823-BED96DD920BA}"/>
+                <a16:creationId xmlns="" xmlns:a16="http://schemas.microsoft.com/office/drawing/2014/main" id="{E8388A85-DB26-4BD1-B823-BED96DD920BA}"/>
               </a:ext>
             </a:extLst>
           </p:cNvPr>
@@ -12691,7 +12691,7 @@
           <p:cNvPr id="2" name="Title 1">
             <a:extLst>
               <a:ext uri="{FF2B5EF4-FFF2-40B4-BE49-F238E27FC236}">
-                <a16:creationId xmlns:a16="http://schemas.microsoft.com/office/drawing/2014/main" xmlns="" id="{99BDD657-E132-42DD-A352-90D29F73337A}"/>
+                <a16:creationId xmlns="" xmlns:a16="http://schemas.microsoft.com/office/drawing/2014/main" id="{99BDD657-E132-42DD-A352-90D29F73337A}"/>
               </a:ext>
             </a:extLst>
           </p:cNvPr>
@@ -12725,7 +12725,7 @@
           <p:cNvPr id="3" name="Text Placeholder 2">
             <a:extLst>
               <a:ext uri="{FF2B5EF4-FFF2-40B4-BE49-F238E27FC236}">
-                <a16:creationId xmlns:a16="http://schemas.microsoft.com/office/drawing/2014/main" xmlns="" id="{D318E4CD-4906-4E5B-9221-79C4FA1A366C}"/>
+                <a16:creationId xmlns="" xmlns:a16="http://schemas.microsoft.com/office/drawing/2014/main" id="{D318E4CD-4906-4E5B-9221-79C4FA1A366C}"/>
               </a:ext>
             </a:extLst>
           </p:cNvPr>
@@ -13006,7 +13006,7 @@
           <p:cNvPr id="2" name="Title 1">
             <a:extLst>
               <a:ext uri="{FF2B5EF4-FFF2-40B4-BE49-F238E27FC236}">
-                <a16:creationId xmlns:a16="http://schemas.microsoft.com/office/drawing/2014/main" xmlns="" id="{AB53D059-0895-49BB-9D3D-12F4922FF2F1}"/>
+                <a16:creationId xmlns="" xmlns:a16="http://schemas.microsoft.com/office/drawing/2014/main" id="{AB53D059-0895-49BB-9D3D-12F4922FF2F1}"/>
               </a:ext>
             </a:extLst>
           </p:cNvPr>
@@ -13040,7 +13040,7 @@
           <p:cNvPr id="3" name="Text Placeholder 2">
             <a:extLst>
               <a:ext uri="{FF2B5EF4-FFF2-40B4-BE49-F238E27FC236}">
-                <a16:creationId xmlns:a16="http://schemas.microsoft.com/office/drawing/2014/main" xmlns="" id="{44751E96-821B-486D-AADC-087BA6798614}"/>
+                <a16:creationId xmlns="" xmlns:a16="http://schemas.microsoft.com/office/drawing/2014/main" id="{44751E96-821B-486D-AADC-087BA6798614}"/>
               </a:ext>
             </a:extLst>
           </p:cNvPr>
@@ -13316,7 +13316,7 @@
           <p:cNvPr id="2" name="Text Placeholder 1">
             <a:extLst>
               <a:ext uri="{FF2B5EF4-FFF2-40B4-BE49-F238E27FC236}">
-                <a16:creationId xmlns:a16="http://schemas.microsoft.com/office/drawing/2014/main" xmlns="" id="{C255E9E5-049E-4D01-9A18-0C5899A8DEBD}"/>
+                <a16:creationId xmlns="" xmlns:a16="http://schemas.microsoft.com/office/drawing/2014/main" id="{C255E9E5-049E-4D01-9A18-0C5899A8DEBD}"/>
               </a:ext>
             </a:extLst>
           </p:cNvPr>
@@ -13449,7 +13449,7 @@
           <p:cNvPr id="2" name="Text Placeholder 1">
             <a:extLst>
               <a:ext uri="{FF2B5EF4-FFF2-40B4-BE49-F238E27FC236}">
-                <a16:creationId xmlns:a16="http://schemas.microsoft.com/office/drawing/2014/main" xmlns="" id="{68CAB51A-FAF6-4160-8156-35AF7E423D9B}"/>
+                <a16:creationId xmlns="" xmlns:a16="http://schemas.microsoft.com/office/drawing/2014/main" id="{68CAB51A-FAF6-4160-8156-35AF7E423D9B}"/>
               </a:ext>
             </a:extLst>
           </p:cNvPr>
@@ -13492,7 +13492,7 @@
           <p:cNvPr id="3" name="Picture 2">
             <a:extLst>
               <a:ext uri="{FF2B5EF4-FFF2-40B4-BE49-F238E27FC236}">
-                <a16:creationId xmlns:a16="http://schemas.microsoft.com/office/drawing/2014/main" xmlns="" id="{DEC3AB5D-3DBD-4C19-964B-E0B5050AC7DF}"/>
+                <a16:creationId xmlns="" xmlns:a16="http://schemas.microsoft.com/office/drawing/2014/main" id="{DEC3AB5D-3DBD-4C19-964B-E0B5050AC7DF}"/>
               </a:ext>
             </a:extLst>
           </p:cNvPr>
@@ -13530,7 +13530,7 @@
           <p:cNvPr id="4" name="Freeform: Shape 3">
             <a:extLst>
               <a:ext uri="{FF2B5EF4-FFF2-40B4-BE49-F238E27FC236}">
-                <a16:creationId xmlns:a16="http://schemas.microsoft.com/office/drawing/2014/main" xmlns="" id="{41120107-62F0-4DEA-B7AB-136CE52150F4}"/>
+                <a16:creationId xmlns="" xmlns:a16="http://schemas.microsoft.com/office/drawing/2014/main" id="{41120107-62F0-4DEA-B7AB-136CE52150F4}"/>
               </a:ext>
             </a:extLst>
           </p:cNvPr>
@@ -13692,7 +13692,7 @@
           <p:cNvPr id="2" name="Title 1">
             <a:extLst>
               <a:ext uri="{FF2B5EF4-FFF2-40B4-BE49-F238E27FC236}">
-                <a16:creationId xmlns:a16="http://schemas.microsoft.com/office/drawing/2014/main" xmlns="" id="{0609E272-EE44-4B2C-9A1F-4728BD38DF8A}"/>
+                <a16:creationId xmlns="" xmlns:a16="http://schemas.microsoft.com/office/drawing/2014/main" id="{0609E272-EE44-4B2C-9A1F-4728BD38DF8A}"/>
               </a:ext>
             </a:extLst>
           </p:cNvPr>
@@ -13726,7 +13726,7 @@
           <p:cNvPr id="3" name="Text Placeholder 2">
             <a:extLst>
               <a:ext uri="{FF2B5EF4-FFF2-40B4-BE49-F238E27FC236}">
-                <a16:creationId xmlns:a16="http://schemas.microsoft.com/office/drawing/2014/main" xmlns="" id="{60199CC0-6E00-4298-ADB4-486C868EA665}"/>
+                <a16:creationId xmlns="" xmlns:a16="http://schemas.microsoft.com/office/drawing/2014/main" id="{60199CC0-6E00-4298-ADB4-486C868EA665}"/>
               </a:ext>
             </a:extLst>
           </p:cNvPr>
@@ -14040,7 +14040,7 @@
           <p:cNvPr id="2" name="Title 1">
             <a:extLst>
               <a:ext uri="{FF2B5EF4-FFF2-40B4-BE49-F238E27FC236}">
-                <a16:creationId xmlns:a16="http://schemas.microsoft.com/office/drawing/2014/main" xmlns="" id="{3BEFCDB7-AD27-4839-93D5-F017F5AC2269}"/>
+                <a16:creationId xmlns="" xmlns:a16="http://schemas.microsoft.com/office/drawing/2014/main" id="{3BEFCDB7-AD27-4839-93D5-F017F5AC2269}"/>
               </a:ext>
             </a:extLst>
           </p:cNvPr>
@@ -14081,7 +14081,7 @@
           <p:cNvPr id="4" name="Picture 3">
             <a:extLst>
               <a:ext uri="{FF2B5EF4-FFF2-40B4-BE49-F238E27FC236}">
-                <a16:creationId xmlns:a16="http://schemas.microsoft.com/office/drawing/2014/main" xmlns="" id="{376F493F-DAB5-42F9-96EA-4797DA832B4E}"/>
+                <a16:creationId xmlns="" xmlns:a16="http://schemas.microsoft.com/office/drawing/2014/main" id="{376F493F-DAB5-42F9-96EA-4797DA832B4E}"/>
               </a:ext>
             </a:extLst>
           </p:cNvPr>
@@ -14119,7 +14119,7 @@
           <p:cNvPr id="5" name="Picture 4">
             <a:extLst>
               <a:ext uri="{FF2B5EF4-FFF2-40B4-BE49-F238E27FC236}">
-                <a16:creationId xmlns:a16="http://schemas.microsoft.com/office/drawing/2014/main" xmlns="" id="{3D8B4824-2C46-490F-A2FD-FB898B58ECDF}"/>
+                <a16:creationId xmlns="" xmlns:a16="http://schemas.microsoft.com/office/drawing/2014/main" id="{3D8B4824-2C46-490F-A2FD-FB898B58ECDF}"/>
               </a:ext>
             </a:extLst>
           </p:cNvPr>
@@ -14157,7 +14157,7 @@
           <p:cNvPr id="6" name="Picture 5">
             <a:extLst>
               <a:ext uri="{FF2B5EF4-FFF2-40B4-BE49-F238E27FC236}">
-                <a16:creationId xmlns:a16="http://schemas.microsoft.com/office/drawing/2014/main" xmlns="" id="{52BE8CC5-908D-4E77-82DF-161B4A4EBB02}"/>
+                <a16:creationId xmlns="" xmlns:a16="http://schemas.microsoft.com/office/drawing/2014/main" id="{52BE8CC5-908D-4E77-82DF-161B4A4EBB02}"/>
               </a:ext>
             </a:extLst>
           </p:cNvPr>
@@ -14195,7 +14195,7 @@
           <p:cNvPr id="7" name="Picture 6">
             <a:extLst>
               <a:ext uri="{FF2B5EF4-FFF2-40B4-BE49-F238E27FC236}">
-                <a16:creationId xmlns:a16="http://schemas.microsoft.com/office/drawing/2014/main" xmlns="" id="{ADD009D9-A50F-4C30-9D8C-5B3002DF9222}"/>
+                <a16:creationId xmlns="" xmlns:a16="http://schemas.microsoft.com/office/drawing/2014/main" id="{ADD009D9-A50F-4C30-9D8C-5B3002DF9222}"/>
               </a:ext>
             </a:extLst>
           </p:cNvPr>
@@ -14233,7 +14233,7 @@
           <p:cNvPr id="8" name="Picture 7">
             <a:extLst>
               <a:ext uri="{FF2B5EF4-FFF2-40B4-BE49-F238E27FC236}">
-                <a16:creationId xmlns:a16="http://schemas.microsoft.com/office/drawing/2014/main" xmlns="" id="{CD373C25-4A52-45C5-B26E-D5B81E8EFE9C}"/>
+                <a16:creationId xmlns="" xmlns:a16="http://schemas.microsoft.com/office/drawing/2014/main" id="{CD373C25-4A52-45C5-B26E-D5B81E8EFE9C}"/>
               </a:ext>
             </a:extLst>
           </p:cNvPr>
@@ -14271,7 +14271,7 @@
           <p:cNvPr id="9" name="Picture 8">
             <a:extLst>
               <a:ext uri="{FF2B5EF4-FFF2-40B4-BE49-F238E27FC236}">
-                <a16:creationId xmlns:a16="http://schemas.microsoft.com/office/drawing/2014/main" xmlns="" id="{E1A52324-292E-4C31-B68B-3410E1DD7B3B}"/>
+                <a16:creationId xmlns="" xmlns:a16="http://schemas.microsoft.com/office/drawing/2014/main" id="{E1A52324-292E-4C31-B68B-3410E1DD7B3B}"/>
               </a:ext>
             </a:extLst>
           </p:cNvPr>
@@ -14309,7 +14309,7 @@
           <p:cNvPr id="10" name="Picture 9">
             <a:extLst>
               <a:ext uri="{FF2B5EF4-FFF2-40B4-BE49-F238E27FC236}">
-                <a16:creationId xmlns:a16="http://schemas.microsoft.com/office/drawing/2014/main" xmlns="" id="{8DF0B0E3-5D04-4A40-A38A-734395A43BDB}"/>
+                <a16:creationId xmlns="" xmlns:a16="http://schemas.microsoft.com/office/drawing/2014/main" id="{8DF0B0E3-5D04-4A40-A38A-734395A43BDB}"/>
               </a:ext>
             </a:extLst>
           </p:cNvPr>
@@ -14347,7 +14347,7 @@
           <p:cNvPr id="11" name="Freeform: Shape 10">
             <a:extLst>
               <a:ext uri="{FF2B5EF4-FFF2-40B4-BE49-F238E27FC236}">
-                <a16:creationId xmlns:a16="http://schemas.microsoft.com/office/drawing/2014/main" xmlns="" id="{E798B587-2894-48A6-B9FD-5157F741FC7D}"/>
+                <a16:creationId xmlns="" xmlns:a16="http://schemas.microsoft.com/office/drawing/2014/main" id="{E798B587-2894-48A6-B9FD-5157F741FC7D}"/>
               </a:ext>
             </a:extLst>
           </p:cNvPr>
@@ -14483,7 +14483,7 @@
           <p:cNvPr id="12" name="Freeform: Shape 11">
             <a:extLst>
               <a:ext uri="{FF2B5EF4-FFF2-40B4-BE49-F238E27FC236}">
-                <a16:creationId xmlns:a16="http://schemas.microsoft.com/office/drawing/2014/main" xmlns="" id="{8A732884-9B90-4D1E-8E30-D22C0932E732}"/>
+                <a16:creationId xmlns="" xmlns:a16="http://schemas.microsoft.com/office/drawing/2014/main" id="{8A732884-9B90-4D1E-8E30-D22C0932E732}"/>
               </a:ext>
             </a:extLst>
           </p:cNvPr>
@@ -14619,7 +14619,7 @@
           <p:cNvPr id="13" name="Freeform: Shape 12">
             <a:extLst>
               <a:ext uri="{FF2B5EF4-FFF2-40B4-BE49-F238E27FC236}">
-                <a16:creationId xmlns:a16="http://schemas.microsoft.com/office/drawing/2014/main" xmlns="" id="{7075A8BD-0951-4DD3-996E-8F24614B0EDE}"/>
+                <a16:creationId xmlns="" xmlns:a16="http://schemas.microsoft.com/office/drawing/2014/main" id="{7075A8BD-0951-4DD3-996E-8F24614B0EDE}"/>
               </a:ext>
             </a:extLst>
           </p:cNvPr>
@@ -14755,7 +14755,7 @@
           <p:cNvPr id="14" name="Freeform: Shape 13">
             <a:extLst>
               <a:ext uri="{FF2B5EF4-FFF2-40B4-BE49-F238E27FC236}">
-                <a16:creationId xmlns:a16="http://schemas.microsoft.com/office/drawing/2014/main" xmlns="" id="{5261C850-8283-4289-97B6-AFA36243C0E8}"/>
+                <a16:creationId xmlns="" xmlns:a16="http://schemas.microsoft.com/office/drawing/2014/main" id="{5261C850-8283-4289-97B6-AFA36243C0E8}"/>
               </a:ext>
             </a:extLst>
           </p:cNvPr>
@@ -14891,7 +14891,7 @@
           <p:cNvPr id="15" name="Freeform: Shape 14">
             <a:extLst>
               <a:ext uri="{FF2B5EF4-FFF2-40B4-BE49-F238E27FC236}">
-                <a16:creationId xmlns:a16="http://schemas.microsoft.com/office/drawing/2014/main" xmlns="" id="{1C7E24F9-94CE-4C49-81F9-297158C1B26D}"/>
+                <a16:creationId xmlns="" xmlns:a16="http://schemas.microsoft.com/office/drawing/2014/main" id="{1C7E24F9-94CE-4C49-81F9-297158C1B26D}"/>
               </a:ext>
             </a:extLst>
           </p:cNvPr>
@@ -15026,7 +15026,7 @@
           <p:cNvPr id="16" name="Freeform: Shape 15">
             <a:extLst>
               <a:ext uri="{FF2B5EF4-FFF2-40B4-BE49-F238E27FC236}">
-                <a16:creationId xmlns:a16="http://schemas.microsoft.com/office/drawing/2014/main" xmlns="" id="{3F7029D0-CDC6-4940-A4BD-452846970732}"/>
+                <a16:creationId xmlns="" xmlns:a16="http://schemas.microsoft.com/office/drawing/2014/main" id="{3F7029D0-CDC6-4940-A4BD-452846970732}"/>
               </a:ext>
             </a:extLst>
           </p:cNvPr>
@@ -15161,7 +15161,7 @@
           <p:cNvPr id="17" name="TextBox 16">
             <a:extLst>
               <a:ext uri="{FF2B5EF4-FFF2-40B4-BE49-F238E27FC236}">
-                <a16:creationId xmlns:a16="http://schemas.microsoft.com/office/drawing/2014/main" xmlns="" id="{902694FB-204A-422A-A370-0BF2180E5189}"/>
+                <a16:creationId xmlns="" xmlns:a16="http://schemas.microsoft.com/office/drawing/2014/main" id="{902694FB-204A-422A-A370-0BF2180E5189}"/>
               </a:ext>
             </a:extLst>
           </p:cNvPr>
@@ -15293,7 +15293,7 @@
           <p:cNvPr id="20" name="TextBox 19">
             <a:extLst>
               <a:ext uri="{FF2B5EF4-FFF2-40B4-BE49-F238E27FC236}">
-                <a16:creationId xmlns:a16="http://schemas.microsoft.com/office/drawing/2014/main" xmlns="" id="{FD65FB41-3EDF-44AD-9405-9F12DEBCB3ED}"/>
+                <a16:creationId xmlns="" xmlns:a16="http://schemas.microsoft.com/office/drawing/2014/main" id="{FD65FB41-3EDF-44AD-9405-9F12DEBCB3ED}"/>
               </a:ext>
             </a:extLst>
           </p:cNvPr>
@@ -15397,7 +15397,7 @@
           <p:cNvPr id="21" name="TextBox 20">
             <a:extLst>
               <a:ext uri="{FF2B5EF4-FFF2-40B4-BE49-F238E27FC236}">
-                <a16:creationId xmlns:a16="http://schemas.microsoft.com/office/drawing/2014/main" xmlns="" id="{8EFD4806-0FE4-4DB2-9325-4A2FC9300D08}"/>
+                <a16:creationId xmlns="" xmlns:a16="http://schemas.microsoft.com/office/drawing/2014/main" id="{8EFD4806-0FE4-4DB2-9325-4A2FC9300D08}"/>
               </a:ext>
             </a:extLst>
           </p:cNvPr>
@@ -15516,7 +15516,7 @@
           <p:cNvPr id="22" name="TextBox 21">
             <a:extLst>
               <a:ext uri="{FF2B5EF4-FFF2-40B4-BE49-F238E27FC236}">
-                <a16:creationId xmlns:a16="http://schemas.microsoft.com/office/drawing/2014/main" xmlns="" id="{709FA639-AFEC-4635-A05B-5B22ED4B83A4}"/>
+                <a16:creationId xmlns="" xmlns:a16="http://schemas.microsoft.com/office/drawing/2014/main" id="{709FA639-AFEC-4635-A05B-5B22ED4B83A4}"/>
               </a:ext>
             </a:extLst>
           </p:cNvPr>
@@ -15674,7 +15674,7 @@
           <p:cNvPr id="23" name="TextBox 22">
             <a:extLst>
               <a:ext uri="{FF2B5EF4-FFF2-40B4-BE49-F238E27FC236}">
-                <a16:creationId xmlns:a16="http://schemas.microsoft.com/office/drawing/2014/main" xmlns="" id="{5D3DECC9-8C46-4918-BB93-505DBD83A19A}"/>
+                <a16:creationId xmlns="" xmlns:a16="http://schemas.microsoft.com/office/drawing/2014/main" id="{5D3DECC9-8C46-4918-BB93-505DBD83A19A}"/>
               </a:ext>
             </a:extLst>
           </p:cNvPr>
@@ -15735,7 +15735,7 @@
           <p:cNvPr id="24" name="TextBox 23">
             <a:extLst>
               <a:ext uri="{FF2B5EF4-FFF2-40B4-BE49-F238E27FC236}">
-                <a16:creationId xmlns:a16="http://schemas.microsoft.com/office/drawing/2014/main" xmlns="" id="{35C248C7-BD99-44E2-9454-D52075D1631E}"/>
+                <a16:creationId xmlns="" xmlns:a16="http://schemas.microsoft.com/office/drawing/2014/main" id="{35C248C7-BD99-44E2-9454-D52075D1631E}"/>
               </a:ext>
             </a:extLst>
           </p:cNvPr>
@@ -15793,7 +15793,7 @@
           <p:cNvPr id="25" name="TextBox 24">
             <a:extLst>
               <a:ext uri="{FF2B5EF4-FFF2-40B4-BE49-F238E27FC236}">
-                <a16:creationId xmlns:a16="http://schemas.microsoft.com/office/drawing/2014/main" xmlns="" id="{3E6F5DA3-1859-4FBC-9617-F4A57FBA45BA}"/>
+                <a16:creationId xmlns="" xmlns:a16="http://schemas.microsoft.com/office/drawing/2014/main" id="{3E6F5DA3-1859-4FBC-9617-F4A57FBA45BA}"/>
               </a:ext>
             </a:extLst>
           </p:cNvPr>
@@ -15936,7 +15936,7 @@
           <p:cNvPr id="26" name="Picture 25">
             <a:extLst>
               <a:ext uri="{FF2B5EF4-FFF2-40B4-BE49-F238E27FC236}">
-                <a16:creationId xmlns:a16="http://schemas.microsoft.com/office/drawing/2014/main" xmlns="" id="{B323F0B7-4B10-45E5-99F9-5A6F48FF8772}"/>
+                <a16:creationId xmlns="" xmlns:a16="http://schemas.microsoft.com/office/drawing/2014/main" id="{B323F0B7-4B10-45E5-99F9-5A6F48FF8772}"/>
               </a:ext>
             </a:extLst>
           </p:cNvPr>
@@ -15974,7 +15974,7 @@
           <p:cNvPr id="27" name="Freeform: Shape 26">
             <a:extLst>
               <a:ext uri="{FF2B5EF4-FFF2-40B4-BE49-F238E27FC236}">
-                <a16:creationId xmlns:a16="http://schemas.microsoft.com/office/drawing/2014/main" xmlns="" id="{B5004C74-5551-46E6-B65A-7B48F3CA7650}"/>
+                <a16:creationId xmlns="" xmlns:a16="http://schemas.microsoft.com/office/drawing/2014/main" id="{B5004C74-5551-46E6-B65A-7B48F3CA7650}"/>
               </a:ext>
             </a:extLst>
           </p:cNvPr>
@@ -16109,7 +16109,7 @@
           <p:cNvPr id="28" name="TextBox 27">
             <a:extLst>
               <a:ext uri="{FF2B5EF4-FFF2-40B4-BE49-F238E27FC236}">
-                <a16:creationId xmlns:a16="http://schemas.microsoft.com/office/drawing/2014/main" xmlns="" id="{9EE78C95-CB4D-4EAA-B4BD-1DACF82027CF}"/>
+                <a16:creationId xmlns="" xmlns:a16="http://schemas.microsoft.com/office/drawing/2014/main" id="{9EE78C95-CB4D-4EAA-B4BD-1DACF82027CF}"/>
               </a:ext>
             </a:extLst>
           </p:cNvPr>
@@ -16314,7 +16314,7 @@
           <p:cNvPr id="29" name="Picture 28">
             <a:extLst>
               <a:ext uri="{FF2B5EF4-FFF2-40B4-BE49-F238E27FC236}">
-                <a16:creationId xmlns:a16="http://schemas.microsoft.com/office/drawing/2014/main" xmlns="" id="{05E3468D-ED51-4201-8957-2DD74632D4F3}"/>
+                <a16:creationId xmlns="" xmlns:a16="http://schemas.microsoft.com/office/drawing/2014/main" id="{05E3468D-ED51-4201-8957-2DD74632D4F3}"/>
               </a:ext>
             </a:extLst>
           </p:cNvPr>
@@ -16450,7 +16450,7 @@
           <p:cNvPr id="2" name="Title 1">
             <a:extLst>
               <a:ext uri="{FF2B5EF4-FFF2-40B4-BE49-F238E27FC236}">
-                <a16:creationId xmlns:a16="http://schemas.microsoft.com/office/drawing/2014/main" xmlns="" id="{4882B9C5-7CA3-4B68-9BF8-E84D0F77ADD6}"/>
+                <a16:creationId xmlns="" xmlns:a16="http://schemas.microsoft.com/office/drawing/2014/main" id="{4882B9C5-7CA3-4B68-9BF8-E84D0F77ADD6}"/>
               </a:ext>
             </a:extLst>
           </p:cNvPr>
@@ -16484,7 +16484,7 @@
           <p:cNvPr id="3" name="Text Placeholder 2">
             <a:extLst>
               <a:ext uri="{FF2B5EF4-FFF2-40B4-BE49-F238E27FC236}">
-                <a16:creationId xmlns:a16="http://schemas.microsoft.com/office/drawing/2014/main" xmlns="" id="{BCC89D3B-1BD9-43AA-8161-C66DC4326233}"/>
+                <a16:creationId xmlns="" xmlns:a16="http://schemas.microsoft.com/office/drawing/2014/main" id="{BCC89D3B-1BD9-43AA-8161-C66DC4326233}"/>
               </a:ext>
             </a:extLst>
           </p:cNvPr>
@@ -16645,23 +16645,7 @@
             </a:r>
             <a:r>
               <a:rPr lang="en-US" dirty="0" smtClean="0"/>
-              <a:t>-setup folder. While running below </a:t>
-            </a:r>
-            <a:r>
-              <a:rPr lang="en-US" dirty="0" smtClean="0"/>
-              <a:t>playbooks </a:t>
-            </a:r>
-            <a:r>
-              <a:rPr lang="en-US" smtClean="0"/>
-              <a:t>it </a:t>
-            </a:r>
-            <a:r>
-              <a:rPr lang="en-US" smtClean="0"/>
-              <a:t>will ask </a:t>
-            </a:r>
-            <a:r>
-              <a:rPr lang="en-US" dirty="0" smtClean="0"/>
-              <a:t>your login details. </a:t>
+              <a:t>-setup folder. While running below playbooks it will ask your login details. </a:t>
             </a:r>
           </a:p>
           <a:p>
@@ -16675,16 +16659,24 @@
               <a:t>Installation </a:t>
             </a:r>
             <a:r>
+              <a:rPr lang="en-US" dirty="0" err="1" smtClean="0"/>
+              <a:t>Terraform</a:t>
+            </a:r>
+            <a:r>
+              <a:rPr lang="en-US" dirty="0" smtClean="0"/>
+              <a:t> </a:t>
+            </a:r>
+            <a:r>
+              <a:rPr lang="en-US" dirty="0"/>
+              <a:t>and </a:t>
+            </a:r>
+            <a:r>
               <a:rPr lang="en-US" dirty="0" err="1"/>
-              <a:t>terraform</a:t>
-            </a:r>
-            <a:r>
-              <a:rPr lang="en-US" dirty="0"/>
-              <a:t> and </a:t>
-            </a:r>
-            <a:r>
-              <a:rPr lang="en-US" dirty="0" err="1"/>
-              <a:t>docker</a:t>
+              <a:t>D</a:t>
+            </a:r>
+            <a:r>
+              <a:rPr lang="en-US" dirty="0" err="1" smtClean="0"/>
+              <a:t>ocker</a:t>
             </a:r>
             <a:r>
               <a:rPr lang="en-US" dirty="0" smtClean="0"/>
@@ -16800,9 +16792,10 @@
               <a:t>usr</a:t>
             </a:r>
             <a:r>
-              <a:rPr lang="en-US" dirty="0" smtClean="0"/>
-              <a:t>/bin/python3“</a:t>
-            </a:r>
+              <a:rPr lang="en-US" smtClean="0"/>
+              <a:t>/bin/python3"</a:t>
+            </a:r>
+            <a:endParaRPr lang="en-US" dirty="0" smtClean="0"/>
           </a:p>
           <a:p>
             <a:pPr algn="l">
@@ -16824,7 +16817,11 @@
             </a:r>
             <a:r>
               <a:rPr lang="en-US" dirty="0" err="1"/>
-              <a:t>awscli</a:t>
+              <a:t>A</a:t>
+            </a:r>
+            <a:r>
+              <a:rPr lang="en-US" dirty="0" err="1" smtClean="0"/>
+              <a:t>wscli</a:t>
             </a:r>
             <a:r>
               <a:rPr lang="en-US" dirty="0" smtClean="0"/>
@@ -16974,7 +16971,7 @@
           <p:cNvPr id="2" name="Title 1">
             <a:extLst>
               <a:ext uri="{FF2B5EF4-FFF2-40B4-BE49-F238E27FC236}">
-                <a16:creationId xmlns:a16="http://schemas.microsoft.com/office/drawing/2014/main" xmlns="" id="{5BBF9AA3-2D73-4821-AD72-0E4DB4CEA964}"/>
+                <a16:creationId xmlns="" xmlns:a16="http://schemas.microsoft.com/office/drawing/2014/main" id="{5BBF9AA3-2D73-4821-AD72-0E4DB4CEA964}"/>
               </a:ext>
             </a:extLst>
           </p:cNvPr>
@@ -17012,7 +17009,7 @@
           <p:cNvPr id="4" name="Picture 3">
             <a:extLst>
               <a:ext uri="{FF2B5EF4-FFF2-40B4-BE49-F238E27FC236}">
-                <a16:creationId xmlns:a16="http://schemas.microsoft.com/office/drawing/2014/main" xmlns="" id="{1F6B7328-6BEA-4E81-833E-7A9FC2A6E200}"/>
+                <a16:creationId xmlns="" xmlns:a16="http://schemas.microsoft.com/office/drawing/2014/main" id="{1F6B7328-6BEA-4E81-833E-7A9FC2A6E200}"/>
               </a:ext>
             </a:extLst>
           </p:cNvPr>
@@ -17050,7 +17047,7 @@
           <p:cNvPr id="5" name="Picture 4">
             <a:extLst>
               <a:ext uri="{FF2B5EF4-FFF2-40B4-BE49-F238E27FC236}">
-                <a16:creationId xmlns:a16="http://schemas.microsoft.com/office/drawing/2014/main" xmlns="" id="{46CA633A-D369-4F7A-AC07-7C9C6BF07D86}"/>
+                <a16:creationId xmlns="" xmlns:a16="http://schemas.microsoft.com/office/drawing/2014/main" id="{46CA633A-D369-4F7A-AC07-7C9C6BF07D86}"/>
               </a:ext>
             </a:extLst>
           </p:cNvPr>
@@ -17088,7 +17085,7 @@
           <p:cNvPr id="6" name="Picture 5">
             <a:extLst>
               <a:ext uri="{FF2B5EF4-FFF2-40B4-BE49-F238E27FC236}">
-                <a16:creationId xmlns:a16="http://schemas.microsoft.com/office/drawing/2014/main" xmlns="" id="{3566252C-C12B-4058-929A-BAE691AB0545}"/>
+                <a16:creationId xmlns="" xmlns:a16="http://schemas.microsoft.com/office/drawing/2014/main" id="{3566252C-C12B-4058-929A-BAE691AB0545}"/>
               </a:ext>
             </a:extLst>
           </p:cNvPr>
@@ -17126,7 +17123,7 @@
           <p:cNvPr id="7" name="Picture 6">
             <a:extLst>
               <a:ext uri="{FF2B5EF4-FFF2-40B4-BE49-F238E27FC236}">
-                <a16:creationId xmlns:a16="http://schemas.microsoft.com/office/drawing/2014/main" xmlns="" id="{8B277D8F-CB10-4F6C-8FD6-D3D89F0FA255}"/>
+                <a16:creationId xmlns="" xmlns:a16="http://schemas.microsoft.com/office/drawing/2014/main" id="{8B277D8F-CB10-4F6C-8FD6-D3D89F0FA255}"/>
               </a:ext>
             </a:extLst>
           </p:cNvPr>
@@ -17164,7 +17161,7 @@
           <p:cNvPr id="8" name="Picture 7">
             <a:extLst>
               <a:ext uri="{FF2B5EF4-FFF2-40B4-BE49-F238E27FC236}">
-                <a16:creationId xmlns:a16="http://schemas.microsoft.com/office/drawing/2014/main" xmlns="" id="{E487CD9E-611A-4AD2-BE26-B28A6252E5A2}"/>
+                <a16:creationId xmlns="" xmlns:a16="http://schemas.microsoft.com/office/drawing/2014/main" id="{E487CD9E-611A-4AD2-BE26-B28A6252E5A2}"/>
               </a:ext>
             </a:extLst>
           </p:cNvPr>
@@ -17202,7 +17199,7 @@
           <p:cNvPr id="10" name="Freeform: Shape 9">
             <a:extLst>
               <a:ext uri="{FF2B5EF4-FFF2-40B4-BE49-F238E27FC236}">
-                <a16:creationId xmlns:a16="http://schemas.microsoft.com/office/drawing/2014/main" xmlns="" id="{2D8EB5AF-3154-4AF2-9BFC-1149DA6E4ED8}"/>
+                <a16:creationId xmlns="" xmlns:a16="http://schemas.microsoft.com/office/drawing/2014/main" id="{2D8EB5AF-3154-4AF2-9BFC-1149DA6E4ED8}"/>
               </a:ext>
             </a:extLst>
           </p:cNvPr>
@@ -17338,7 +17335,7 @@
           <p:cNvPr id="11" name="Freeform: Shape 10">
             <a:extLst>
               <a:ext uri="{FF2B5EF4-FFF2-40B4-BE49-F238E27FC236}">
-                <a16:creationId xmlns:a16="http://schemas.microsoft.com/office/drawing/2014/main" xmlns="" id="{F65028F0-0C85-42A2-A192-43F865B1D05C}"/>
+                <a16:creationId xmlns="" xmlns:a16="http://schemas.microsoft.com/office/drawing/2014/main" id="{F65028F0-0C85-42A2-A192-43F865B1D05C}"/>
               </a:ext>
             </a:extLst>
           </p:cNvPr>
@@ -17474,7 +17471,7 @@
           <p:cNvPr id="12" name="Freeform: Shape 11">
             <a:extLst>
               <a:ext uri="{FF2B5EF4-FFF2-40B4-BE49-F238E27FC236}">
-                <a16:creationId xmlns:a16="http://schemas.microsoft.com/office/drawing/2014/main" xmlns="" id="{3BEED2AF-61F5-42FF-A050-58E1E7BA3637}"/>
+                <a16:creationId xmlns="" xmlns:a16="http://schemas.microsoft.com/office/drawing/2014/main" id="{3BEED2AF-61F5-42FF-A050-58E1E7BA3637}"/>
               </a:ext>
             </a:extLst>
           </p:cNvPr>
@@ -17610,7 +17607,7 @@
           <p:cNvPr id="13" name="Freeform: Shape 12">
             <a:extLst>
               <a:ext uri="{FF2B5EF4-FFF2-40B4-BE49-F238E27FC236}">
-                <a16:creationId xmlns:a16="http://schemas.microsoft.com/office/drawing/2014/main" xmlns="" id="{AC229F0D-57D4-4DF5-B7BD-23CD890287DB}"/>
+                <a16:creationId xmlns="" xmlns:a16="http://schemas.microsoft.com/office/drawing/2014/main" id="{AC229F0D-57D4-4DF5-B7BD-23CD890287DB}"/>
               </a:ext>
             </a:extLst>
           </p:cNvPr>
@@ -17746,7 +17743,7 @@
           <p:cNvPr id="15" name="TextBox 14">
             <a:extLst>
               <a:ext uri="{FF2B5EF4-FFF2-40B4-BE49-F238E27FC236}">
-                <a16:creationId xmlns:a16="http://schemas.microsoft.com/office/drawing/2014/main" xmlns="" id="{04EFD583-92B7-4F2E-B4AE-61120D53F2A6}"/>
+                <a16:creationId xmlns="" xmlns:a16="http://schemas.microsoft.com/office/drawing/2014/main" id="{04EFD583-92B7-4F2E-B4AE-61120D53F2A6}"/>
               </a:ext>
             </a:extLst>
           </p:cNvPr>
@@ -17890,7 +17887,7 @@
           <p:cNvPr id="16" name="TextBox 15">
             <a:extLst>
               <a:ext uri="{FF2B5EF4-FFF2-40B4-BE49-F238E27FC236}">
-                <a16:creationId xmlns:a16="http://schemas.microsoft.com/office/drawing/2014/main" xmlns="" id="{73CCDDE2-FE16-412C-8F5F-3DE42927EB5B}"/>
+                <a16:creationId xmlns="" xmlns:a16="http://schemas.microsoft.com/office/drawing/2014/main" id="{73CCDDE2-FE16-412C-8F5F-3DE42927EB5B}"/>
               </a:ext>
             </a:extLst>
           </p:cNvPr>
@@ -17951,7 +17948,7 @@
           <p:cNvPr id="17" name="Picture 16">
             <a:extLst>
               <a:ext uri="{FF2B5EF4-FFF2-40B4-BE49-F238E27FC236}">
-                <a16:creationId xmlns:a16="http://schemas.microsoft.com/office/drawing/2014/main" xmlns="" id="{A7A36224-E603-43E7-97B3-9EB2686C2E7D}"/>
+                <a16:creationId xmlns="" xmlns:a16="http://schemas.microsoft.com/office/drawing/2014/main" id="{A7A36224-E603-43E7-97B3-9EB2686C2E7D}"/>
               </a:ext>
             </a:extLst>
           </p:cNvPr>
@@ -17989,7 +17986,7 @@
           <p:cNvPr id="18" name="TextBox 17">
             <a:extLst>
               <a:ext uri="{FF2B5EF4-FFF2-40B4-BE49-F238E27FC236}">
-                <a16:creationId xmlns:a16="http://schemas.microsoft.com/office/drawing/2014/main" xmlns="" id="{995B05FB-CEC6-47FF-848F-89598693900D}"/>
+                <a16:creationId xmlns="" xmlns:a16="http://schemas.microsoft.com/office/drawing/2014/main" id="{995B05FB-CEC6-47FF-848F-89598693900D}"/>
               </a:ext>
             </a:extLst>
           </p:cNvPr>
@@ -18108,7 +18105,7 @@
           <p:cNvPr id="19" name="TextBox 18">
             <a:extLst>
               <a:ext uri="{FF2B5EF4-FFF2-40B4-BE49-F238E27FC236}">
-                <a16:creationId xmlns:a16="http://schemas.microsoft.com/office/drawing/2014/main" xmlns="" id="{3E306993-1696-403B-9159-E53FBB234EFB}"/>
+                <a16:creationId xmlns="" xmlns:a16="http://schemas.microsoft.com/office/drawing/2014/main" id="{3E306993-1696-403B-9159-E53FBB234EFB}"/>
               </a:ext>
             </a:extLst>
           </p:cNvPr>
@@ -18169,7 +18166,7 @@
           <p:cNvPr id="20" name="TextBox 19">
             <a:extLst>
               <a:ext uri="{FF2B5EF4-FFF2-40B4-BE49-F238E27FC236}">
-                <a16:creationId xmlns:a16="http://schemas.microsoft.com/office/drawing/2014/main" xmlns="" id="{89631D48-DBC3-43F5-B051-5E11C6FC12CE}"/>
+                <a16:creationId xmlns="" xmlns:a16="http://schemas.microsoft.com/office/drawing/2014/main" id="{89631D48-DBC3-43F5-B051-5E11C6FC12CE}"/>
               </a:ext>
             </a:extLst>
           </p:cNvPr>
@@ -18230,7 +18227,7 @@
           <p:cNvPr id="21" name="Freeform: Shape 20">
             <a:extLst>
               <a:ext uri="{FF2B5EF4-FFF2-40B4-BE49-F238E27FC236}">
-                <a16:creationId xmlns:a16="http://schemas.microsoft.com/office/drawing/2014/main" xmlns="" id="{AC908714-12E7-4AE5-A2E1-E2F999159A86}"/>
+                <a16:creationId xmlns="" xmlns:a16="http://schemas.microsoft.com/office/drawing/2014/main" id="{AC908714-12E7-4AE5-A2E1-E2F999159A86}"/>
               </a:ext>
             </a:extLst>
           </p:cNvPr>
@@ -18376,7 +18373,7 @@
           <p:cNvPr id="22" name="Picture 21">
             <a:extLst>
               <a:ext uri="{FF2B5EF4-FFF2-40B4-BE49-F238E27FC236}">
-                <a16:creationId xmlns:a16="http://schemas.microsoft.com/office/drawing/2014/main" xmlns="" id="{7F3A833E-386C-4E6D-8C2C-C55C32FDCD5A}"/>
+                <a16:creationId xmlns="" xmlns:a16="http://schemas.microsoft.com/office/drawing/2014/main" id="{7F3A833E-386C-4E6D-8C2C-C55C32FDCD5A}"/>
               </a:ext>
             </a:extLst>
           </p:cNvPr>
@@ -18414,7 +18411,7 @@
           <p:cNvPr id="24" name="TextBox 23">
             <a:extLst>
               <a:ext uri="{FF2B5EF4-FFF2-40B4-BE49-F238E27FC236}">
-                <a16:creationId xmlns:a16="http://schemas.microsoft.com/office/drawing/2014/main" xmlns="" id="{7DFB7CB5-BEF5-4590-9060-ECAD96362745}"/>
+                <a16:creationId xmlns="" xmlns:a16="http://schemas.microsoft.com/office/drawing/2014/main" id="{7DFB7CB5-BEF5-4590-9060-ECAD96362745}"/>
               </a:ext>
             </a:extLst>
           </p:cNvPr>
@@ -18475,7 +18472,7 @@
           <p:cNvPr id="25" name="TextBox 24">
             <a:extLst>
               <a:ext uri="{FF2B5EF4-FFF2-40B4-BE49-F238E27FC236}">
-                <a16:creationId xmlns:a16="http://schemas.microsoft.com/office/drawing/2014/main" xmlns="" id="{667C970F-CF4E-409E-903C-C956C71C653D}"/>
+                <a16:creationId xmlns="" xmlns:a16="http://schemas.microsoft.com/office/drawing/2014/main" id="{667C970F-CF4E-409E-903C-C956C71C653D}"/>
               </a:ext>
             </a:extLst>
           </p:cNvPr>
@@ -18618,7 +18615,7 @@
           <p:cNvPr id="2" name="Title 1">
             <a:extLst>
               <a:ext uri="{FF2B5EF4-FFF2-40B4-BE49-F238E27FC236}">
-                <a16:creationId xmlns:a16="http://schemas.microsoft.com/office/drawing/2014/main" xmlns="" id="{F629ED5D-E185-40C1-8B04-97DEF47FB941}"/>
+                <a16:creationId xmlns="" xmlns:a16="http://schemas.microsoft.com/office/drawing/2014/main" id="{F629ED5D-E185-40C1-8B04-97DEF47FB941}"/>
               </a:ext>
             </a:extLst>
           </p:cNvPr>
@@ -18652,7 +18649,7 @@
           <p:cNvPr id="3" name="Picture 2">
             <a:extLst>
               <a:ext uri="{FF2B5EF4-FFF2-40B4-BE49-F238E27FC236}">
-                <a16:creationId xmlns:a16="http://schemas.microsoft.com/office/drawing/2014/main" xmlns="" id="{2A272A40-3DA5-4579-964C-52ED62D0B579}"/>
+                <a16:creationId xmlns="" xmlns:a16="http://schemas.microsoft.com/office/drawing/2014/main" id="{2A272A40-3DA5-4579-964C-52ED62D0B579}"/>
               </a:ext>
             </a:extLst>
           </p:cNvPr>
@@ -18690,7 +18687,7 @@
           <p:cNvPr id="4" name="Picture 3">
             <a:extLst>
               <a:ext uri="{FF2B5EF4-FFF2-40B4-BE49-F238E27FC236}">
-                <a16:creationId xmlns:a16="http://schemas.microsoft.com/office/drawing/2014/main" xmlns="" id="{AD6D72E2-0A06-42B8-96A9-917F392589A7}"/>
+                <a16:creationId xmlns="" xmlns:a16="http://schemas.microsoft.com/office/drawing/2014/main" id="{AD6D72E2-0A06-42B8-96A9-917F392589A7}"/>
               </a:ext>
             </a:extLst>
           </p:cNvPr>
@@ -18728,7 +18725,7 @@
           <p:cNvPr id="5" name="Picture 4">
             <a:extLst>
               <a:ext uri="{FF2B5EF4-FFF2-40B4-BE49-F238E27FC236}">
-                <a16:creationId xmlns:a16="http://schemas.microsoft.com/office/drawing/2014/main" xmlns="" id="{1E2F9F30-02B5-435A-91E3-C521A9701598}"/>
+                <a16:creationId xmlns="" xmlns:a16="http://schemas.microsoft.com/office/drawing/2014/main" id="{1E2F9F30-02B5-435A-91E3-C521A9701598}"/>
               </a:ext>
             </a:extLst>
           </p:cNvPr>
@@ -18766,7 +18763,7 @@
           <p:cNvPr id="6" name="Picture 5">
             <a:extLst>
               <a:ext uri="{FF2B5EF4-FFF2-40B4-BE49-F238E27FC236}">
-                <a16:creationId xmlns:a16="http://schemas.microsoft.com/office/drawing/2014/main" xmlns="" id="{6C86F9E1-0821-48F0-8FE2-73EEE7882EC1}"/>
+                <a16:creationId xmlns="" xmlns:a16="http://schemas.microsoft.com/office/drawing/2014/main" id="{6C86F9E1-0821-48F0-8FE2-73EEE7882EC1}"/>
               </a:ext>
             </a:extLst>
           </p:cNvPr>
@@ -18804,7 +18801,7 @@
           <p:cNvPr id="7" name="Picture 6">
             <a:extLst>
               <a:ext uri="{FF2B5EF4-FFF2-40B4-BE49-F238E27FC236}">
-                <a16:creationId xmlns:a16="http://schemas.microsoft.com/office/drawing/2014/main" xmlns="" id="{14DD1D71-7A6E-44A8-B5B9-271854B1AF0C}"/>
+                <a16:creationId xmlns="" xmlns:a16="http://schemas.microsoft.com/office/drawing/2014/main" id="{14DD1D71-7A6E-44A8-B5B9-271854B1AF0C}"/>
               </a:ext>
             </a:extLst>
           </p:cNvPr>
@@ -18842,7 +18839,7 @@
           <p:cNvPr id="8" name="Picture 7">
             <a:extLst>
               <a:ext uri="{FF2B5EF4-FFF2-40B4-BE49-F238E27FC236}">
-                <a16:creationId xmlns:a16="http://schemas.microsoft.com/office/drawing/2014/main" xmlns="" id="{AA8A7E31-8442-4E4E-94EB-30CB88FB92DD}"/>
+                <a16:creationId xmlns="" xmlns:a16="http://schemas.microsoft.com/office/drawing/2014/main" id="{AA8A7E31-8442-4E4E-94EB-30CB88FB92DD}"/>
               </a:ext>
             </a:extLst>
           </p:cNvPr>
@@ -18880,7 +18877,7 @@
           <p:cNvPr id="9" name="Picture 8">
             <a:extLst>
               <a:ext uri="{FF2B5EF4-FFF2-40B4-BE49-F238E27FC236}">
-                <a16:creationId xmlns:a16="http://schemas.microsoft.com/office/drawing/2014/main" xmlns="" id="{404FFD67-4317-4485-B379-6EFF070B2583}"/>
+                <a16:creationId xmlns="" xmlns:a16="http://schemas.microsoft.com/office/drawing/2014/main" id="{404FFD67-4317-4485-B379-6EFF070B2583}"/>
               </a:ext>
             </a:extLst>
           </p:cNvPr>
@@ -18918,7 +18915,7 @@
           <p:cNvPr id="10" name="Freeform: Shape 9">
             <a:extLst>
               <a:ext uri="{FF2B5EF4-FFF2-40B4-BE49-F238E27FC236}">
-                <a16:creationId xmlns:a16="http://schemas.microsoft.com/office/drawing/2014/main" xmlns="" id="{331A4B3C-60CD-46E6-84BD-6009852C1851}"/>
+                <a16:creationId xmlns="" xmlns:a16="http://schemas.microsoft.com/office/drawing/2014/main" id="{331A4B3C-60CD-46E6-84BD-6009852C1851}"/>
               </a:ext>
             </a:extLst>
           </p:cNvPr>
@@ -19054,7 +19051,7 @@
           <p:cNvPr id="11" name="Freeform: Shape 10">
             <a:extLst>
               <a:ext uri="{FF2B5EF4-FFF2-40B4-BE49-F238E27FC236}">
-                <a16:creationId xmlns:a16="http://schemas.microsoft.com/office/drawing/2014/main" xmlns="" id="{2A3A1582-1B4A-4B74-B2D5-130D65EE9494}"/>
+                <a16:creationId xmlns="" xmlns:a16="http://schemas.microsoft.com/office/drawing/2014/main" id="{2A3A1582-1B4A-4B74-B2D5-130D65EE9494}"/>
               </a:ext>
             </a:extLst>
           </p:cNvPr>
@@ -19190,7 +19187,7 @@
           <p:cNvPr id="12" name="Freeform: Shape 11">
             <a:extLst>
               <a:ext uri="{FF2B5EF4-FFF2-40B4-BE49-F238E27FC236}">
-                <a16:creationId xmlns:a16="http://schemas.microsoft.com/office/drawing/2014/main" xmlns="" id="{A24D4327-A034-4814-BC1F-B20E5206B590}"/>
+                <a16:creationId xmlns="" xmlns:a16="http://schemas.microsoft.com/office/drawing/2014/main" id="{A24D4327-A034-4814-BC1F-B20E5206B590}"/>
               </a:ext>
             </a:extLst>
           </p:cNvPr>
@@ -19326,7 +19323,7 @@
           <p:cNvPr id="13" name="Freeform: Shape 12">
             <a:extLst>
               <a:ext uri="{FF2B5EF4-FFF2-40B4-BE49-F238E27FC236}">
-                <a16:creationId xmlns:a16="http://schemas.microsoft.com/office/drawing/2014/main" xmlns="" id="{6E5BAECF-8F04-4615-A3FC-A2A9F7418220}"/>
+                <a16:creationId xmlns="" xmlns:a16="http://schemas.microsoft.com/office/drawing/2014/main" id="{6E5BAECF-8F04-4615-A3FC-A2A9F7418220}"/>
               </a:ext>
             </a:extLst>
           </p:cNvPr>
@@ -19462,7 +19459,7 @@
           <p:cNvPr id="14" name="Freeform: Shape 13">
             <a:extLst>
               <a:ext uri="{FF2B5EF4-FFF2-40B4-BE49-F238E27FC236}">
-                <a16:creationId xmlns:a16="http://schemas.microsoft.com/office/drawing/2014/main" xmlns="" id="{A45BB223-0844-42CD-B249-8D20C9DE1BE6}"/>
+                <a16:creationId xmlns="" xmlns:a16="http://schemas.microsoft.com/office/drawing/2014/main" id="{A45BB223-0844-42CD-B249-8D20C9DE1BE6}"/>
               </a:ext>
             </a:extLst>
           </p:cNvPr>
@@ -19598,7 +19595,7 @@
           <p:cNvPr id="15" name="Freeform: Shape 14">
             <a:extLst>
               <a:ext uri="{FF2B5EF4-FFF2-40B4-BE49-F238E27FC236}">
-                <a16:creationId xmlns:a16="http://schemas.microsoft.com/office/drawing/2014/main" xmlns="" id="{C5241B31-A95A-4B3B-9727-1AAF8B86C925}"/>
+                <a16:creationId xmlns="" xmlns:a16="http://schemas.microsoft.com/office/drawing/2014/main" id="{C5241B31-A95A-4B3B-9727-1AAF8B86C925}"/>
               </a:ext>
             </a:extLst>
           </p:cNvPr>
@@ -19734,7 +19731,7 @@
           <p:cNvPr id="16" name="TextBox 15">
             <a:extLst>
               <a:ext uri="{FF2B5EF4-FFF2-40B4-BE49-F238E27FC236}">
-                <a16:creationId xmlns:a16="http://schemas.microsoft.com/office/drawing/2014/main" xmlns="" id="{D4EC7696-C68C-483C-84D6-71251D9747CC}"/>
+                <a16:creationId xmlns="" xmlns:a16="http://schemas.microsoft.com/office/drawing/2014/main" id="{D4EC7696-C68C-483C-84D6-71251D9747CC}"/>
               </a:ext>
             </a:extLst>
           </p:cNvPr>
@@ -19824,7 +19821,7 @@
           <p:cNvPr id="17" name="TextBox 16">
             <a:extLst>
               <a:ext uri="{FF2B5EF4-FFF2-40B4-BE49-F238E27FC236}">
-                <a16:creationId xmlns:a16="http://schemas.microsoft.com/office/drawing/2014/main" xmlns="" id="{4541A9EE-A3D1-4F33-9A0B-20CCB9E25AFB}"/>
+                <a16:creationId xmlns="" xmlns:a16="http://schemas.microsoft.com/office/drawing/2014/main" id="{4541A9EE-A3D1-4F33-9A0B-20CCB9E25AFB}"/>
               </a:ext>
             </a:extLst>
           </p:cNvPr>
@@ -19939,7 +19936,7 @@
           <p:cNvPr id="18" name="TextBox 17">
             <a:extLst>
               <a:ext uri="{FF2B5EF4-FFF2-40B4-BE49-F238E27FC236}">
-                <a16:creationId xmlns:a16="http://schemas.microsoft.com/office/drawing/2014/main" xmlns="" id="{CCC70299-4794-4F68-9803-1DD1107BE88F}"/>
+                <a16:creationId xmlns="" xmlns:a16="http://schemas.microsoft.com/office/drawing/2014/main" id="{CCC70299-4794-4F68-9803-1DD1107BE88F}"/>
               </a:ext>
             </a:extLst>
           </p:cNvPr>
@@ -20037,7 +20034,7 @@
           <p:cNvPr id="19" name="TextBox 18">
             <a:extLst>
               <a:ext uri="{FF2B5EF4-FFF2-40B4-BE49-F238E27FC236}">
-                <a16:creationId xmlns:a16="http://schemas.microsoft.com/office/drawing/2014/main" xmlns="" id="{A58CC8A5-6FBA-4BD9-BAD5-CA5868BB2B87}"/>
+                <a16:creationId xmlns="" xmlns:a16="http://schemas.microsoft.com/office/drawing/2014/main" id="{A58CC8A5-6FBA-4BD9-BAD5-CA5868BB2B87}"/>
               </a:ext>
             </a:extLst>
           </p:cNvPr>
@@ -20156,7 +20153,7 @@
           <p:cNvPr id="20" name="TextBox 19">
             <a:extLst>
               <a:ext uri="{FF2B5EF4-FFF2-40B4-BE49-F238E27FC236}">
-                <a16:creationId xmlns:a16="http://schemas.microsoft.com/office/drawing/2014/main" xmlns="" id="{19B8FCED-F5FD-4BB1-9937-D026F7F33A5E}"/>
+                <a16:creationId xmlns="" xmlns:a16="http://schemas.microsoft.com/office/drawing/2014/main" id="{19B8FCED-F5FD-4BB1-9937-D026F7F33A5E}"/>
               </a:ext>
             </a:extLst>
           </p:cNvPr>
@@ -20246,7 +20243,7 @@
           <p:cNvPr id="21" name="TextBox 20">
             <a:extLst>
               <a:ext uri="{FF2B5EF4-FFF2-40B4-BE49-F238E27FC236}">
-                <a16:creationId xmlns:a16="http://schemas.microsoft.com/office/drawing/2014/main" xmlns="" id="{2CDD70E5-6229-4669-8EA6-75FC3CC1F9A1}"/>
+                <a16:creationId xmlns="" xmlns:a16="http://schemas.microsoft.com/office/drawing/2014/main" id="{2CDD70E5-6229-4669-8EA6-75FC3CC1F9A1}"/>
               </a:ext>
             </a:extLst>
           </p:cNvPr>
@@ -20336,7 +20333,7 @@
           <p:cNvPr id="22" name="TextBox 21">
             <a:extLst>
               <a:ext uri="{FF2B5EF4-FFF2-40B4-BE49-F238E27FC236}">
-                <a16:creationId xmlns:a16="http://schemas.microsoft.com/office/drawing/2014/main" xmlns="" id="{8C58EF38-2316-4A9F-97BA-EAFA44C2B223}"/>
+                <a16:creationId xmlns="" xmlns:a16="http://schemas.microsoft.com/office/drawing/2014/main" id="{8C58EF38-2316-4A9F-97BA-EAFA44C2B223}"/>
               </a:ext>
             </a:extLst>
           </p:cNvPr>
@@ -20397,7 +20394,7 @@
           <p:cNvPr id="23" name="Picture 22">
             <a:extLst>
               <a:ext uri="{FF2B5EF4-FFF2-40B4-BE49-F238E27FC236}">
-                <a16:creationId xmlns:a16="http://schemas.microsoft.com/office/drawing/2014/main" xmlns="" id="{DC74D50F-7F5E-4983-A54A-EDA2A647E1E4}"/>
+                <a16:creationId xmlns="" xmlns:a16="http://schemas.microsoft.com/office/drawing/2014/main" id="{DC74D50F-7F5E-4983-A54A-EDA2A647E1E4}"/>
               </a:ext>
             </a:extLst>
           </p:cNvPr>
@@ -20435,7 +20432,7 @@
           <p:cNvPr id="24" name="Freeform: Shape 23">
             <a:extLst>
               <a:ext uri="{FF2B5EF4-FFF2-40B4-BE49-F238E27FC236}">
-                <a16:creationId xmlns:a16="http://schemas.microsoft.com/office/drawing/2014/main" xmlns="" id="{7CB58DFF-3948-4B59-9989-1D2EFB75D986}"/>
+                <a16:creationId xmlns="" xmlns:a16="http://schemas.microsoft.com/office/drawing/2014/main" id="{7CB58DFF-3948-4B59-9989-1D2EFB75D986}"/>
               </a:ext>
             </a:extLst>
           </p:cNvPr>
@@ -20570,7 +20567,7 @@
           <p:cNvPr id="25" name="TextBox 24">
             <a:extLst>
               <a:ext uri="{FF2B5EF4-FFF2-40B4-BE49-F238E27FC236}">
-                <a16:creationId xmlns:a16="http://schemas.microsoft.com/office/drawing/2014/main" xmlns="" id="{F5E9A689-634C-42BC-8D18-BB508481D913}"/>
+                <a16:creationId xmlns="" xmlns:a16="http://schemas.microsoft.com/office/drawing/2014/main" id="{F5E9A689-634C-42BC-8D18-BB508481D913}"/>
               </a:ext>
             </a:extLst>
           </p:cNvPr>
@@ -20714,7 +20711,7 @@
           <p:cNvPr id="2" name="Title 1">
             <a:extLst>
               <a:ext uri="{FF2B5EF4-FFF2-40B4-BE49-F238E27FC236}">
-                <a16:creationId xmlns:a16="http://schemas.microsoft.com/office/drawing/2014/main" xmlns="" id="{56FE19BE-02A6-4DA5-A155-961AB48D7737}"/>
+                <a16:creationId xmlns="" xmlns:a16="http://schemas.microsoft.com/office/drawing/2014/main" id="{56FE19BE-02A6-4DA5-A155-961AB48D7737}"/>
               </a:ext>
             </a:extLst>
           </p:cNvPr>
@@ -20748,7 +20745,7 @@
           <p:cNvPr id="3" name="Subtitle 2">
             <a:extLst>
               <a:ext uri="{FF2B5EF4-FFF2-40B4-BE49-F238E27FC236}">
-                <a16:creationId xmlns:a16="http://schemas.microsoft.com/office/drawing/2014/main" xmlns="" id="{326F0998-17DD-4145-9D6E-A0912D430112}"/>
+                <a16:creationId xmlns="" xmlns:a16="http://schemas.microsoft.com/office/drawing/2014/main" id="{326F0998-17DD-4145-9D6E-A0912D430112}"/>
               </a:ext>
             </a:extLst>
           </p:cNvPr>
@@ -21322,7 +21319,7 @@
           <p:cNvPr id="2" name="Title 1">
             <a:extLst>
               <a:ext uri="{FF2B5EF4-FFF2-40B4-BE49-F238E27FC236}">
-                <a16:creationId xmlns:a16="http://schemas.microsoft.com/office/drawing/2014/main" xmlns="" id="{60D2B032-81DA-4F89-A5D6-4E3805567E43}"/>
+                <a16:creationId xmlns="" xmlns:a16="http://schemas.microsoft.com/office/drawing/2014/main" id="{60D2B032-81DA-4F89-A5D6-4E3805567E43}"/>
               </a:ext>
             </a:extLst>
           </p:cNvPr>
@@ -21356,7 +21353,7 @@
           <p:cNvPr id="3" name="Subtitle 2">
             <a:extLst>
               <a:ext uri="{FF2B5EF4-FFF2-40B4-BE49-F238E27FC236}">
-                <a16:creationId xmlns:a16="http://schemas.microsoft.com/office/drawing/2014/main" xmlns="" id="{70984409-32A6-4614-B370-2C4E4BDD75F7}"/>
+                <a16:creationId xmlns="" xmlns:a16="http://schemas.microsoft.com/office/drawing/2014/main" id="{70984409-32A6-4614-B370-2C4E4BDD75F7}"/>
               </a:ext>
             </a:extLst>
           </p:cNvPr>
@@ -21975,7 +21972,7 @@
           <p:cNvPr id="3" name="Subtitle 2">
             <a:extLst>
               <a:ext uri="{FF2B5EF4-FFF2-40B4-BE49-F238E27FC236}">
-                <a16:creationId xmlns:a16="http://schemas.microsoft.com/office/drawing/2014/main" xmlns="" id="{383EC5EF-217E-4D46-B55F-8949FDA75B87}"/>
+                <a16:creationId xmlns="" xmlns:a16="http://schemas.microsoft.com/office/drawing/2014/main" id="{383EC5EF-217E-4D46-B55F-8949FDA75B87}"/>
               </a:ext>
             </a:extLst>
           </p:cNvPr>
@@ -22393,7 +22390,7 @@
           <p:cNvPr id="2" name="Title 1">
             <a:extLst>
               <a:ext uri="{FF2B5EF4-FFF2-40B4-BE49-F238E27FC236}">
-                <a16:creationId xmlns:a16="http://schemas.microsoft.com/office/drawing/2014/main" xmlns="" id="{B470D714-F857-4376-9E8E-4959742496BC}"/>
+                <a16:creationId xmlns="" xmlns:a16="http://schemas.microsoft.com/office/drawing/2014/main" id="{B470D714-F857-4376-9E8E-4959742496BC}"/>
               </a:ext>
             </a:extLst>
           </p:cNvPr>
@@ -22427,7 +22424,7 @@
           <p:cNvPr id="3" name="Text Placeholder 2">
             <a:extLst>
               <a:ext uri="{FF2B5EF4-FFF2-40B4-BE49-F238E27FC236}">
-                <a16:creationId xmlns:a16="http://schemas.microsoft.com/office/drawing/2014/main" xmlns="" id="{4B4523A1-9070-43BD-B99D-C7768F374C3A}"/>
+                <a16:creationId xmlns="" xmlns:a16="http://schemas.microsoft.com/office/drawing/2014/main" id="{4B4523A1-9070-43BD-B99D-C7768F374C3A}"/>
               </a:ext>
             </a:extLst>
           </p:cNvPr>

</xml_diff>

<commit_message>
Latest changes added to PPT
</commit_message>
<xml_diff>
--- a/DevOpsDoc.pptx
+++ b/DevOpsDoc.pptx
@@ -167,7 +167,7 @@
           <p:cNvPr id="2" name="Header Placeholder 1">
             <a:extLst>
               <a:ext uri="{FF2B5EF4-FFF2-40B4-BE49-F238E27FC236}">
-                <a16:creationId xmlns="" xmlns:a16="http://schemas.microsoft.com/office/drawing/2014/main" id="{D6E57326-DB19-46CE-A32F-DBE2D832CAE7}"/>
+                <a16:creationId xmlns:a16="http://schemas.microsoft.com/office/drawing/2014/main" xmlns="" id="{D6E57326-DB19-46CE-A32F-DBE2D832CAE7}"/>
               </a:ext>
             </a:extLst>
           </p:cNvPr>
@@ -230,7 +230,7 @@
           <p:cNvPr id="3" name="Date Placeholder 2">
             <a:extLst>
               <a:ext uri="{FF2B5EF4-FFF2-40B4-BE49-F238E27FC236}">
-                <a16:creationId xmlns="" xmlns:a16="http://schemas.microsoft.com/office/drawing/2014/main" id="{7941F8D2-1872-4FD3-A085-C16E4659FF3C}"/>
+                <a16:creationId xmlns:a16="http://schemas.microsoft.com/office/drawing/2014/main" xmlns="" id="{7941F8D2-1872-4FD3-A085-C16E4659FF3C}"/>
               </a:ext>
             </a:extLst>
           </p:cNvPr>
@@ -293,7 +293,7 @@
           <p:cNvPr id="4" name="Footer Placeholder 3">
             <a:extLst>
               <a:ext uri="{FF2B5EF4-FFF2-40B4-BE49-F238E27FC236}">
-                <a16:creationId xmlns="" xmlns:a16="http://schemas.microsoft.com/office/drawing/2014/main" id="{8301A39F-B341-4BA4-9BD5-9BC42F49A7E6}"/>
+                <a16:creationId xmlns:a16="http://schemas.microsoft.com/office/drawing/2014/main" xmlns="" id="{8301A39F-B341-4BA4-9BD5-9BC42F49A7E6}"/>
               </a:ext>
             </a:extLst>
           </p:cNvPr>
@@ -356,7 +356,7 @@
           <p:cNvPr id="5" name="Slide Number Placeholder 4">
             <a:extLst>
               <a:ext uri="{FF2B5EF4-FFF2-40B4-BE49-F238E27FC236}">
-                <a16:creationId xmlns="" xmlns:a16="http://schemas.microsoft.com/office/drawing/2014/main" id="{A40ECEAC-6346-435E-B575-E92B9314519F}"/>
+                <a16:creationId xmlns:a16="http://schemas.microsoft.com/office/drawing/2014/main" xmlns="" id="{A40ECEAC-6346-435E-B575-E92B9314519F}"/>
               </a:ext>
             </a:extLst>
           </p:cNvPr>
@@ -455,7 +455,7 @@
           <p:cNvPr id="2" name="Slide Image Placeholder 1">
             <a:extLst>
               <a:ext uri="{FF2B5EF4-FFF2-40B4-BE49-F238E27FC236}">
-                <a16:creationId xmlns="" xmlns:a16="http://schemas.microsoft.com/office/drawing/2014/main" id="{56B3EE74-0C48-46B9-93FB-F8EE8C0E2D78}"/>
+                <a16:creationId xmlns:a16="http://schemas.microsoft.com/office/drawing/2014/main" xmlns="" id="{56B3EE74-0C48-46B9-93FB-F8EE8C0E2D78}"/>
               </a:ext>
             </a:extLst>
           </p:cNvPr>
@@ -488,7 +488,7 @@
           <p:cNvPr id="3" name="Notes Placeholder 2">
             <a:extLst>
               <a:ext uri="{FF2B5EF4-FFF2-40B4-BE49-F238E27FC236}">
-                <a16:creationId xmlns="" xmlns:a16="http://schemas.microsoft.com/office/drawing/2014/main" id="{840AE385-00D5-4C25-9566-AC4A2B1326E1}"/>
+                <a16:creationId xmlns:a16="http://schemas.microsoft.com/office/drawing/2014/main" xmlns="" id="{840AE385-00D5-4C25-9566-AC4A2B1326E1}"/>
               </a:ext>
             </a:extLst>
           </p:cNvPr>
@@ -525,7 +525,7 @@
           <p:cNvPr id="4" name="Header Placeholder 3">
             <a:extLst>
               <a:ext uri="{FF2B5EF4-FFF2-40B4-BE49-F238E27FC236}">
-                <a16:creationId xmlns="" xmlns:a16="http://schemas.microsoft.com/office/drawing/2014/main" id="{F9BD74F9-2EE8-488F-9993-FD40BA9A2E9B}"/>
+                <a16:creationId xmlns:a16="http://schemas.microsoft.com/office/drawing/2014/main" xmlns="" id="{F9BD74F9-2EE8-488F-9993-FD40BA9A2E9B}"/>
               </a:ext>
             </a:extLst>
           </p:cNvPr>
@@ -575,7 +575,7 @@
           <p:cNvPr id="5" name="Date Placeholder 4">
             <a:extLst>
               <a:ext uri="{FF2B5EF4-FFF2-40B4-BE49-F238E27FC236}">
-                <a16:creationId xmlns="" xmlns:a16="http://schemas.microsoft.com/office/drawing/2014/main" id="{66EFB3E6-A928-4B0D-91B8-FB847B4EFEC5}"/>
+                <a16:creationId xmlns:a16="http://schemas.microsoft.com/office/drawing/2014/main" xmlns="" id="{66EFB3E6-A928-4B0D-91B8-FB847B4EFEC5}"/>
               </a:ext>
             </a:extLst>
           </p:cNvPr>
@@ -625,7 +625,7 @@
           <p:cNvPr id="6" name="Footer Placeholder 5">
             <a:extLst>
               <a:ext uri="{FF2B5EF4-FFF2-40B4-BE49-F238E27FC236}">
-                <a16:creationId xmlns="" xmlns:a16="http://schemas.microsoft.com/office/drawing/2014/main" id="{2D610C91-2178-4F85-9333-B569AFCFA8F6}"/>
+                <a16:creationId xmlns:a16="http://schemas.microsoft.com/office/drawing/2014/main" xmlns="" id="{2D610C91-2178-4F85-9333-B569AFCFA8F6}"/>
               </a:ext>
             </a:extLst>
           </p:cNvPr>
@@ -675,7 +675,7 @@
           <p:cNvPr id="7" name="Slide Number Placeholder 6">
             <a:extLst>
               <a:ext uri="{FF2B5EF4-FFF2-40B4-BE49-F238E27FC236}">
-                <a16:creationId xmlns="" xmlns:a16="http://schemas.microsoft.com/office/drawing/2014/main" id="{C56F61DA-B0A4-4EF4-A0FA-C0FB49888F65}"/>
+                <a16:creationId xmlns:a16="http://schemas.microsoft.com/office/drawing/2014/main" xmlns="" id="{C56F61DA-B0A4-4EF4-A0FA-C0FB49888F65}"/>
               </a:ext>
             </a:extLst>
           </p:cNvPr>
@@ -847,7 +847,7 @@
           <p:cNvPr id="7" name="Slide Number Placeholder 6">
             <a:extLst>
               <a:ext uri="{FF2B5EF4-FFF2-40B4-BE49-F238E27FC236}">
-                <a16:creationId xmlns="" xmlns:a16="http://schemas.microsoft.com/office/drawing/2014/main" id="{40F5852B-0720-4086-849B-721EF582D662}"/>
+                <a16:creationId xmlns:a16="http://schemas.microsoft.com/office/drawing/2014/main" xmlns="" id="{40F5852B-0720-4086-849B-721EF582D662}"/>
               </a:ext>
             </a:extLst>
           </p:cNvPr>
@@ -880,7 +880,7 @@
           <p:cNvPr id="2" name="Slide Image Placeholder 1">
             <a:extLst>
               <a:ext uri="{FF2B5EF4-FFF2-40B4-BE49-F238E27FC236}">
-                <a16:creationId xmlns="" xmlns:a16="http://schemas.microsoft.com/office/drawing/2014/main" id="{B6DFC263-1176-4B5C-9F38-D7F1E33000D5}"/>
+                <a16:creationId xmlns:a16="http://schemas.microsoft.com/office/drawing/2014/main" xmlns="" id="{B6DFC263-1176-4B5C-9F38-D7F1E33000D5}"/>
               </a:ext>
             </a:extLst>
           </p:cNvPr>
@@ -912,7 +912,7 @@
           <p:cNvPr id="3" name="Notes Placeholder 2">
             <a:extLst>
               <a:ext uri="{FF2B5EF4-FFF2-40B4-BE49-F238E27FC236}">
-                <a16:creationId xmlns="" xmlns:a16="http://schemas.microsoft.com/office/drawing/2014/main" id="{1E19155A-80DE-4CAB-96DF-8C31B16BD7E4}"/>
+                <a16:creationId xmlns:a16="http://schemas.microsoft.com/office/drawing/2014/main" xmlns="" id="{1E19155A-80DE-4CAB-96DF-8C31B16BD7E4}"/>
               </a:ext>
             </a:extLst>
           </p:cNvPr>
@@ -969,7 +969,7 @@
           <p:cNvPr id="7" name="Slide Number Placeholder 6">
             <a:extLst>
               <a:ext uri="{FF2B5EF4-FFF2-40B4-BE49-F238E27FC236}">
-                <a16:creationId xmlns="" xmlns:a16="http://schemas.microsoft.com/office/drawing/2014/main" id="{02A79D88-D201-4A16-B7FE-80D3644FDA06}"/>
+                <a16:creationId xmlns:a16="http://schemas.microsoft.com/office/drawing/2014/main" xmlns="" id="{02A79D88-D201-4A16-B7FE-80D3644FDA06}"/>
               </a:ext>
             </a:extLst>
           </p:cNvPr>
@@ -1002,7 +1002,7 @@
           <p:cNvPr id="2" name="Slide Image Placeholder 1">
             <a:extLst>
               <a:ext uri="{FF2B5EF4-FFF2-40B4-BE49-F238E27FC236}">
-                <a16:creationId xmlns="" xmlns:a16="http://schemas.microsoft.com/office/drawing/2014/main" id="{519DB808-0089-4EF7-8217-23C290D413D7}"/>
+                <a16:creationId xmlns:a16="http://schemas.microsoft.com/office/drawing/2014/main" xmlns="" id="{519DB808-0089-4EF7-8217-23C290D413D7}"/>
               </a:ext>
             </a:extLst>
           </p:cNvPr>
@@ -1034,7 +1034,7 @@
           <p:cNvPr id="3" name="Notes Placeholder 2">
             <a:extLst>
               <a:ext uri="{FF2B5EF4-FFF2-40B4-BE49-F238E27FC236}">
-                <a16:creationId xmlns="" xmlns:a16="http://schemas.microsoft.com/office/drawing/2014/main" id="{C05682BE-8C80-4B1E-A5E1-96116972309C}"/>
+                <a16:creationId xmlns:a16="http://schemas.microsoft.com/office/drawing/2014/main" xmlns="" id="{C05682BE-8C80-4B1E-A5E1-96116972309C}"/>
               </a:ext>
             </a:extLst>
           </p:cNvPr>
@@ -1089,7 +1089,7 @@
           <p:cNvPr id="7" name="Slide Number Placeholder 6">
             <a:extLst>
               <a:ext uri="{FF2B5EF4-FFF2-40B4-BE49-F238E27FC236}">
-                <a16:creationId xmlns="" xmlns:a16="http://schemas.microsoft.com/office/drawing/2014/main" id="{78F17026-31F0-47F1-8450-2CF9A2ADAB1A}"/>
+                <a16:creationId xmlns:a16="http://schemas.microsoft.com/office/drawing/2014/main" xmlns="" id="{78F17026-31F0-47F1-8450-2CF9A2ADAB1A}"/>
               </a:ext>
             </a:extLst>
           </p:cNvPr>
@@ -1122,7 +1122,7 @@
           <p:cNvPr id="2" name="Slide Image Placeholder 1">
             <a:extLst>
               <a:ext uri="{FF2B5EF4-FFF2-40B4-BE49-F238E27FC236}">
-                <a16:creationId xmlns="" xmlns:a16="http://schemas.microsoft.com/office/drawing/2014/main" id="{38EDD86D-63F0-44FB-9362-F47DDCAC77E9}"/>
+                <a16:creationId xmlns:a16="http://schemas.microsoft.com/office/drawing/2014/main" xmlns="" id="{38EDD86D-63F0-44FB-9362-F47DDCAC77E9}"/>
               </a:ext>
             </a:extLst>
           </p:cNvPr>
@@ -1154,7 +1154,7 @@
           <p:cNvPr id="3" name="Notes Placeholder 2">
             <a:extLst>
               <a:ext uri="{FF2B5EF4-FFF2-40B4-BE49-F238E27FC236}">
-                <a16:creationId xmlns="" xmlns:a16="http://schemas.microsoft.com/office/drawing/2014/main" id="{3FDAB228-C575-45E3-BEEC-CA235CADB7B8}"/>
+                <a16:creationId xmlns:a16="http://schemas.microsoft.com/office/drawing/2014/main" xmlns="" id="{3FDAB228-C575-45E3-BEEC-CA235CADB7B8}"/>
               </a:ext>
             </a:extLst>
           </p:cNvPr>
@@ -1209,7 +1209,7 @@
           <p:cNvPr id="7" name="Slide Number Placeholder 6">
             <a:extLst>
               <a:ext uri="{FF2B5EF4-FFF2-40B4-BE49-F238E27FC236}">
-                <a16:creationId xmlns="" xmlns:a16="http://schemas.microsoft.com/office/drawing/2014/main" id="{10C50BB5-A608-4897-BAFE-94C2273D7B88}"/>
+                <a16:creationId xmlns:a16="http://schemas.microsoft.com/office/drawing/2014/main" xmlns="" id="{10C50BB5-A608-4897-BAFE-94C2273D7B88}"/>
               </a:ext>
             </a:extLst>
           </p:cNvPr>
@@ -1242,7 +1242,7 @@
           <p:cNvPr id="2" name="Slide Image Placeholder 1">
             <a:extLst>
               <a:ext uri="{FF2B5EF4-FFF2-40B4-BE49-F238E27FC236}">
-                <a16:creationId xmlns="" xmlns:a16="http://schemas.microsoft.com/office/drawing/2014/main" id="{A91DAB28-D654-4386-8842-4F0DFDC206CF}"/>
+                <a16:creationId xmlns:a16="http://schemas.microsoft.com/office/drawing/2014/main" xmlns="" id="{A91DAB28-D654-4386-8842-4F0DFDC206CF}"/>
               </a:ext>
             </a:extLst>
           </p:cNvPr>
@@ -1274,7 +1274,7 @@
           <p:cNvPr id="3" name="Notes Placeholder 2">
             <a:extLst>
               <a:ext uri="{FF2B5EF4-FFF2-40B4-BE49-F238E27FC236}">
-                <a16:creationId xmlns="" xmlns:a16="http://schemas.microsoft.com/office/drawing/2014/main" id="{57C76618-2830-44D8-98B2-9EDCD781B5D2}"/>
+                <a16:creationId xmlns:a16="http://schemas.microsoft.com/office/drawing/2014/main" xmlns="" id="{57C76618-2830-44D8-98B2-9EDCD781B5D2}"/>
               </a:ext>
             </a:extLst>
           </p:cNvPr>
@@ -1329,7 +1329,7 @@
           <p:cNvPr id="7" name="Slide Number Placeholder 6">
             <a:extLst>
               <a:ext uri="{FF2B5EF4-FFF2-40B4-BE49-F238E27FC236}">
-                <a16:creationId xmlns="" xmlns:a16="http://schemas.microsoft.com/office/drawing/2014/main" id="{FB1A4F53-8F74-45A6-A35D-53A417DEE47C}"/>
+                <a16:creationId xmlns:a16="http://schemas.microsoft.com/office/drawing/2014/main" xmlns="" id="{FB1A4F53-8F74-45A6-A35D-53A417DEE47C}"/>
               </a:ext>
             </a:extLst>
           </p:cNvPr>
@@ -1362,7 +1362,7 @@
           <p:cNvPr id="2" name="Slide Image Placeholder 1">
             <a:extLst>
               <a:ext uri="{FF2B5EF4-FFF2-40B4-BE49-F238E27FC236}">
-                <a16:creationId xmlns="" xmlns:a16="http://schemas.microsoft.com/office/drawing/2014/main" id="{3B0BD0BD-DB55-40A0-BA2E-8C7ABBC4C05D}"/>
+                <a16:creationId xmlns:a16="http://schemas.microsoft.com/office/drawing/2014/main" xmlns="" id="{3B0BD0BD-DB55-40A0-BA2E-8C7ABBC4C05D}"/>
               </a:ext>
             </a:extLst>
           </p:cNvPr>
@@ -1394,7 +1394,7 @@
           <p:cNvPr id="3" name="Notes Placeholder 2">
             <a:extLst>
               <a:ext uri="{FF2B5EF4-FFF2-40B4-BE49-F238E27FC236}">
-                <a16:creationId xmlns="" xmlns:a16="http://schemas.microsoft.com/office/drawing/2014/main" id="{4D2A1057-477A-475E-8E8A-A9DFB7E51555}"/>
+                <a16:creationId xmlns:a16="http://schemas.microsoft.com/office/drawing/2014/main" xmlns="" id="{4D2A1057-477A-475E-8E8A-A9DFB7E51555}"/>
               </a:ext>
             </a:extLst>
           </p:cNvPr>
@@ -1449,7 +1449,7 @@
           <p:cNvPr id="7" name="Slide Number Placeholder 6">
             <a:extLst>
               <a:ext uri="{FF2B5EF4-FFF2-40B4-BE49-F238E27FC236}">
-                <a16:creationId xmlns="" xmlns:a16="http://schemas.microsoft.com/office/drawing/2014/main" id="{D36E1796-CF27-4BA6-A633-8F6EC2548F4D}"/>
+                <a16:creationId xmlns:a16="http://schemas.microsoft.com/office/drawing/2014/main" xmlns="" id="{D36E1796-CF27-4BA6-A633-8F6EC2548F4D}"/>
               </a:ext>
             </a:extLst>
           </p:cNvPr>
@@ -1482,7 +1482,7 @@
           <p:cNvPr id="2" name="Slide Image Placeholder 1">
             <a:extLst>
               <a:ext uri="{FF2B5EF4-FFF2-40B4-BE49-F238E27FC236}">
-                <a16:creationId xmlns="" xmlns:a16="http://schemas.microsoft.com/office/drawing/2014/main" id="{0A617C37-65A7-4208-9F12-2E134433CB69}"/>
+                <a16:creationId xmlns:a16="http://schemas.microsoft.com/office/drawing/2014/main" xmlns="" id="{0A617C37-65A7-4208-9F12-2E134433CB69}"/>
               </a:ext>
             </a:extLst>
           </p:cNvPr>
@@ -1514,7 +1514,7 @@
           <p:cNvPr id="3" name="Notes Placeholder 2">
             <a:extLst>
               <a:ext uri="{FF2B5EF4-FFF2-40B4-BE49-F238E27FC236}">
-                <a16:creationId xmlns="" xmlns:a16="http://schemas.microsoft.com/office/drawing/2014/main" id="{A5421BA2-C514-4146-9AC1-2FF398A8C648}"/>
+                <a16:creationId xmlns:a16="http://schemas.microsoft.com/office/drawing/2014/main" xmlns="" id="{A5421BA2-C514-4146-9AC1-2FF398A8C648}"/>
               </a:ext>
             </a:extLst>
           </p:cNvPr>
@@ -1569,7 +1569,7 @@
           <p:cNvPr id="7" name="Slide Number Placeholder 6">
             <a:extLst>
               <a:ext uri="{FF2B5EF4-FFF2-40B4-BE49-F238E27FC236}">
-                <a16:creationId xmlns="" xmlns:a16="http://schemas.microsoft.com/office/drawing/2014/main" id="{6F9B2246-67AD-4B43-B466-097047178A79}"/>
+                <a16:creationId xmlns:a16="http://schemas.microsoft.com/office/drawing/2014/main" xmlns="" id="{6F9B2246-67AD-4B43-B466-097047178A79}"/>
               </a:ext>
             </a:extLst>
           </p:cNvPr>
@@ -1602,7 +1602,7 @@
           <p:cNvPr id="2" name="Slide Image Placeholder 1">
             <a:extLst>
               <a:ext uri="{FF2B5EF4-FFF2-40B4-BE49-F238E27FC236}">
-                <a16:creationId xmlns="" xmlns:a16="http://schemas.microsoft.com/office/drawing/2014/main" id="{EF10BE1B-A4E7-4273-97C7-51383BB1F2F8}"/>
+                <a16:creationId xmlns:a16="http://schemas.microsoft.com/office/drawing/2014/main" xmlns="" id="{EF10BE1B-A4E7-4273-97C7-51383BB1F2F8}"/>
               </a:ext>
             </a:extLst>
           </p:cNvPr>
@@ -1634,7 +1634,7 @@
           <p:cNvPr id="3" name="Notes Placeholder 2">
             <a:extLst>
               <a:ext uri="{FF2B5EF4-FFF2-40B4-BE49-F238E27FC236}">
-                <a16:creationId xmlns="" xmlns:a16="http://schemas.microsoft.com/office/drawing/2014/main" id="{ED29ABD6-AC27-44E7-A9B0-8BAF7728F2DC}"/>
+                <a16:creationId xmlns:a16="http://schemas.microsoft.com/office/drawing/2014/main" xmlns="" id="{ED29ABD6-AC27-44E7-A9B0-8BAF7728F2DC}"/>
               </a:ext>
             </a:extLst>
           </p:cNvPr>
@@ -1689,7 +1689,7 @@
           <p:cNvPr id="7" name="Slide Number Placeholder 6">
             <a:extLst>
               <a:ext uri="{FF2B5EF4-FFF2-40B4-BE49-F238E27FC236}">
-                <a16:creationId xmlns="" xmlns:a16="http://schemas.microsoft.com/office/drawing/2014/main" id="{192CE25F-8BDE-4D2B-9536-638EE2504A59}"/>
+                <a16:creationId xmlns:a16="http://schemas.microsoft.com/office/drawing/2014/main" xmlns="" id="{192CE25F-8BDE-4D2B-9536-638EE2504A59}"/>
               </a:ext>
             </a:extLst>
           </p:cNvPr>
@@ -1722,7 +1722,7 @@
           <p:cNvPr id="2" name="Slide Image Placeholder 1">
             <a:extLst>
               <a:ext uri="{FF2B5EF4-FFF2-40B4-BE49-F238E27FC236}">
-                <a16:creationId xmlns="" xmlns:a16="http://schemas.microsoft.com/office/drawing/2014/main" id="{6A845858-CBC4-46D5-8A4B-6A43616BD7F8}"/>
+                <a16:creationId xmlns:a16="http://schemas.microsoft.com/office/drawing/2014/main" xmlns="" id="{6A845858-CBC4-46D5-8A4B-6A43616BD7F8}"/>
               </a:ext>
             </a:extLst>
           </p:cNvPr>
@@ -1754,7 +1754,7 @@
           <p:cNvPr id="3" name="Notes Placeholder 2">
             <a:extLst>
               <a:ext uri="{FF2B5EF4-FFF2-40B4-BE49-F238E27FC236}">
-                <a16:creationId xmlns="" xmlns:a16="http://schemas.microsoft.com/office/drawing/2014/main" id="{EFBF61DF-CBC0-4F31-B7E9-EBF625572FB5}"/>
+                <a16:creationId xmlns:a16="http://schemas.microsoft.com/office/drawing/2014/main" xmlns="" id="{EFBF61DF-CBC0-4F31-B7E9-EBF625572FB5}"/>
               </a:ext>
             </a:extLst>
           </p:cNvPr>
@@ -1811,7 +1811,7 @@
           <p:cNvPr id="7" name="Slide Number Placeholder 6">
             <a:extLst>
               <a:ext uri="{FF2B5EF4-FFF2-40B4-BE49-F238E27FC236}">
-                <a16:creationId xmlns="" xmlns:a16="http://schemas.microsoft.com/office/drawing/2014/main" id="{9E68A892-EA2E-40CD-BC74-281EF1AB011B}"/>
+                <a16:creationId xmlns:a16="http://schemas.microsoft.com/office/drawing/2014/main" xmlns="" id="{9E68A892-EA2E-40CD-BC74-281EF1AB011B}"/>
               </a:ext>
             </a:extLst>
           </p:cNvPr>
@@ -1844,7 +1844,7 @@
           <p:cNvPr id="2" name="Slide Image Placeholder 1">
             <a:extLst>
               <a:ext uri="{FF2B5EF4-FFF2-40B4-BE49-F238E27FC236}">
-                <a16:creationId xmlns="" xmlns:a16="http://schemas.microsoft.com/office/drawing/2014/main" id="{ADC2CDF4-47BE-4042-AAD2-A6E1A85AEE6A}"/>
+                <a16:creationId xmlns:a16="http://schemas.microsoft.com/office/drawing/2014/main" xmlns="" id="{ADC2CDF4-47BE-4042-AAD2-A6E1A85AEE6A}"/>
               </a:ext>
             </a:extLst>
           </p:cNvPr>
@@ -1876,7 +1876,7 @@
           <p:cNvPr id="3" name="Notes Placeholder 2">
             <a:extLst>
               <a:ext uri="{FF2B5EF4-FFF2-40B4-BE49-F238E27FC236}">
-                <a16:creationId xmlns="" xmlns:a16="http://schemas.microsoft.com/office/drawing/2014/main" id="{BF395D89-B3C3-4CDD-8B4C-2541848E5109}"/>
+                <a16:creationId xmlns:a16="http://schemas.microsoft.com/office/drawing/2014/main" xmlns="" id="{BF395D89-B3C3-4CDD-8B4C-2541848E5109}"/>
               </a:ext>
             </a:extLst>
           </p:cNvPr>
@@ -1931,7 +1931,7 @@
           <p:cNvPr id="7" name="Slide Number Placeholder 6">
             <a:extLst>
               <a:ext uri="{FF2B5EF4-FFF2-40B4-BE49-F238E27FC236}">
-                <a16:creationId xmlns="" xmlns:a16="http://schemas.microsoft.com/office/drawing/2014/main" id="{DE15E4C3-5698-4C0B-87BA-91C7740D6D6C}"/>
+                <a16:creationId xmlns:a16="http://schemas.microsoft.com/office/drawing/2014/main" xmlns="" id="{DE15E4C3-5698-4C0B-87BA-91C7740D6D6C}"/>
               </a:ext>
             </a:extLst>
           </p:cNvPr>
@@ -1964,7 +1964,7 @@
           <p:cNvPr id="2" name="Slide Image Placeholder 1">
             <a:extLst>
               <a:ext uri="{FF2B5EF4-FFF2-40B4-BE49-F238E27FC236}">
-                <a16:creationId xmlns="" xmlns:a16="http://schemas.microsoft.com/office/drawing/2014/main" id="{98E02FF0-6F2C-4A70-B23D-36C53C788602}"/>
+                <a16:creationId xmlns:a16="http://schemas.microsoft.com/office/drawing/2014/main" xmlns="" id="{98E02FF0-6F2C-4A70-B23D-36C53C788602}"/>
               </a:ext>
             </a:extLst>
           </p:cNvPr>
@@ -1996,7 +1996,7 @@
           <p:cNvPr id="3" name="Notes Placeholder 2">
             <a:extLst>
               <a:ext uri="{FF2B5EF4-FFF2-40B4-BE49-F238E27FC236}">
-                <a16:creationId xmlns="" xmlns:a16="http://schemas.microsoft.com/office/drawing/2014/main" id="{F490394B-79F8-4165-8E01-7AD2C92B5304}"/>
+                <a16:creationId xmlns:a16="http://schemas.microsoft.com/office/drawing/2014/main" xmlns="" id="{F490394B-79F8-4165-8E01-7AD2C92B5304}"/>
               </a:ext>
             </a:extLst>
           </p:cNvPr>
@@ -2051,7 +2051,7 @@
           <p:cNvPr id="7" name="Slide Number Placeholder 6">
             <a:extLst>
               <a:ext uri="{FF2B5EF4-FFF2-40B4-BE49-F238E27FC236}">
-                <a16:creationId xmlns="" xmlns:a16="http://schemas.microsoft.com/office/drawing/2014/main" id="{DAAF2217-88FE-4FC0-932E-0CE3F9BA57F1}"/>
+                <a16:creationId xmlns:a16="http://schemas.microsoft.com/office/drawing/2014/main" xmlns="" id="{DAAF2217-88FE-4FC0-932E-0CE3F9BA57F1}"/>
               </a:ext>
             </a:extLst>
           </p:cNvPr>
@@ -2084,7 +2084,7 @@
           <p:cNvPr id="2" name="Slide Image Placeholder 1">
             <a:extLst>
               <a:ext uri="{FF2B5EF4-FFF2-40B4-BE49-F238E27FC236}">
-                <a16:creationId xmlns="" xmlns:a16="http://schemas.microsoft.com/office/drawing/2014/main" id="{083753C1-522D-43A8-9636-C2584CE318D7}"/>
+                <a16:creationId xmlns:a16="http://schemas.microsoft.com/office/drawing/2014/main" xmlns="" id="{083753C1-522D-43A8-9636-C2584CE318D7}"/>
               </a:ext>
             </a:extLst>
           </p:cNvPr>
@@ -2116,7 +2116,7 @@
           <p:cNvPr id="3" name="Notes Placeholder 2">
             <a:extLst>
               <a:ext uri="{FF2B5EF4-FFF2-40B4-BE49-F238E27FC236}">
-                <a16:creationId xmlns="" xmlns:a16="http://schemas.microsoft.com/office/drawing/2014/main" id="{141C88B2-4E3C-44CB-9FAE-4571D9A9F80C}"/>
+                <a16:creationId xmlns:a16="http://schemas.microsoft.com/office/drawing/2014/main" xmlns="" id="{141C88B2-4E3C-44CB-9FAE-4571D9A9F80C}"/>
               </a:ext>
             </a:extLst>
           </p:cNvPr>
@@ -2171,7 +2171,7 @@
           <p:cNvPr id="7" name="Slide Number Placeholder 6">
             <a:extLst>
               <a:ext uri="{FF2B5EF4-FFF2-40B4-BE49-F238E27FC236}">
-                <a16:creationId xmlns="" xmlns:a16="http://schemas.microsoft.com/office/drawing/2014/main" id="{31565ACF-9B15-4F71-9B04-D8F67D1FA37D}"/>
+                <a16:creationId xmlns:a16="http://schemas.microsoft.com/office/drawing/2014/main" xmlns="" id="{31565ACF-9B15-4F71-9B04-D8F67D1FA37D}"/>
               </a:ext>
             </a:extLst>
           </p:cNvPr>
@@ -2204,7 +2204,7 @@
           <p:cNvPr id="2" name="Slide Image Placeholder 1">
             <a:extLst>
               <a:ext uri="{FF2B5EF4-FFF2-40B4-BE49-F238E27FC236}">
-                <a16:creationId xmlns="" xmlns:a16="http://schemas.microsoft.com/office/drawing/2014/main" id="{8C17EC3D-BE8E-491E-BBD3-E421D70F3A6E}"/>
+                <a16:creationId xmlns:a16="http://schemas.microsoft.com/office/drawing/2014/main" xmlns="" id="{8C17EC3D-BE8E-491E-BBD3-E421D70F3A6E}"/>
               </a:ext>
             </a:extLst>
           </p:cNvPr>
@@ -2236,7 +2236,7 @@
           <p:cNvPr id="3" name="Notes Placeholder 2">
             <a:extLst>
               <a:ext uri="{FF2B5EF4-FFF2-40B4-BE49-F238E27FC236}">
-                <a16:creationId xmlns="" xmlns:a16="http://schemas.microsoft.com/office/drawing/2014/main" id="{617FB194-E9DC-421B-888D-BA7D7F6D39A9}"/>
+                <a16:creationId xmlns:a16="http://schemas.microsoft.com/office/drawing/2014/main" xmlns="" id="{617FB194-E9DC-421B-888D-BA7D7F6D39A9}"/>
               </a:ext>
             </a:extLst>
           </p:cNvPr>
@@ -2291,7 +2291,7 @@
           <p:cNvPr id="7" name="Slide Number Placeholder 6">
             <a:extLst>
               <a:ext uri="{FF2B5EF4-FFF2-40B4-BE49-F238E27FC236}">
-                <a16:creationId xmlns="" xmlns:a16="http://schemas.microsoft.com/office/drawing/2014/main" id="{8F649087-A288-4176-BE67-248FA60A4DD0}"/>
+                <a16:creationId xmlns:a16="http://schemas.microsoft.com/office/drawing/2014/main" xmlns="" id="{8F649087-A288-4176-BE67-248FA60A4DD0}"/>
               </a:ext>
             </a:extLst>
           </p:cNvPr>
@@ -2324,7 +2324,7 @@
           <p:cNvPr id="2" name="Slide Image Placeholder 1">
             <a:extLst>
               <a:ext uri="{FF2B5EF4-FFF2-40B4-BE49-F238E27FC236}">
-                <a16:creationId xmlns="" xmlns:a16="http://schemas.microsoft.com/office/drawing/2014/main" id="{09B24CC2-6B04-49E6-B36C-F6471F971ECE}"/>
+                <a16:creationId xmlns:a16="http://schemas.microsoft.com/office/drawing/2014/main" xmlns="" id="{09B24CC2-6B04-49E6-B36C-F6471F971ECE}"/>
               </a:ext>
             </a:extLst>
           </p:cNvPr>
@@ -2356,7 +2356,7 @@
           <p:cNvPr id="3" name="Notes Placeholder 2">
             <a:extLst>
               <a:ext uri="{FF2B5EF4-FFF2-40B4-BE49-F238E27FC236}">
-                <a16:creationId xmlns="" xmlns:a16="http://schemas.microsoft.com/office/drawing/2014/main" id="{F0D7765F-C1E1-429E-AAF6-1800A52868DA}"/>
+                <a16:creationId xmlns:a16="http://schemas.microsoft.com/office/drawing/2014/main" xmlns="" id="{F0D7765F-C1E1-429E-AAF6-1800A52868DA}"/>
               </a:ext>
             </a:extLst>
           </p:cNvPr>
@@ -2411,7 +2411,7 @@
           <p:cNvPr id="7" name="Slide Number Placeholder 6">
             <a:extLst>
               <a:ext uri="{FF2B5EF4-FFF2-40B4-BE49-F238E27FC236}">
-                <a16:creationId xmlns="" xmlns:a16="http://schemas.microsoft.com/office/drawing/2014/main" id="{C27D4597-F4F1-4562-BDAF-CB0745E326AD}"/>
+                <a16:creationId xmlns:a16="http://schemas.microsoft.com/office/drawing/2014/main" xmlns="" id="{C27D4597-F4F1-4562-BDAF-CB0745E326AD}"/>
               </a:ext>
             </a:extLst>
           </p:cNvPr>
@@ -2444,7 +2444,7 @@
           <p:cNvPr id="2" name="Slide Image Placeholder 1">
             <a:extLst>
               <a:ext uri="{FF2B5EF4-FFF2-40B4-BE49-F238E27FC236}">
-                <a16:creationId xmlns="" xmlns:a16="http://schemas.microsoft.com/office/drawing/2014/main" id="{656E3635-F752-4900-A883-20AF998493D0}"/>
+                <a16:creationId xmlns:a16="http://schemas.microsoft.com/office/drawing/2014/main" xmlns="" id="{656E3635-F752-4900-A883-20AF998493D0}"/>
               </a:ext>
             </a:extLst>
           </p:cNvPr>
@@ -2476,7 +2476,7 @@
           <p:cNvPr id="3" name="Notes Placeholder 2">
             <a:extLst>
               <a:ext uri="{FF2B5EF4-FFF2-40B4-BE49-F238E27FC236}">
-                <a16:creationId xmlns="" xmlns:a16="http://schemas.microsoft.com/office/drawing/2014/main" id="{AEB79890-228C-4BC0-B92F-6919256F71C1}"/>
+                <a16:creationId xmlns:a16="http://schemas.microsoft.com/office/drawing/2014/main" xmlns="" id="{AEB79890-228C-4BC0-B92F-6919256F71C1}"/>
               </a:ext>
             </a:extLst>
           </p:cNvPr>
@@ -2531,7 +2531,7 @@
           <p:cNvPr id="7" name="Slide Number Placeholder 6">
             <a:extLst>
               <a:ext uri="{FF2B5EF4-FFF2-40B4-BE49-F238E27FC236}">
-                <a16:creationId xmlns="" xmlns:a16="http://schemas.microsoft.com/office/drawing/2014/main" id="{E224EB75-AE75-4303-86AF-AEF820DE604E}"/>
+                <a16:creationId xmlns:a16="http://schemas.microsoft.com/office/drawing/2014/main" xmlns="" id="{E224EB75-AE75-4303-86AF-AEF820DE604E}"/>
               </a:ext>
             </a:extLst>
           </p:cNvPr>
@@ -2564,7 +2564,7 @@
           <p:cNvPr id="2" name="Slide Image Placeholder 1">
             <a:extLst>
               <a:ext uri="{FF2B5EF4-FFF2-40B4-BE49-F238E27FC236}">
-                <a16:creationId xmlns="" xmlns:a16="http://schemas.microsoft.com/office/drawing/2014/main" id="{20A542D5-7053-42C3-AB83-9CE5648B5794}"/>
+                <a16:creationId xmlns:a16="http://schemas.microsoft.com/office/drawing/2014/main" xmlns="" id="{20A542D5-7053-42C3-AB83-9CE5648B5794}"/>
               </a:ext>
             </a:extLst>
           </p:cNvPr>
@@ -2596,7 +2596,7 @@
           <p:cNvPr id="3" name="Notes Placeholder 2">
             <a:extLst>
               <a:ext uri="{FF2B5EF4-FFF2-40B4-BE49-F238E27FC236}">
-                <a16:creationId xmlns="" xmlns:a16="http://schemas.microsoft.com/office/drawing/2014/main" id="{A433F834-6A3C-4988-8512-C5F4F66200DD}"/>
+                <a16:creationId xmlns:a16="http://schemas.microsoft.com/office/drawing/2014/main" xmlns="" id="{A433F834-6A3C-4988-8512-C5F4F66200DD}"/>
               </a:ext>
             </a:extLst>
           </p:cNvPr>
@@ -2651,7 +2651,7 @@
           <p:cNvPr id="2" name="Title 1">
             <a:extLst>
               <a:ext uri="{FF2B5EF4-FFF2-40B4-BE49-F238E27FC236}">
-                <a16:creationId xmlns="" xmlns:a16="http://schemas.microsoft.com/office/drawing/2014/main" id="{94687584-054E-4387-A0AE-8C159EC23556}"/>
+                <a16:creationId xmlns:a16="http://schemas.microsoft.com/office/drawing/2014/main" xmlns="" id="{94687584-054E-4387-A0AE-8C159EC23556}"/>
               </a:ext>
             </a:extLst>
           </p:cNvPr>
@@ -2689,7 +2689,7 @@
           <p:cNvPr id="3" name="Subtitle 2">
             <a:extLst>
               <a:ext uri="{FF2B5EF4-FFF2-40B4-BE49-F238E27FC236}">
-                <a16:creationId xmlns="" xmlns:a16="http://schemas.microsoft.com/office/drawing/2014/main" id="{8DDD8572-14E5-4F62-97B0-46200F3B9F01}"/>
+                <a16:creationId xmlns:a16="http://schemas.microsoft.com/office/drawing/2014/main" xmlns="" id="{8DDD8572-14E5-4F62-97B0-46200F3B9F01}"/>
               </a:ext>
             </a:extLst>
           </p:cNvPr>
@@ -2760,7 +2760,7 @@
           <p:cNvPr id="4" name="Date Placeholder 3">
             <a:extLst>
               <a:ext uri="{FF2B5EF4-FFF2-40B4-BE49-F238E27FC236}">
-                <a16:creationId xmlns="" xmlns:a16="http://schemas.microsoft.com/office/drawing/2014/main" id="{53955512-8EC5-44CA-B2B4-2DA5FDB42103}"/>
+                <a16:creationId xmlns:a16="http://schemas.microsoft.com/office/drawing/2014/main" xmlns="" id="{53955512-8EC5-44CA-B2B4-2DA5FDB42103}"/>
               </a:ext>
             </a:extLst>
           </p:cNvPr>
@@ -2786,7 +2786,7 @@
           <p:cNvPr id="5" name="Footer Placeholder 4">
             <a:extLst>
               <a:ext uri="{FF2B5EF4-FFF2-40B4-BE49-F238E27FC236}">
-                <a16:creationId xmlns="" xmlns:a16="http://schemas.microsoft.com/office/drawing/2014/main" id="{21287E7B-BCEA-463E-ABE7-288FBA9B22CB}"/>
+                <a16:creationId xmlns:a16="http://schemas.microsoft.com/office/drawing/2014/main" xmlns="" id="{21287E7B-BCEA-463E-ABE7-288FBA9B22CB}"/>
               </a:ext>
             </a:extLst>
           </p:cNvPr>
@@ -2812,7 +2812,7 @@
           <p:cNvPr id="6" name="Slide Number Placeholder 5">
             <a:extLst>
               <a:ext uri="{FF2B5EF4-FFF2-40B4-BE49-F238E27FC236}">
-                <a16:creationId xmlns="" xmlns:a16="http://schemas.microsoft.com/office/drawing/2014/main" id="{C02073FA-D23C-42FA-A18C-447358C2E9B5}"/>
+                <a16:creationId xmlns:a16="http://schemas.microsoft.com/office/drawing/2014/main" xmlns="" id="{C02073FA-D23C-42FA-A18C-447358C2E9B5}"/>
               </a:ext>
             </a:extLst>
           </p:cNvPr>
@@ -2871,7 +2871,7 @@
           <p:cNvPr id="2" name="Title 1">
             <a:extLst>
               <a:ext uri="{FF2B5EF4-FFF2-40B4-BE49-F238E27FC236}">
-                <a16:creationId xmlns="" xmlns:a16="http://schemas.microsoft.com/office/drawing/2014/main" id="{F224D66A-05B3-468F-BBBB-BD0FB27048FB}"/>
+                <a16:creationId xmlns:a16="http://schemas.microsoft.com/office/drawing/2014/main" xmlns="" id="{F224D66A-05B3-468F-BBBB-BD0FB27048FB}"/>
               </a:ext>
             </a:extLst>
           </p:cNvPr>
@@ -2900,7 +2900,7 @@
           <p:cNvPr id="3" name="Vertical Text Placeholder 2">
             <a:extLst>
               <a:ext uri="{FF2B5EF4-FFF2-40B4-BE49-F238E27FC236}">
-                <a16:creationId xmlns="" xmlns:a16="http://schemas.microsoft.com/office/drawing/2014/main" id="{E58F7F4E-D070-4025-8327-A3083BB98E16}"/>
+                <a16:creationId xmlns:a16="http://schemas.microsoft.com/office/drawing/2014/main" xmlns="" id="{E58F7F4E-D070-4025-8327-A3083BB98E16}"/>
               </a:ext>
             </a:extLst>
           </p:cNvPr>
@@ -2958,7 +2958,7 @@
           <p:cNvPr id="4" name="Date Placeholder 3">
             <a:extLst>
               <a:ext uri="{FF2B5EF4-FFF2-40B4-BE49-F238E27FC236}">
-                <a16:creationId xmlns="" xmlns:a16="http://schemas.microsoft.com/office/drawing/2014/main" id="{20E11B5D-E39C-4982-8061-9ED6CBD2120A}"/>
+                <a16:creationId xmlns:a16="http://schemas.microsoft.com/office/drawing/2014/main" xmlns="" id="{20E11B5D-E39C-4982-8061-9ED6CBD2120A}"/>
               </a:ext>
             </a:extLst>
           </p:cNvPr>
@@ -2984,7 +2984,7 @@
           <p:cNvPr id="5" name="Footer Placeholder 4">
             <a:extLst>
               <a:ext uri="{FF2B5EF4-FFF2-40B4-BE49-F238E27FC236}">
-                <a16:creationId xmlns="" xmlns:a16="http://schemas.microsoft.com/office/drawing/2014/main" id="{17413EE1-CF5C-4394-A27F-6FFE1F94E54E}"/>
+                <a16:creationId xmlns:a16="http://schemas.microsoft.com/office/drawing/2014/main" xmlns="" id="{17413EE1-CF5C-4394-A27F-6FFE1F94E54E}"/>
               </a:ext>
             </a:extLst>
           </p:cNvPr>
@@ -3010,7 +3010,7 @@
           <p:cNvPr id="6" name="Slide Number Placeholder 5">
             <a:extLst>
               <a:ext uri="{FF2B5EF4-FFF2-40B4-BE49-F238E27FC236}">
-                <a16:creationId xmlns="" xmlns:a16="http://schemas.microsoft.com/office/drawing/2014/main" id="{9EDF2B26-C41D-4D57-BB2B-AA4E9239DDD5}"/>
+                <a16:creationId xmlns:a16="http://schemas.microsoft.com/office/drawing/2014/main" xmlns="" id="{9EDF2B26-C41D-4D57-BB2B-AA4E9239DDD5}"/>
               </a:ext>
             </a:extLst>
           </p:cNvPr>
@@ -3069,7 +3069,7 @@
           <p:cNvPr id="2" name="Vertical Title 1">
             <a:extLst>
               <a:ext uri="{FF2B5EF4-FFF2-40B4-BE49-F238E27FC236}">
-                <a16:creationId xmlns="" xmlns:a16="http://schemas.microsoft.com/office/drawing/2014/main" id="{2567F8C7-D414-40DE-8D48-20815CA6B181}"/>
+                <a16:creationId xmlns:a16="http://schemas.microsoft.com/office/drawing/2014/main" xmlns="" id="{2567F8C7-D414-40DE-8D48-20815CA6B181}"/>
               </a:ext>
             </a:extLst>
           </p:cNvPr>
@@ -3103,7 +3103,7 @@
           <p:cNvPr id="3" name="Vertical Text Placeholder 2">
             <a:extLst>
               <a:ext uri="{FF2B5EF4-FFF2-40B4-BE49-F238E27FC236}">
-                <a16:creationId xmlns="" xmlns:a16="http://schemas.microsoft.com/office/drawing/2014/main" id="{45023D3E-CAD7-47BD-9366-D1D842C84A89}"/>
+                <a16:creationId xmlns:a16="http://schemas.microsoft.com/office/drawing/2014/main" xmlns="" id="{45023D3E-CAD7-47BD-9366-D1D842C84A89}"/>
               </a:ext>
             </a:extLst>
           </p:cNvPr>
@@ -3166,7 +3166,7 @@
           <p:cNvPr id="4" name="Date Placeholder 3">
             <a:extLst>
               <a:ext uri="{FF2B5EF4-FFF2-40B4-BE49-F238E27FC236}">
-                <a16:creationId xmlns="" xmlns:a16="http://schemas.microsoft.com/office/drawing/2014/main" id="{5E31D682-619A-463B-B258-5D88A143541D}"/>
+                <a16:creationId xmlns:a16="http://schemas.microsoft.com/office/drawing/2014/main" xmlns="" id="{5E31D682-619A-463B-B258-5D88A143541D}"/>
               </a:ext>
             </a:extLst>
           </p:cNvPr>
@@ -3192,7 +3192,7 @@
           <p:cNvPr id="5" name="Footer Placeholder 4">
             <a:extLst>
               <a:ext uri="{FF2B5EF4-FFF2-40B4-BE49-F238E27FC236}">
-                <a16:creationId xmlns="" xmlns:a16="http://schemas.microsoft.com/office/drawing/2014/main" id="{23AEBC51-533E-462F-BBE4-15D9BB5AEAAC}"/>
+                <a16:creationId xmlns:a16="http://schemas.microsoft.com/office/drawing/2014/main" xmlns="" id="{23AEBC51-533E-462F-BBE4-15D9BB5AEAAC}"/>
               </a:ext>
             </a:extLst>
           </p:cNvPr>
@@ -3218,7 +3218,7 @@
           <p:cNvPr id="6" name="Slide Number Placeholder 5">
             <a:extLst>
               <a:ext uri="{FF2B5EF4-FFF2-40B4-BE49-F238E27FC236}">
-                <a16:creationId xmlns="" xmlns:a16="http://schemas.microsoft.com/office/drawing/2014/main" id="{AB1C2604-A1DC-43CF-9148-140D7F1C87BF}"/>
+                <a16:creationId xmlns:a16="http://schemas.microsoft.com/office/drawing/2014/main" xmlns="" id="{AB1C2604-A1DC-43CF-9148-140D7F1C87BF}"/>
               </a:ext>
             </a:extLst>
           </p:cNvPr>
@@ -3277,7 +3277,7 @@
           <p:cNvPr id="2" name="Title 1">
             <a:extLst>
               <a:ext uri="{FF2B5EF4-FFF2-40B4-BE49-F238E27FC236}">
-                <a16:creationId xmlns="" xmlns:a16="http://schemas.microsoft.com/office/drawing/2014/main" id="{E271155E-8860-4411-9E6F-95ACF128F3FF}"/>
+                <a16:creationId xmlns:a16="http://schemas.microsoft.com/office/drawing/2014/main" xmlns="" id="{E271155E-8860-4411-9E6F-95ACF128F3FF}"/>
               </a:ext>
             </a:extLst>
           </p:cNvPr>
@@ -3315,7 +3315,7 @@
           <p:cNvPr id="3" name="Subtitle 2">
             <a:extLst>
               <a:ext uri="{FF2B5EF4-FFF2-40B4-BE49-F238E27FC236}">
-                <a16:creationId xmlns="" xmlns:a16="http://schemas.microsoft.com/office/drawing/2014/main" id="{D3549FFE-173C-4507-8B7A-A5DE53F35EC1}"/>
+                <a16:creationId xmlns:a16="http://schemas.microsoft.com/office/drawing/2014/main" xmlns="" id="{D3549FFE-173C-4507-8B7A-A5DE53F35EC1}"/>
               </a:ext>
             </a:extLst>
           </p:cNvPr>
@@ -3386,7 +3386,7 @@
           <p:cNvPr id="4" name="Date Placeholder 3">
             <a:extLst>
               <a:ext uri="{FF2B5EF4-FFF2-40B4-BE49-F238E27FC236}">
-                <a16:creationId xmlns="" xmlns:a16="http://schemas.microsoft.com/office/drawing/2014/main" id="{E98C4F3D-E47A-44A7-ADE8-CFECE966C2E9}"/>
+                <a16:creationId xmlns:a16="http://schemas.microsoft.com/office/drawing/2014/main" xmlns="" id="{E98C4F3D-E47A-44A7-ADE8-CFECE966C2E9}"/>
               </a:ext>
             </a:extLst>
           </p:cNvPr>
@@ -3442,7 +3442,7 @@
           <p:cNvPr id="2" name="Title 1">
             <a:extLst>
               <a:ext uri="{FF2B5EF4-FFF2-40B4-BE49-F238E27FC236}">
-                <a16:creationId xmlns="" xmlns:a16="http://schemas.microsoft.com/office/drawing/2014/main" id="{74B47A0A-7671-4D73-8614-CAE27215A9F1}"/>
+                <a16:creationId xmlns:a16="http://schemas.microsoft.com/office/drawing/2014/main" xmlns="" id="{74B47A0A-7671-4D73-8614-CAE27215A9F1}"/>
               </a:ext>
             </a:extLst>
           </p:cNvPr>
@@ -3471,7 +3471,7 @@
           <p:cNvPr id="3" name="Content Placeholder 2">
             <a:extLst>
               <a:ext uri="{FF2B5EF4-FFF2-40B4-BE49-F238E27FC236}">
-                <a16:creationId xmlns="" xmlns:a16="http://schemas.microsoft.com/office/drawing/2014/main" id="{7D47535E-19AC-4A22-A7D2-5910BBEF6850}"/>
+                <a16:creationId xmlns:a16="http://schemas.microsoft.com/office/drawing/2014/main" xmlns="" id="{7D47535E-19AC-4A22-A7D2-5910BBEF6850}"/>
               </a:ext>
             </a:extLst>
           </p:cNvPr>
@@ -3529,7 +3529,7 @@
           <p:cNvPr id="4" name="Date Placeholder 3">
             <a:extLst>
               <a:ext uri="{FF2B5EF4-FFF2-40B4-BE49-F238E27FC236}">
-                <a16:creationId xmlns="" xmlns:a16="http://schemas.microsoft.com/office/drawing/2014/main" id="{0D4BA1CF-D768-4CD5-91F1-2021A70525D7}"/>
+                <a16:creationId xmlns:a16="http://schemas.microsoft.com/office/drawing/2014/main" xmlns="" id="{0D4BA1CF-D768-4CD5-91F1-2021A70525D7}"/>
               </a:ext>
             </a:extLst>
           </p:cNvPr>
@@ -3585,7 +3585,7 @@
           <p:cNvPr id="2" name="Title 1">
             <a:extLst>
               <a:ext uri="{FF2B5EF4-FFF2-40B4-BE49-F238E27FC236}">
-                <a16:creationId xmlns="" xmlns:a16="http://schemas.microsoft.com/office/drawing/2014/main" id="{86F7385A-08CA-42ED-8A1E-208DFF64FDBD}"/>
+                <a16:creationId xmlns:a16="http://schemas.microsoft.com/office/drawing/2014/main" xmlns="" id="{86F7385A-08CA-42ED-8A1E-208DFF64FDBD}"/>
               </a:ext>
             </a:extLst>
           </p:cNvPr>
@@ -3623,7 +3623,7 @@
           <p:cNvPr id="3" name="Text Placeholder 2">
             <a:extLst>
               <a:ext uri="{FF2B5EF4-FFF2-40B4-BE49-F238E27FC236}">
-                <a16:creationId xmlns="" xmlns:a16="http://schemas.microsoft.com/office/drawing/2014/main" id="{1D7FFC9C-BF26-4FD5-AAF4-D8044D49A48D}"/>
+                <a16:creationId xmlns:a16="http://schemas.microsoft.com/office/drawing/2014/main" xmlns="" id="{1D7FFC9C-BF26-4FD5-AAF4-D8044D49A48D}"/>
               </a:ext>
             </a:extLst>
           </p:cNvPr>
@@ -3748,7 +3748,7 @@
           <p:cNvPr id="4" name="Date Placeholder 3">
             <a:extLst>
               <a:ext uri="{FF2B5EF4-FFF2-40B4-BE49-F238E27FC236}">
-                <a16:creationId xmlns="" xmlns:a16="http://schemas.microsoft.com/office/drawing/2014/main" id="{C3531DD4-9914-49D0-A99B-902B450AA6EB}"/>
+                <a16:creationId xmlns:a16="http://schemas.microsoft.com/office/drawing/2014/main" xmlns="" id="{C3531DD4-9914-49D0-A99B-902B450AA6EB}"/>
               </a:ext>
             </a:extLst>
           </p:cNvPr>
@@ -3804,7 +3804,7 @@
           <p:cNvPr id="2" name="Title 1">
             <a:extLst>
               <a:ext uri="{FF2B5EF4-FFF2-40B4-BE49-F238E27FC236}">
-                <a16:creationId xmlns="" xmlns:a16="http://schemas.microsoft.com/office/drawing/2014/main" id="{369B62DF-9C17-4F7C-A28B-C0068E7229A0}"/>
+                <a16:creationId xmlns:a16="http://schemas.microsoft.com/office/drawing/2014/main" xmlns="" id="{369B62DF-9C17-4F7C-A28B-C0068E7229A0}"/>
               </a:ext>
             </a:extLst>
           </p:cNvPr>
@@ -3833,7 +3833,7 @@
           <p:cNvPr id="3" name="Content Placeholder 2">
             <a:extLst>
               <a:ext uri="{FF2B5EF4-FFF2-40B4-BE49-F238E27FC236}">
-                <a16:creationId xmlns="" xmlns:a16="http://schemas.microsoft.com/office/drawing/2014/main" id="{CE6AE1AB-5246-4540-B512-5F5BB27420EB}"/>
+                <a16:creationId xmlns:a16="http://schemas.microsoft.com/office/drawing/2014/main" xmlns="" id="{CE6AE1AB-5246-4540-B512-5F5BB27420EB}"/>
               </a:ext>
             </a:extLst>
           </p:cNvPr>
@@ -3896,7 +3896,7 @@
           <p:cNvPr id="4" name="Content Placeholder 3">
             <a:extLst>
               <a:ext uri="{FF2B5EF4-FFF2-40B4-BE49-F238E27FC236}">
-                <a16:creationId xmlns="" xmlns:a16="http://schemas.microsoft.com/office/drawing/2014/main" id="{06031C8D-7353-445C-B2C8-132F09781625}"/>
+                <a16:creationId xmlns:a16="http://schemas.microsoft.com/office/drawing/2014/main" xmlns="" id="{06031C8D-7353-445C-B2C8-132F09781625}"/>
               </a:ext>
             </a:extLst>
           </p:cNvPr>
@@ -3959,7 +3959,7 @@
           <p:cNvPr id="5" name="Date Placeholder 4">
             <a:extLst>
               <a:ext uri="{FF2B5EF4-FFF2-40B4-BE49-F238E27FC236}">
-                <a16:creationId xmlns="" xmlns:a16="http://schemas.microsoft.com/office/drawing/2014/main" id="{D4910BEF-9B1A-4E29-BE79-4197DAC95625}"/>
+                <a16:creationId xmlns:a16="http://schemas.microsoft.com/office/drawing/2014/main" xmlns="" id="{D4910BEF-9B1A-4E29-BE79-4197DAC95625}"/>
               </a:ext>
             </a:extLst>
           </p:cNvPr>
@@ -4015,7 +4015,7 @@
           <p:cNvPr id="2" name="Title 1">
             <a:extLst>
               <a:ext uri="{FF2B5EF4-FFF2-40B4-BE49-F238E27FC236}">
-                <a16:creationId xmlns="" xmlns:a16="http://schemas.microsoft.com/office/drawing/2014/main" id="{2B9E1F05-7AB6-4622-8128-C86AD605EAB4}"/>
+                <a16:creationId xmlns:a16="http://schemas.microsoft.com/office/drawing/2014/main" xmlns="" id="{2B9E1F05-7AB6-4622-8128-C86AD605EAB4}"/>
               </a:ext>
             </a:extLst>
           </p:cNvPr>
@@ -4049,7 +4049,7 @@
           <p:cNvPr id="3" name="Text Placeholder 2">
             <a:extLst>
               <a:ext uri="{FF2B5EF4-FFF2-40B4-BE49-F238E27FC236}">
-                <a16:creationId xmlns="" xmlns:a16="http://schemas.microsoft.com/office/drawing/2014/main" id="{844E5F14-700E-4F69-BFEF-8A9D7A94F93E}"/>
+                <a16:creationId xmlns:a16="http://schemas.microsoft.com/office/drawing/2014/main" xmlns="" id="{844E5F14-700E-4F69-BFEF-8A9D7A94F93E}"/>
               </a:ext>
             </a:extLst>
           </p:cNvPr>
@@ -4120,7 +4120,7 @@
           <p:cNvPr id="4" name="Content Placeholder 3">
             <a:extLst>
               <a:ext uri="{FF2B5EF4-FFF2-40B4-BE49-F238E27FC236}">
-                <a16:creationId xmlns="" xmlns:a16="http://schemas.microsoft.com/office/drawing/2014/main" id="{4876AA2B-AE18-4221-8192-7FCD1B4FEC24}"/>
+                <a16:creationId xmlns:a16="http://schemas.microsoft.com/office/drawing/2014/main" xmlns="" id="{4876AA2B-AE18-4221-8192-7FCD1B4FEC24}"/>
               </a:ext>
             </a:extLst>
           </p:cNvPr>
@@ -4183,7 +4183,7 @@
           <p:cNvPr id="5" name="Text Placeholder 4">
             <a:extLst>
               <a:ext uri="{FF2B5EF4-FFF2-40B4-BE49-F238E27FC236}">
-                <a16:creationId xmlns="" xmlns:a16="http://schemas.microsoft.com/office/drawing/2014/main" id="{D15321CC-E60F-450F-97DF-AFBEA26542F2}"/>
+                <a16:creationId xmlns:a16="http://schemas.microsoft.com/office/drawing/2014/main" xmlns="" id="{D15321CC-E60F-450F-97DF-AFBEA26542F2}"/>
               </a:ext>
             </a:extLst>
           </p:cNvPr>
@@ -4254,7 +4254,7 @@
           <p:cNvPr id="6" name="Content Placeholder 5">
             <a:extLst>
               <a:ext uri="{FF2B5EF4-FFF2-40B4-BE49-F238E27FC236}">
-                <a16:creationId xmlns="" xmlns:a16="http://schemas.microsoft.com/office/drawing/2014/main" id="{2CB6A620-2CA7-4D3B-AA56-D974514B8BF2}"/>
+                <a16:creationId xmlns:a16="http://schemas.microsoft.com/office/drawing/2014/main" xmlns="" id="{2CB6A620-2CA7-4D3B-AA56-D974514B8BF2}"/>
               </a:ext>
             </a:extLst>
           </p:cNvPr>
@@ -4317,7 +4317,7 @@
           <p:cNvPr id="7" name="Date Placeholder 6">
             <a:extLst>
               <a:ext uri="{FF2B5EF4-FFF2-40B4-BE49-F238E27FC236}">
-                <a16:creationId xmlns="" xmlns:a16="http://schemas.microsoft.com/office/drawing/2014/main" id="{1688402C-C3D2-456D-8233-0B2A26BE0D04}"/>
+                <a16:creationId xmlns:a16="http://schemas.microsoft.com/office/drawing/2014/main" xmlns="" id="{1688402C-C3D2-456D-8233-0B2A26BE0D04}"/>
               </a:ext>
             </a:extLst>
           </p:cNvPr>
@@ -4373,7 +4373,7 @@
           <p:cNvPr id="2" name="Title 1">
             <a:extLst>
               <a:ext uri="{FF2B5EF4-FFF2-40B4-BE49-F238E27FC236}">
-                <a16:creationId xmlns="" xmlns:a16="http://schemas.microsoft.com/office/drawing/2014/main" id="{77525CDA-1074-4184-9841-D947BD222F31}"/>
+                <a16:creationId xmlns:a16="http://schemas.microsoft.com/office/drawing/2014/main" xmlns="" id="{77525CDA-1074-4184-9841-D947BD222F31}"/>
               </a:ext>
             </a:extLst>
           </p:cNvPr>
@@ -4402,7 +4402,7 @@
           <p:cNvPr id="3" name="Date Placeholder 2">
             <a:extLst>
               <a:ext uri="{FF2B5EF4-FFF2-40B4-BE49-F238E27FC236}">
-                <a16:creationId xmlns="" xmlns:a16="http://schemas.microsoft.com/office/drawing/2014/main" id="{66C844D6-B083-4512-B69B-DCE97C3A2073}"/>
+                <a16:creationId xmlns:a16="http://schemas.microsoft.com/office/drawing/2014/main" xmlns="" id="{66C844D6-B083-4512-B69B-DCE97C3A2073}"/>
               </a:ext>
             </a:extLst>
           </p:cNvPr>
@@ -4458,7 +4458,7 @@
           <p:cNvPr id="2" name="Date Placeholder 1">
             <a:extLst>
               <a:ext uri="{FF2B5EF4-FFF2-40B4-BE49-F238E27FC236}">
-                <a16:creationId xmlns="" xmlns:a16="http://schemas.microsoft.com/office/drawing/2014/main" id="{017FB9A3-711C-4BFC-8909-5BD8B28D4E96}"/>
+                <a16:creationId xmlns:a16="http://schemas.microsoft.com/office/drawing/2014/main" xmlns="" id="{017FB9A3-711C-4BFC-8909-5BD8B28D4E96}"/>
               </a:ext>
             </a:extLst>
           </p:cNvPr>
@@ -4515,7 +4515,7 @@
           <p:cNvPr id="2" name="Title 1">
             <a:extLst>
               <a:ext uri="{FF2B5EF4-FFF2-40B4-BE49-F238E27FC236}">
-                <a16:creationId xmlns="" xmlns:a16="http://schemas.microsoft.com/office/drawing/2014/main" id="{B618D9E1-88B0-4321-9800-5A1D9196D27B}"/>
+                <a16:creationId xmlns:a16="http://schemas.microsoft.com/office/drawing/2014/main" xmlns="" id="{B618D9E1-88B0-4321-9800-5A1D9196D27B}"/>
               </a:ext>
             </a:extLst>
           </p:cNvPr>
@@ -4553,7 +4553,7 @@
           <p:cNvPr id="3" name="Content Placeholder 2">
             <a:extLst>
               <a:ext uri="{FF2B5EF4-FFF2-40B4-BE49-F238E27FC236}">
-                <a16:creationId xmlns="" xmlns:a16="http://schemas.microsoft.com/office/drawing/2014/main" id="{AD000F8F-ACDE-4B15-BC3A-B8A12F298DA0}"/>
+                <a16:creationId xmlns:a16="http://schemas.microsoft.com/office/drawing/2014/main" xmlns="" id="{AD000F8F-ACDE-4B15-BC3A-B8A12F298DA0}"/>
               </a:ext>
             </a:extLst>
           </p:cNvPr>
@@ -4644,7 +4644,7 @@
           <p:cNvPr id="4" name="Text Placeholder 3">
             <a:extLst>
               <a:ext uri="{FF2B5EF4-FFF2-40B4-BE49-F238E27FC236}">
-                <a16:creationId xmlns="" xmlns:a16="http://schemas.microsoft.com/office/drawing/2014/main" id="{ACBD422B-FE4F-4E88-A0AC-43AF732EB30A}"/>
+                <a16:creationId xmlns:a16="http://schemas.microsoft.com/office/drawing/2014/main" xmlns="" id="{ACBD422B-FE4F-4E88-A0AC-43AF732EB30A}"/>
               </a:ext>
             </a:extLst>
           </p:cNvPr>
@@ -4715,7 +4715,7 @@
           <p:cNvPr id="5" name="Date Placeholder 4">
             <a:extLst>
               <a:ext uri="{FF2B5EF4-FFF2-40B4-BE49-F238E27FC236}">
-                <a16:creationId xmlns="" xmlns:a16="http://schemas.microsoft.com/office/drawing/2014/main" id="{E73EFBAE-7932-4ACE-ABB2-A2E4C4441901}"/>
+                <a16:creationId xmlns:a16="http://schemas.microsoft.com/office/drawing/2014/main" xmlns="" id="{E73EFBAE-7932-4ACE-ABB2-A2E4C4441901}"/>
               </a:ext>
             </a:extLst>
           </p:cNvPr>
@@ -4771,7 +4771,7 @@
           <p:cNvPr id="2" name="Title 1">
             <a:extLst>
               <a:ext uri="{FF2B5EF4-FFF2-40B4-BE49-F238E27FC236}">
-                <a16:creationId xmlns="" xmlns:a16="http://schemas.microsoft.com/office/drawing/2014/main" id="{1BAACB76-BFDF-497D-955D-A1E96D9ECCAF}"/>
+                <a16:creationId xmlns:a16="http://schemas.microsoft.com/office/drawing/2014/main" xmlns="" id="{1BAACB76-BFDF-497D-955D-A1E96D9ECCAF}"/>
               </a:ext>
             </a:extLst>
           </p:cNvPr>
@@ -4800,7 +4800,7 @@
           <p:cNvPr id="3" name="Content Placeholder 2">
             <a:extLst>
               <a:ext uri="{FF2B5EF4-FFF2-40B4-BE49-F238E27FC236}">
-                <a16:creationId xmlns="" xmlns:a16="http://schemas.microsoft.com/office/drawing/2014/main" id="{597A0892-82A4-4389-9D60-856B90BADFD2}"/>
+                <a16:creationId xmlns:a16="http://schemas.microsoft.com/office/drawing/2014/main" xmlns="" id="{597A0892-82A4-4389-9D60-856B90BADFD2}"/>
               </a:ext>
             </a:extLst>
           </p:cNvPr>
@@ -4858,7 +4858,7 @@
           <p:cNvPr id="4" name="Date Placeholder 3">
             <a:extLst>
               <a:ext uri="{FF2B5EF4-FFF2-40B4-BE49-F238E27FC236}">
-                <a16:creationId xmlns="" xmlns:a16="http://schemas.microsoft.com/office/drawing/2014/main" id="{17DB5FF4-0D7B-4EDA-BE24-D35EE77B06B5}"/>
+                <a16:creationId xmlns:a16="http://schemas.microsoft.com/office/drawing/2014/main" xmlns="" id="{17DB5FF4-0D7B-4EDA-BE24-D35EE77B06B5}"/>
               </a:ext>
             </a:extLst>
           </p:cNvPr>
@@ -4884,7 +4884,7 @@
           <p:cNvPr id="5" name="Footer Placeholder 4">
             <a:extLst>
               <a:ext uri="{FF2B5EF4-FFF2-40B4-BE49-F238E27FC236}">
-                <a16:creationId xmlns="" xmlns:a16="http://schemas.microsoft.com/office/drawing/2014/main" id="{B6D66EB3-B33A-4B43-805F-B63DB4EA6EEC}"/>
+                <a16:creationId xmlns:a16="http://schemas.microsoft.com/office/drawing/2014/main" xmlns="" id="{B6D66EB3-B33A-4B43-805F-B63DB4EA6EEC}"/>
               </a:ext>
             </a:extLst>
           </p:cNvPr>
@@ -4910,7 +4910,7 @@
           <p:cNvPr id="6" name="Slide Number Placeholder 5">
             <a:extLst>
               <a:ext uri="{FF2B5EF4-FFF2-40B4-BE49-F238E27FC236}">
-                <a16:creationId xmlns="" xmlns:a16="http://schemas.microsoft.com/office/drawing/2014/main" id="{27FDCBD6-55D5-454A-98C4-1CADD7257D7B}"/>
+                <a16:creationId xmlns:a16="http://schemas.microsoft.com/office/drawing/2014/main" xmlns="" id="{27FDCBD6-55D5-454A-98C4-1CADD7257D7B}"/>
               </a:ext>
             </a:extLst>
           </p:cNvPr>
@@ -4969,7 +4969,7 @@
           <p:cNvPr id="2" name="Title 1">
             <a:extLst>
               <a:ext uri="{FF2B5EF4-FFF2-40B4-BE49-F238E27FC236}">
-                <a16:creationId xmlns="" xmlns:a16="http://schemas.microsoft.com/office/drawing/2014/main" id="{5D3CB6B1-6E34-45D0-9BD1-3F87515C4AC4}"/>
+                <a16:creationId xmlns:a16="http://schemas.microsoft.com/office/drawing/2014/main" xmlns="" id="{5D3CB6B1-6E34-45D0-9BD1-3F87515C4AC4}"/>
               </a:ext>
             </a:extLst>
           </p:cNvPr>
@@ -5007,7 +5007,7 @@
           <p:cNvPr id="3" name="Picture Placeholder 2">
             <a:extLst>
               <a:ext uri="{FF2B5EF4-FFF2-40B4-BE49-F238E27FC236}">
-                <a16:creationId xmlns="" xmlns:a16="http://schemas.microsoft.com/office/drawing/2014/main" id="{B01C2629-B10B-44CD-AE5C-C8CC1E87F5F9}"/>
+                <a16:creationId xmlns:a16="http://schemas.microsoft.com/office/drawing/2014/main" xmlns="" id="{B01C2629-B10B-44CD-AE5C-C8CC1E87F5F9}"/>
               </a:ext>
             </a:extLst>
           </p:cNvPr>
@@ -5074,7 +5074,7 @@
           <p:cNvPr id="4" name="Text Placeholder 3">
             <a:extLst>
               <a:ext uri="{FF2B5EF4-FFF2-40B4-BE49-F238E27FC236}">
-                <a16:creationId xmlns="" xmlns:a16="http://schemas.microsoft.com/office/drawing/2014/main" id="{41193340-0D01-4D92-9223-19386E22F456}"/>
+                <a16:creationId xmlns:a16="http://schemas.microsoft.com/office/drawing/2014/main" xmlns="" id="{41193340-0D01-4D92-9223-19386E22F456}"/>
               </a:ext>
             </a:extLst>
           </p:cNvPr>
@@ -5145,7 +5145,7 @@
           <p:cNvPr id="5" name="Date Placeholder 4">
             <a:extLst>
               <a:ext uri="{FF2B5EF4-FFF2-40B4-BE49-F238E27FC236}">
-                <a16:creationId xmlns="" xmlns:a16="http://schemas.microsoft.com/office/drawing/2014/main" id="{5631C6C7-2DC6-4711-B5B7-21FAA3ED4A0C}"/>
+                <a16:creationId xmlns:a16="http://schemas.microsoft.com/office/drawing/2014/main" xmlns="" id="{5631C6C7-2DC6-4711-B5B7-21FAA3ED4A0C}"/>
               </a:ext>
             </a:extLst>
           </p:cNvPr>
@@ -5201,7 +5201,7 @@
           <p:cNvPr id="2" name="Title 1">
             <a:extLst>
               <a:ext uri="{FF2B5EF4-FFF2-40B4-BE49-F238E27FC236}">
-                <a16:creationId xmlns="" xmlns:a16="http://schemas.microsoft.com/office/drawing/2014/main" id="{99F7CF15-EDE1-40C6-9632-9C94330A31E7}"/>
+                <a16:creationId xmlns:a16="http://schemas.microsoft.com/office/drawing/2014/main" xmlns="" id="{99F7CF15-EDE1-40C6-9632-9C94330A31E7}"/>
               </a:ext>
             </a:extLst>
           </p:cNvPr>
@@ -5230,7 +5230,7 @@
           <p:cNvPr id="3" name="Vertical Text Placeholder 2">
             <a:extLst>
               <a:ext uri="{FF2B5EF4-FFF2-40B4-BE49-F238E27FC236}">
-                <a16:creationId xmlns="" xmlns:a16="http://schemas.microsoft.com/office/drawing/2014/main" id="{572C011F-145A-45F0-856E-40C2D7009BDC}"/>
+                <a16:creationId xmlns:a16="http://schemas.microsoft.com/office/drawing/2014/main" xmlns="" id="{572C011F-145A-45F0-856E-40C2D7009BDC}"/>
               </a:ext>
             </a:extLst>
           </p:cNvPr>
@@ -5288,7 +5288,7 @@
           <p:cNvPr id="4" name="Date Placeholder 3">
             <a:extLst>
               <a:ext uri="{FF2B5EF4-FFF2-40B4-BE49-F238E27FC236}">
-                <a16:creationId xmlns="" xmlns:a16="http://schemas.microsoft.com/office/drawing/2014/main" id="{BE316984-F8E3-4BBB-891A-B768CC19EF13}"/>
+                <a16:creationId xmlns:a16="http://schemas.microsoft.com/office/drawing/2014/main" xmlns="" id="{BE316984-F8E3-4BBB-891A-B768CC19EF13}"/>
               </a:ext>
             </a:extLst>
           </p:cNvPr>
@@ -5344,7 +5344,7 @@
           <p:cNvPr id="2" name="Vertical Title 1">
             <a:extLst>
               <a:ext uri="{FF2B5EF4-FFF2-40B4-BE49-F238E27FC236}">
-                <a16:creationId xmlns="" xmlns:a16="http://schemas.microsoft.com/office/drawing/2014/main" id="{4F67AE17-5E3E-4C66-8D02-2745F0DDFFA9}"/>
+                <a16:creationId xmlns:a16="http://schemas.microsoft.com/office/drawing/2014/main" xmlns="" id="{4F67AE17-5E3E-4C66-8D02-2745F0DDFFA9}"/>
               </a:ext>
             </a:extLst>
           </p:cNvPr>
@@ -5378,7 +5378,7 @@
           <p:cNvPr id="3" name="Vertical Text Placeholder 2">
             <a:extLst>
               <a:ext uri="{FF2B5EF4-FFF2-40B4-BE49-F238E27FC236}">
-                <a16:creationId xmlns="" xmlns:a16="http://schemas.microsoft.com/office/drawing/2014/main" id="{03F14FF1-D574-4EC3-B789-D91DBBA9F9C0}"/>
+                <a16:creationId xmlns:a16="http://schemas.microsoft.com/office/drawing/2014/main" xmlns="" id="{03F14FF1-D574-4EC3-B789-D91DBBA9F9C0}"/>
               </a:ext>
             </a:extLst>
           </p:cNvPr>
@@ -5441,7 +5441,7 @@
           <p:cNvPr id="4" name="Date Placeholder 3">
             <a:extLst>
               <a:ext uri="{FF2B5EF4-FFF2-40B4-BE49-F238E27FC236}">
-                <a16:creationId xmlns="" xmlns:a16="http://schemas.microsoft.com/office/drawing/2014/main" id="{8EB547ED-A9E4-40E2-AE30-02BC637176B4}"/>
+                <a16:creationId xmlns:a16="http://schemas.microsoft.com/office/drawing/2014/main" xmlns="" id="{8EB547ED-A9E4-40E2-AE30-02BC637176B4}"/>
               </a:ext>
             </a:extLst>
           </p:cNvPr>
@@ -5497,7 +5497,7 @@
           <p:cNvPr id="2" name="Title 1">
             <a:extLst>
               <a:ext uri="{FF2B5EF4-FFF2-40B4-BE49-F238E27FC236}">
-                <a16:creationId xmlns="" xmlns:a16="http://schemas.microsoft.com/office/drawing/2014/main" id="{D9D6855A-49AD-43DF-AFB5-26CEE6584415}"/>
+                <a16:creationId xmlns:a16="http://schemas.microsoft.com/office/drawing/2014/main" xmlns="" id="{D9D6855A-49AD-43DF-AFB5-26CEE6584415}"/>
               </a:ext>
             </a:extLst>
           </p:cNvPr>
@@ -5535,7 +5535,7 @@
           <p:cNvPr id="3" name="Text Placeholder 2">
             <a:extLst>
               <a:ext uri="{FF2B5EF4-FFF2-40B4-BE49-F238E27FC236}">
-                <a16:creationId xmlns="" xmlns:a16="http://schemas.microsoft.com/office/drawing/2014/main" id="{9CE04F08-061E-40D4-95FA-C8D3942E202D}"/>
+                <a16:creationId xmlns:a16="http://schemas.microsoft.com/office/drawing/2014/main" xmlns="" id="{9CE04F08-061E-40D4-95FA-C8D3942E202D}"/>
               </a:ext>
             </a:extLst>
           </p:cNvPr>
@@ -5660,7 +5660,7 @@
           <p:cNvPr id="4" name="Date Placeholder 3">
             <a:extLst>
               <a:ext uri="{FF2B5EF4-FFF2-40B4-BE49-F238E27FC236}">
-                <a16:creationId xmlns="" xmlns:a16="http://schemas.microsoft.com/office/drawing/2014/main" id="{FCCBCC3F-1149-4378-A833-37E20CB6C359}"/>
+                <a16:creationId xmlns:a16="http://schemas.microsoft.com/office/drawing/2014/main" xmlns="" id="{FCCBCC3F-1149-4378-A833-37E20CB6C359}"/>
               </a:ext>
             </a:extLst>
           </p:cNvPr>
@@ -5686,7 +5686,7 @@
           <p:cNvPr id="5" name="Footer Placeholder 4">
             <a:extLst>
               <a:ext uri="{FF2B5EF4-FFF2-40B4-BE49-F238E27FC236}">
-                <a16:creationId xmlns="" xmlns:a16="http://schemas.microsoft.com/office/drawing/2014/main" id="{9D1A91DE-8C7C-40AD-8836-62072D99411A}"/>
+                <a16:creationId xmlns:a16="http://schemas.microsoft.com/office/drawing/2014/main" xmlns="" id="{9D1A91DE-8C7C-40AD-8836-62072D99411A}"/>
               </a:ext>
             </a:extLst>
           </p:cNvPr>
@@ -5712,7 +5712,7 @@
           <p:cNvPr id="6" name="Slide Number Placeholder 5">
             <a:extLst>
               <a:ext uri="{FF2B5EF4-FFF2-40B4-BE49-F238E27FC236}">
-                <a16:creationId xmlns="" xmlns:a16="http://schemas.microsoft.com/office/drawing/2014/main" id="{FD330BEF-7F5C-49EF-97CB-D0453D40C104}"/>
+                <a16:creationId xmlns:a16="http://schemas.microsoft.com/office/drawing/2014/main" xmlns="" id="{FD330BEF-7F5C-49EF-97CB-D0453D40C104}"/>
               </a:ext>
             </a:extLst>
           </p:cNvPr>
@@ -5771,7 +5771,7 @@
           <p:cNvPr id="2" name="Title 1">
             <a:extLst>
               <a:ext uri="{FF2B5EF4-FFF2-40B4-BE49-F238E27FC236}">
-                <a16:creationId xmlns="" xmlns:a16="http://schemas.microsoft.com/office/drawing/2014/main" id="{7FFD13EB-93D3-4084-916F-4F5B23E99E49}"/>
+                <a16:creationId xmlns:a16="http://schemas.microsoft.com/office/drawing/2014/main" xmlns="" id="{7FFD13EB-93D3-4084-916F-4F5B23E99E49}"/>
               </a:ext>
             </a:extLst>
           </p:cNvPr>
@@ -5800,7 +5800,7 @@
           <p:cNvPr id="3" name="Content Placeholder 2">
             <a:extLst>
               <a:ext uri="{FF2B5EF4-FFF2-40B4-BE49-F238E27FC236}">
-                <a16:creationId xmlns="" xmlns:a16="http://schemas.microsoft.com/office/drawing/2014/main" id="{055040FF-C5C0-4E22-920B-4928A7F29536}"/>
+                <a16:creationId xmlns:a16="http://schemas.microsoft.com/office/drawing/2014/main" xmlns="" id="{055040FF-C5C0-4E22-920B-4928A7F29536}"/>
               </a:ext>
             </a:extLst>
           </p:cNvPr>
@@ -5863,7 +5863,7 @@
           <p:cNvPr id="4" name="Content Placeholder 3">
             <a:extLst>
               <a:ext uri="{FF2B5EF4-FFF2-40B4-BE49-F238E27FC236}">
-                <a16:creationId xmlns="" xmlns:a16="http://schemas.microsoft.com/office/drawing/2014/main" id="{A410DC22-3687-4238-A625-AEDD9DE014E9}"/>
+                <a16:creationId xmlns:a16="http://schemas.microsoft.com/office/drawing/2014/main" xmlns="" id="{A410DC22-3687-4238-A625-AEDD9DE014E9}"/>
               </a:ext>
             </a:extLst>
           </p:cNvPr>
@@ -5926,7 +5926,7 @@
           <p:cNvPr id="5" name="Date Placeholder 4">
             <a:extLst>
               <a:ext uri="{FF2B5EF4-FFF2-40B4-BE49-F238E27FC236}">
-                <a16:creationId xmlns="" xmlns:a16="http://schemas.microsoft.com/office/drawing/2014/main" id="{BC4E559F-3021-4BAA-A96B-CD657B93E716}"/>
+                <a16:creationId xmlns:a16="http://schemas.microsoft.com/office/drawing/2014/main" xmlns="" id="{BC4E559F-3021-4BAA-A96B-CD657B93E716}"/>
               </a:ext>
             </a:extLst>
           </p:cNvPr>
@@ -5952,7 +5952,7 @@
           <p:cNvPr id="6" name="Footer Placeholder 5">
             <a:extLst>
               <a:ext uri="{FF2B5EF4-FFF2-40B4-BE49-F238E27FC236}">
-                <a16:creationId xmlns="" xmlns:a16="http://schemas.microsoft.com/office/drawing/2014/main" id="{C7678617-F999-4ECE-8D0E-FB4F1180562C}"/>
+                <a16:creationId xmlns:a16="http://schemas.microsoft.com/office/drawing/2014/main" xmlns="" id="{C7678617-F999-4ECE-8D0E-FB4F1180562C}"/>
               </a:ext>
             </a:extLst>
           </p:cNvPr>
@@ -5978,7 +5978,7 @@
           <p:cNvPr id="7" name="Slide Number Placeholder 6">
             <a:extLst>
               <a:ext uri="{FF2B5EF4-FFF2-40B4-BE49-F238E27FC236}">
-                <a16:creationId xmlns="" xmlns:a16="http://schemas.microsoft.com/office/drawing/2014/main" id="{F3225577-1B3A-4F87-AE70-A35DF13EEC04}"/>
+                <a16:creationId xmlns:a16="http://schemas.microsoft.com/office/drawing/2014/main" xmlns="" id="{F3225577-1B3A-4F87-AE70-A35DF13EEC04}"/>
               </a:ext>
             </a:extLst>
           </p:cNvPr>
@@ -6037,7 +6037,7 @@
           <p:cNvPr id="2" name="Title 1">
             <a:extLst>
               <a:ext uri="{FF2B5EF4-FFF2-40B4-BE49-F238E27FC236}">
-                <a16:creationId xmlns="" xmlns:a16="http://schemas.microsoft.com/office/drawing/2014/main" id="{C21BE728-C522-4AAF-9410-9F270985DB0C}"/>
+                <a16:creationId xmlns:a16="http://schemas.microsoft.com/office/drawing/2014/main" xmlns="" id="{C21BE728-C522-4AAF-9410-9F270985DB0C}"/>
               </a:ext>
             </a:extLst>
           </p:cNvPr>
@@ -6071,7 +6071,7 @@
           <p:cNvPr id="3" name="Text Placeholder 2">
             <a:extLst>
               <a:ext uri="{FF2B5EF4-FFF2-40B4-BE49-F238E27FC236}">
-                <a16:creationId xmlns="" xmlns:a16="http://schemas.microsoft.com/office/drawing/2014/main" id="{F667F659-E354-4921-B4C2-6D837D4FF26C}"/>
+                <a16:creationId xmlns:a16="http://schemas.microsoft.com/office/drawing/2014/main" xmlns="" id="{F667F659-E354-4921-B4C2-6D837D4FF26C}"/>
               </a:ext>
             </a:extLst>
           </p:cNvPr>
@@ -6142,7 +6142,7 @@
           <p:cNvPr id="4" name="Content Placeholder 3">
             <a:extLst>
               <a:ext uri="{FF2B5EF4-FFF2-40B4-BE49-F238E27FC236}">
-                <a16:creationId xmlns="" xmlns:a16="http://schemas.microsoft.com/office/drawing/2014/main" id="{9A7582C2-B5CC-4711-9A9D-467B3F65E7F9}"/>
+                <a16:creationId xmlns:a16="http://schemas.microsoft.com/office/drawing/2014/main" xmlns="" id="{9A7582C2-B5CC-4711-9A9D-467B3F65E7F9}"/>
               </a:ext>
             </a:extLst>
           </p:cNvPr>
@@ -6205,7 +6205,7 @@
           <p:cNvPr id="5" name="Text Placeholder 4">
             <a:extLst>
               <a:ext uri="{FF2B5EF4-FFF2-40B4-BE49-F238E27FC236}">
-                <a16:creationId xmlns="" xmlns:a16="http://schemas.microsoft.com/office/drawing/2014/main" id="{B7C39FE8-6295-4121-BCE1-88234991047B}"/>
+                <a16:creationId xmlns:a16="http://schemas.microsoft.com/office/drawing/2014/main" xmlns="" id="{B7C39FE8-6295-4121-BCE1-88234991047B}"/>
               </a:ext>
             </a:extLst>
           </p:cNvPr>
@@ -6276,7 +6276,7 @@
           <p:cNvPr id="6" name="Content Placeholder 5">
             <a:extLst>
               <a:ext uri="{FF2B5EF4-FFF2-40B4-BE49-F238E27FC236}">
-                <a16:creationId xmlns="" xmlns:a16="http://schemas.microsoft.com/office/drawing/2014/main" id="{493D5A10-2714-484D-8890-E36FB887399C}"/>
+                <a16:creationId xmlns:a16="http://schemas.microsoft.com/office/drawing/2014/main" xmlns="" id="{493D5A10-2714-484D-8890-E36FB887399C}"/>
               </a:ext>
             </a:extLst>
           </p:cNvPr>
@@ -6339,7 +6339,7 @@
           <p:cNvPr id="7" name="Date Placeholder 6">
             <a:extLst>
               <a:ext uri="{FF2B5EF4-FFF2-40B4-BE49-F238E27FC236}">
-                <a16:creationId xmlns="" xmlns:a16="http://schemas.microsoft.com/office/drawing/2014/main" id="{044C0ACC-6DB4-421D-964A-67DA3F2E1412}"/>
+                <a16:creationId xmlns:a16="http://schemas.microsoft.com/office/drawing/2014/main" xmlns="" id="{044C0ACC-6DB4-421D-964A-67DA3F2E1412}"/>
               </a:ext>
             </a:extLst>
           </p:cNvPr>
@@ -6365,7 +6365,7 @@
           <p:cNvPr id="8" name="Footer Placeholder 7">
             <a:extLst>
               <a:ext uri="{FF2B5EF4-FFF2-40B4-BE49-F238E27FC236}">
-                <a16:creationId xmlns="" xmlns:a16="http://schemas.microsoft.com/office/drawing/2014/main" id="{1746347F-C8BE-4B4B-A1D9-D1C0DF33B437}"/>
+                <a16:creationId xmlns:a16="http://schemas.microsoft.com/office/drawing/2014/main" xmlns="" id="{1746347F-C8BE-4B4B-A1D9-D1C0DF33B437}"/>
               </a:ext>
             </a:extLst>
           </p:cNvPr>
@@ -6391,7 +6391,7 @@
           <p:cNvPr id="9" name="Slide Number Placeholder 8">
             <a:extLst>
               <a:ext uri="{FF2B5EF4-FFF2-40B4-BE49-F238E27FC236}">
-                <a16:creationId xmlns="" xmlns:a16="http://schemas.microsoft.com/office/drawing/2014/main" id="{A4FFBFB5-8765-4803-B151-9522B42A1D15}"/>
+                <a16:creationId xmlns:a16="http://schemas.microsoft.com/office/drawing/2014/main" xmlns="" id="{A4FFBFB5-8765-4803-B151-9522B42A1D15}"/>
               </a:ext>
             </a:extLst>
           </p:cNvPr>
@@ -6450,7 +6450,7 @@
           <p:cNvPr id="2" name="Title 1">
             <a:extLst>
               <a:ext uri="{FF2B5EF4-FFF2-40B4-BE49-F238E27FC236}">
-                <a16:creationId xmlns="" xmlns:a16="http://schemas.microsoft.com/office/drawing/2014/main" id="{E2ACA9D4-34A0-474D-8103-7FF6B3C815B8}"/>
+                <a16:creationId xmlns:a16="http://schemas.microsoft.com/office/drawing/2014/main" xmlns="" id="{E2ACA9D4-34A0-474D-8103-7FF6B3C815B8}"/>
               </a:ext>
             </a:extLst>
           </p:cNvPr>
@@ -6479,7 +6479,7 @@
           <p:cNvPr id="3" name="Date Placeholder 2">
             <a:extLst>
               <a:ext uri="{FF2B5EF4-FFF2-40B4-BE49-F238E27FC236}">
-                <a16:creationId xmlns="" xmlns:a16="http://schemas.microsoft.com/office/drawing/2014/main" id="{69DBCBC1-D830-4EA6-9888-95EFC9B0E732}"/>
+                <a16:creationId xmlns:a16="http://schemas.microsoft.com/office/drawing/2014/main" xmlns="" id="{69DBCBC1-D830-4EA6-9888-95EFC9B0E732}"/>
               </a:ext>
             </a:extLst>
           </p:cNvPr>
@@ -6505,7 +6505,7 @@
           <p:cNvPr id="4" name="Footer Placeholder 3">
             <a:extLst>
               <a:ext uri="{FF2B5EF4-FFF2-40B4-BE49-F238E27FC236}">
-                <a16:creationId xmlns="" xmlns:a16="http://schemas.microsoft.com/office/drawing/2014/main" id="{0DDF4A73-0A96-46BD-8336-6E3B8A914FF6}"/>
+                <a16:creationId xmlns:a16="http://schemas.microsoft.com/office/drawing/2014/main" xmlns="" id="{0DDF4A73-0A96-46BD-8336-6E3B8A914FF6}"/>
               </a:ext>
             </a:extLst>
           </p:cNvPr>
@@ -6531,7 +6531,7 @@
           <p:cNvPr id="5" name="Slide Number Placeholder 4">
             <a:extLst>
               <a:ext uri="{FF2B5EF4-FFF2-40B4-BE49-F238E27FC236}">
-                <a16:creationId xmlns="" xmlns:a16="http://schemas.microsoft.com/office/drawing/2014/main" id="{104B0559-D767-4CC5-BE93-1EA77833DC3D}"/>
+                <a16:creationId xmlns:a16="http://schemas.microsoft.com/office/drawing/2014/main" xmlns="" id="{104B0559-D767-4CC5-BE93-1EA77833DC3D}"/>
               </a:ext>
             </a:extLst>
           </p:cNvPr>
@@ -6590,7 +6590,7 @@
           <p:cNvPr id="2" name="Date Placeholder 1">
             <a:extLst>
               <a:ext uri="{FF2B5EF4-FFF2-40B4-BE49-F238E27FC236}">
-                <a16:creationId xmlns="" xmlns:a16="http://schemas.microsoft.com/office/drawing/2014/main" id="{91798AE8-4B22-447B-840A-C9AE491B394D}"/>
+                <a16:creationId xmlns:a16="http://schemas.microsoft.com/office/drawing/2014/main" xmlns="" id="{91798AE8-4B22-447B-840A-C9AE491B394D}"/>
               </a:ext>
             </a:extLst>
           </p:cNvPr>
@@ -6616,7 +6616,7 @@
           <p:cNvPr id="3" name="Footer Placeholder 2">
             <a:extLst>
               <a:ext uri="{FF2B5EF4-FFF2-40B4-BE49-F238E27FC236}">
-                <a16:creationId xmlns="" xmlns:a16="http://schemas.microsoft.com/office/drawing/2014/main" id="{BF633C48-ADE8-4BCD-A140-CD6FCA64A18B}"/>
+                <a16:creationId xmlns:a16="http://schemas.microsoft.com/office/drawing/2014/main" xmlns="" id="{BF633C48-ADE8-4BCD-A140-CD6FCA64A18B}"/>
               </a:ext>
             </a:extLst>
           </p:cNvPr>
@@ -6642,7 +6642,7 @@
           <p:cNvPr id="4" name="Slide Number Placeholder 3">
             <a:extLst>
               <a:ext uri="{FF2B5EF4-FFF2-40B4-BE49-F238E27FC236}">
-                <a16:creationId xmlns="" xmlns:a16="http://schemas.microsoft.com/office/drawing/2014/main" id="{5A437E5F-0D2A-402F-A638-E6219D870D1E}"/>
+                <a16:creationId xmlns:a16="http://schemas.microsoft.com/office/drawing/2014/main" xmlns="" id="{5A437E5F-0D2A-402F-A638-E6219D870D1E}"/>
               </a:ext>
             </a:extLst>
           </p:cNvPr>
@@ -6702,7 +6702,7 @@
           <p:cNvPr id="2" name="Title 1">
             <a:extLst>
               <a:ext uri="{FF2B5EF4-FFF2-40B4-BE49-F238E27FC236}">
-                <a16:creationId xmlns="" xmlns:a16="http://schemas.microsoft.com/office/drawing/2014/main" id="{AADFE01B-DB16-43DB-B032-5A93A6111197}"/>
+                <a16:creationId xmlns:a16="http://schemas.microsoft.com/office/drawing/2014/main" xmlns="" id="{AADFE01B-DB16-43DB-B032-5A93A6111197}"/>
               </a:ext>
             </a:extLst>
           </p:cNvPr>
@@ -6740,7 +6740,7 @@
           <p:cNvPr id="3" name="Content Placeholder 2">
             <a:extLst>
               <a:ext uri="{FF2B5EF4-FFF2-40B4-BE49-F238E27FC236}">
-                <a16:creationId xmlns="" xmlns:a16="http://schemas.microsoft.com/office/drawing/2014/main" id="{867460B4-F97D-4C87-9E8D-5FAD3214C82A}"/>
+                <a16:creationId xmlns:a16="http://schemas.microsoft.com/office/drawing/2014/main" xmlns="" id="{867460B4-F97D-4C87-9E8D-5FAD3214C82A}"/>
               </a:ext>
             </a:extLst>
           </p:cNvPr>
@@ -6831,7 +6831,7 @@
           <p:cNvPr id="4" name="Text Placeholder 3">
             <a:extLst>
               <a:ext uri="{FF2B5EF4-FFF2-40B4-BE49-F238E27FC236}">
-                <a16:creationId xmlns="" xmlns:a16="http://schemas.microsoft.com/office/drawing/2014/main" id="{46238EC0-42FF-4F2F-858C-4BBE644D06B5}"/>
+                <a16:creationId xmlns:a16="http://schemas.microsoft.com/office/drawing/2014/main" xmlns="" id="{46238EC0-42FF-4F2F-858C-4BBE644D06B5}"/>
               </a:ext>
             </a:extLst>
           </p:cNvPr>
@@ -6902,7 +6902,7 @@
           <p:cNvPr id="5" name="Date Placeholder 4">
             <a:extLst>
               <a:ext uri="{FF2B5EF4-FFF2-40B4-BE49-F238E27FC236}">
-                <a16:creationId xmlns="" xmlns:a16="http://schemas.microsoft.com/office/drawing/2014/main" id="{7B4C5D92-4B63-4927-A417-B61BE17EF01F}"/>
+                <a16:creationId xmlns:a16="http://schemas.microsoft.com/office/drawing/2014/main" xmlns="" id="{7B4C5D92-4B63-4927-A417-B61BE17EF01F}"/>
               </a:ext>
             </a:extLst>
           </p:cNvPr>
@@ -6928,7 +6928,7 @@
           <p:cNvPr id="6" name="Footer Placeholder 5">
             <a:extLst>
               <a:ext uri="{FF2B5EF4-FFF2-40B4-BE49-F238E27FC236}">
-                <a16:creationId xmlns="" xmlns:a16="http://schemas.microsoft.com/office/drawing/2014/main" id="{67E2A5EF-B2D4-4516-99CB-9B0824FE35B8}"/>
+                <a16:creationId xmlns:a16="http://schemas.microsoft.com/office/drawing/2014/main" xmlns="" id="{67E2A5EF-B2D4-4516-99CB-9B0824FE35B8}"/>
               </a:ext>
             </a:extLst>
           </p:cNvPr>
@@ -6954,7 +6954,7 @@
           <p:cNvPr id="7" name="Slide Number Placeholder 6">
             <a:extLst>
               <a:ext uri="{FF2B5EF4-FFF2-40B4-BE49-F238E27FC236}">
-                <a16:creationId xmlns="" xmlns:a16="http://schemas.microsoft.com/office/drawing/2014/main" id="{8F85532E-9B60-4F6E-824E-6EA1F3C55D1E}"/>
+                <a16:creationId xmlns:a16="http://schemas.microsoft.com/office/drawing/2014/main" xmlns="" id="{8F85532E-9B60-4F6E-824E-6EA1F3C55D1E}"/>
               </a:ext>
             </a:extLst>
           </p:cNvPr>
@@ -7013,7 +7013,7 @@
           <p:cNvPr id="2" name="Title 1">
             <a:extLst>
               <a:ext uri="{FF2B5EF4-FFF2-40B4-BE49-F238E27FC236}">
-                <a16:creationId xmlns="" xmlns:a16="http://schemas.microsoft.com/office/drawing/2014/main" id="{074AB8FB-BD6C-4BC7-994C-FC5ED1ADE20C}"/>
+                <a16:creationId xmlns:a16="http://schemas.microsoft.com/office/drawing/2014/main" xmlns="" id="{074AB8FB-BD6C-4BC7-994C-FC5ED1ADE20C}"/>
               </a:ext>
             </a:extLst>
           </p:cNvPr>
@@ -7051,7 +7051,7 @@
           <p:cNvPr id="3" name="Picture Placeholder 2">
             <a:extLst>
               <a:ext uri="{FF2B5EF4-FFF2-40B4-BE49-F238E27FC236}">
-                <a16:creationId xmlns="" xmlns:a16="http://schemas.microsoft.com/office/drawing/2014/main" id="{6DB84D36-3C2A-4655-83F9-A5655720DE62}"/>
+                <a16:creationId xmlns:a16="http://schemas.microsoft.com/office/drawing/2014/main" xmlns="" id="{6DB84D36-3C2A-4655-83F9-A5655720DE62}"/>
               </a:ext>
             </a:extLst>
           </p:cNvPr>
@@ -7118,7 +7118,7 @@
           <p:cNvPr id="4" name="Text Placeholder 3">
             <a:extLst>
               <a:ext uri="{FF2B5EF4-FFF2-40B4-BE49-F238E27FC236}">
-                <a16:creationId xmlns="" xmlns:a16="http://schemas.microsoft.com/office/drawing/2014/main" id="{7BEF2EA5-9F1E-4971-82DC-2017F3205D93}"/>
+                <a16:creationId xmlns:a16="http://schemas.microsoft.com/office/drawing/2014/main" xmlns="" id="{7BEF2EA5-9F1E-4971-82DC-2017F3205D93}"/>
               </a:ext>
             </a:extLst>
           </p:cNvPr>
@@ -7189,7 +7189,7 @@
           <p:cNvPr id="5" name="Date Placeholder 4">
             <a:extLst>
               <a:ext uri="{FF2B5EF4-FFF2-40B4-BE49-F238E27FC236}">
-                <a16:creationId xmlns="" xmlns:a16="http://schemas.microsoft.com/office/drawing/2014/main" id="{02F37736-77B3-492F-9600-3EE9D6F4B203}"/>
+                <a16:creationId xmlns:a16="http://schemas.microsoft.com/office/drawing/2014/main" xmlns="" id="{02F37736-77B3-492F-9600-3EE9D6F4B203}"/>
               </a:ext>
             </a:extLst>
           </p:cNvPr>
@@ -7215,7 +7215,7 @@
           <p:cNvPr id="6" name="Footer Placeholder 5">
             <a:extLst>
               <a:ext uri="{FF2B5EF4-FFF2-40B4-BE49-F238E27FC236}">
-                <a16:creationId xmlns="" xmlns:a16="http://schemas.microsoft.com/office/drawing/2014/main" id="{744CBED0-0B25-4110-9D0F-BB8F8E84C85B}"/>
+                <a16:creationId xmlns:a16="http://schemas.microsoft.com/office/drawing/2014/main" xmlns="" id="{744CBED0-0B25-4110-9D0F-BB8F8E84C85B}"/>
               </a:ext>
             </a:extLst>
           </p:cNvPr>
@@ -7241,7 +7241,7 @@
           <p:cNvPr id="7" name="Slide Number Placeholder 6">
             <a:extLst>
               <a:ext uri="{FF2B5EF4-FFF2-40B4-BE49-F238E27FC236}">
-                <a16:creationId xmlns="" xmlns:a16="http://schemas.microsoft.com/office/drawing/2014/main" id="{36D9B507-F7D4-437D-A0DE-0F3F20DD77C0}"/>
+                <a16:creationId xmlns:a16="http://schemas.microsoft.com/office/drawing/2014/main" xmlns="" id="{36D9B507-F7D4-437D-A0DE-0F3F20DD77C0}"/>
               </a:ext>
             </a:extLst>
           </p:cNvPr>
@@ -7306,7 +7306,7 @@
           <p:cNvPr id="2" name="Picture 1">
             <a:extLst>
               <a:ext uri="{FF2B5EF4-FFF2-40B4-BE49-F238E27FC236}">
-                <a16:creationId xmlns="" xmlns:a16="http://schemas.microsoft.com/office/drawing/2014/main" id="{C9CFD144-2481-41BF-B3E6-72CDD3DB6005}"/>
+                <a16:creationId xmlns:a16="http://schemas.microsoft.com/office/drawing/2014/main" xmlns="" id="{C9CFD144-2481-41BF-B3E6-72CDD3DB6005}"/>
               </a:ext>
             </a:extLst>
           </p:cNvPr>
@@ -7344,7 +7344,7 @@
           <p:cNvPr id="3" name="Title Placeholder 2">
             <a:extLst>
               <a:ext uri="{FF2B5EF4-FFF2-40B4-BE49-F238E27FC236}">
-                <a16:creationId xmlns="" xmlns:a16="http://schemas.microsoft.com/office/drawing/2014/main" id="{0A81FFCD-9064-415F-B75C-D7BDA1528F01}"/>
+                <a16:creationId xmlns:a16="http://schemas.microsoft.com/office/drawing/2014/main" xmlns="" id="{0A81FFCD-9064-415F-B75C-D7BDA1528F01}"/>
               </a:ext>
             </a:extLst>
           </p:cNvPr>
@@ -7383,7 +7383,7 @@
           <p:cNvPr id="4" name="Text Placeholder 3">
             <a:extLst>
               <a:ext uri="{FF2B5EF4-FFF2-40B4-BE49-F238E27FC236}">
-                <a16:creationId xmlns="" xmlns:a16="http://schemas.microsoft.com/office/drawing/2014/main" id="{95D643FD-C334-4B25-A967-795137C50EF3}"/>
+                <a16:creationId xmlns:a16="http://schemas.microsoft.com/office/drawing/2014/main" xmlns="" id="{95D643FD-C334-4B25-A967-795137C50EF3}"/>
               </a:ext>
             </a:extLst>
           </p:cNvPr>
@@ -7455,7 +7455,7 @@
           <p:cNvPr id="5" name="Date Placeholder 4">
             <a:extLst>
               <a:ext uri="{FF2B5EF4-FFF2-40B4-BE49-F238E27FC236}">
-                <a16:creationId xmlns="" xmlns:a16="http://schemas.microsoft.com/office/drawing/2014/main" id="{04200538-592E-4E7B-83D4-71242B8FBF2E}"/>
+                <a16:creationId xmlns:a16="http://schemas.microsoft.com/office/drawing/2014/main" xmlns="" id="{04200538-592E-4E7B-83D4-71242B8FBF2E}"/>
               </a:ext>
             </a:extLst>
           </p:cNvPr>
@@ -7508,7 +7508,7 @@
           <p:cNvPr id="6" name="Footer Placeholder 5">
             <a:extLst>
               <a:ext uri="{FF2B5EF4-FFF2-40B4-BE49-F238E27FC236}">
-                <a16:creationId xmlns="" xmlns:a16="http://schemas.microsoft.com/office/drawing/2014/main" id="{FD73B696-90F0-40F5-B262-AB517FE80FB1}"/>
+                <a16:creationId xmlns:a16="http://schemas.microsoft.com/office/drawing/2014/main" xmlns="" id="{FD73B696-90F0-40F5-B262-AB517FE80FB1}"/>
               </a:ext>
             </a:extLst>
           </p:cNvPr>
@@ -7561,7 +7561,7 @@
           <p:cNvPr id="7" name="Slide Number Placeholder 6">
             <a:extLst>
               <a:ext uri="{FF2B5EF4-FFF2-40B4-BE49-F238E27FC236}">
-                <a16:creationId xmlns="" xmlns:a16="http://schemas.microsoft.com/office/drawing/2014/main" id="{D3A400BB-55BC-4DF1-A6DE-B743EA088748}"/>
+                <a16:creationId xmlns:a16="http://schemas.microsoft.com/office/drawing/2014/main" xmlns="" id="{D3A400BB-55BC-4DF1-A6DE-B743EA088748}"/>
               </a:ext>
             </a:extLst>
           </p:cNvPr>
@@ -7617,7 +7617,7 @@
           <p:cNvPr id="8" name="Picture 7">
             <a:extLst>
               <a:ext uri="{FF2B5EF4-FFF2-40B4-BE49-F238E27FC236}">
-                <a16:creationId xmlns="" xmlns:a16="http://schemas.microsoft.com/office/drawing/2014/main" id="{EAFBDD54-8C5A-4084-9547-F9ABA1A099D3}"/>
+                <a16:creationId xmlns:a16="http://schemas.microsoft.com/office/drawing/2014/main" xmlns="" id="{EAFBDD54-8C5A-4084-9547-F9ABA1A099D3}"/>
               </a:ext>
             </a:extLst>
           </p:cNvPr>
@@ -7969,7 +7969,7 @@
           <p:cNvPr id="2" name="Picture 1">
             <a:extLst>
               <a:ext uri="{FF2B5EF4-FFF2-40B4-BE49-F238E27FC236}">
-                <a16:creationId xmlns="" xmlns:a16="http://schemas.microsoft.com/office/drawing/2014/main" id="{BF28FB87-1D84-4A19-9386-1376E432A025}"/>
+                <a16:creationId xmlns:a16="http://schemas.microsoft.com/office/drawing/2014/main" xmlns="" id="{BF28FB87-1D84-4A19-9386-1376E432A025}"/>
               </a:ext>
             </a:extLst>
           </p:cNvPr>
@@ -8007,7 +8007,7 @@
           <p:cNvPr id="3" name="Picture 2">
             <a:extLst>
               <a:ext uri="{FF2B5EF4-FFF2-40B4-BE49-F238E27FC236}">
-                <a16:creationId xmlns="" xmlns:a16="http://schemas.microsoft.com/office/drawing/2014/main" id="{9CA362F5-D86C-4B88-B187-57191570D4E8}"/>
+                <a16:creationId xmlns:a16="http://schemas.microsoft.com/office/drawing/2014/main" xmlns="" id="{9CA362F5-D86C-4B88-B187-57191570D4E8}"/>
               </a:ext>
             </a:extLst>
           </p:cNvPr>
@@ -8045,7 +8045,7 @@
           <p:cNvPr id="4" name="Title Placeholder 3">
             <a:extLst>
               <a:ext uri="{FF2B5EF4-FFF2-40B4-BE49-F238E27FC236}">
-                <a16:creationId xmlns="" xmlns:a16="http://schemas.microsoft.com/office/drawing/2014/main" id="{694CBD95-455C-4308-A58D-1DAE10B7CE7C}"/>
+                <a16:creationId xmlns:a16="http://schemas.microsoft.com/office/drawing/2014/main" xmlns="" id="{694CBD95-455C-4308-A58D-1DAE10B7CE7C}"/>
               </a:ext>
             </a:extLst>
           </p:cNvPr>
@@ -8082,7 +8082,7 @@
           <p:cNvPr id="5" name="Text Placeholder 4">
             <a:extLst>
               <a:ext uri="{FF2B5EF4-FFF2-40B4-BE49-F238E27FC236}">
-                <a16:creationId xmlns="" xmlns:a16="http://schemas.microsoft.com/office/drawing/2014/main" id="{39AB785B-A173-40EB-9610-3A55700F2FF7}"/>
+                <a16:creationId xmlns:a16="http://schemas.microsoft.com/office/drawing/2014/main" xmlns="" id="{39AB785B-A173-40EB-9610-3A55700F2FF7}"/>
               </a:ext>
             </a:extLst>
           </p:cNvPr>
@@ -8154,7 +8154,7 @@
           <p:cNvPr id="6" name="Date Placeholder 5">
             <a:extLst>
               <a:ext uri="{FF2B5EF4-FFF2-40B4-BE49-F238E27FC236}">
-                <a16:creationId xmlns="" xmlns:a16="http://schemas.microsoft.com/office/drawing/2014/main" id="{85E089E5-E7C3-422D-BACA-7E9BDA13DDE7}"/>
+                <a16:creationId xmlns:a16="http://schemas.microsoft.com/office/drawing/2014/main" xmlns="" id="{85E089E5-E7C3-422D-BACA-7E9BDA13DDE7}"/>
               </a:ext>
             </a:extLst>
           </p:cNvPr>
@@ -8204,7 +8204,7 @@
           <p:cNvPr id="7" name="TextBox 6">
             <a:extLst>
               <a:ext uri="{FF2B5EF4-FFF2-40B4-BE49-F238E27FC236}">
-                <a16:creationId xmlns="" xmlns:a16="http://schemas.microsoft.com/office/drawing/2014/main" id="{00BB770F-8C8F-458D-8E32-2FAEDAD83DE2}"/>
+                <a16:creationId xmlns:a16="http://schemas.microsoft.com/office/drawing/2014/main" xmlns="" id="{00BB770F-8C8F-458D-8E32-2FAEDAD83DE2}"/>
               </a:ext>
             </a:extLst>
           </p:cNvPr>
@@ -8250,7 +8250,7 @@
           <p:cNvPr id="8" name="TextBox 7">
             <a:extLst>
               <a:ext uri="{FF2B5EF4-FFF2-40B4-BE49-F238E27FC236}">
-                <a16:creationId xmlns="" xmlns:a16="http://schemas.microsoft.com/office/drawing/2014/main" id="{A2734B8D-563C-4A35-92EC-D5173CB9A8F9}"/>
+                <a16:creationId xmlns:a16="http://schemas.microsoft.com/office/drawing/2014/main" xmlns="" id="{A2734B8D-563C-4A35-92EC-D5173CB9A8F9}"/>
               </a:ext>
             </a:extLst>
           </p:cNvPr>
@@ -8296,7 +8296,7 @@
           <p:cNvPr id="9" name="TextBox 8">
             <a:extLst>
               <a:ext uri="{FF2B5EF4-FFF2-40B4-BE49-F238E27FC236}">
-                <a16:creationId xmlns="" xmlns:a16="http://schemas.microsoft.com/office/drawing/2014/main" id="{66765670-DA0B-44CF-A062-76D607CD68FB}"/>
+                <a16:creationId xmlns:a16="http://schemas.microsoft.com/office/drawing/2014/main" xmlns="" id="{66765670-DA0B-44CF-A062-76D607CD68FB}"/>
               </a:ext>
             </a:extLst>
           </p:cNvPr>
@@ -8653,7 +8653,7 @@
           <p:cNvPr id="2" name="Title 1">
             <a:extLst>
               <a:ext uri="{FF2B5EF4-FFF2-40B4-BE49-F238E27FC236}">
-                <a16:creationId xmlns="" xmlns:a16="http://schemas.microsoft.com/office/drawing/2014/main" id="{05011E12-7150-4C36-BBA8-F106C588CBBD}"/>
+                <a16:creationId xmlns:a16="http://schemas.microsoft.com/office/drawing/2014/main" xmlns="" id="{05011E12-7150-4C36-BBA8-F106C588CBBD}"/>
               </a:ext>
             </a:extLst>
           </p:cNvPr>
@@ -8698,7 +8698,7 @@
           <p:cNvPr id="3" name="TextBox 2">
             <a:extLst>
               <a:ext uri="{FF2B5EF4-FFF2-40B4-BE49-F238E27FC236}">
-                <a16:creationId xmlns="" xmlns:a16="http://schemas.microsoft.com/office/drawing/2014/main" id="{0A8F9668-7009-4920-888F-FBEF04A785B5}"/>
+                <a16:creationId xmlns:a16="http://schemas.microsoft.com/office/drawing/2014/main" xmlns="" id="{0A8F9668-7009-4920-888F-FBEF04A785B5}"/>
               </a:ext>
             </a:extLst>
           </p:cNvPr>
@@ -8940,7 +8940,7 @@
           <p:cNvPr id="7" name="TextBox 6">
             <a:extLst>
               <a:ext uri="{FF2B5EF4-FFF2-40B4-BE49-F238E27FC236}">
-                <a16:creationId xmlns="" xmlns:a16="http://schemas.microsoft.com/office/drawing/2014/main" id="{AB631E0B-CBFA-445A-B6D7-EBB2CBD60FBE}"/>
+                <a16:creationId xmlns:a16="http://schemas.microsoft.com/office/drawing/2014/main" xmlns="" id="{AB631E0B-CBFA-445A-B6D7-EBB2CBD60FBE}"/>
               </a:ext>
             </a:extLst>
           </p:cNvPr>
@@ -10518,7 +10518,7 @@
                 <a:ea typeface="DejaVu Sans" pitchFamily="2"/>
                 <a:cs typeface="Arial" panose="020B0604020202020204" pitchFamily="34" charset="0"/>
               </a:rPr>
-              <a:t>) (Automated)</a:t>
+              <a:t>) </a:t>
             </a:r>
           </a:p>
           <a:p>
@@ -11501,7 +11501,7 @@
           <p:cNvPr id="2" name="Text Placeholder 1">
             <a:extLst>
               <a:ext uri="{FF2B5EF4-FFF2-40B4-BE49-F238E27FC236}">
-                <a16:creationId xmlns="" xmlns:a16="http://schemas.microsoft.com/office/drawing/2014/main" id="{EDD1A4F7-5140-4806-AAC6-A62599D30848}"/>
+                <a16:creationId xmlns:a16="http://schemas.microsoft.com/office/drawing/2014/main" xmlns="" id="{EDD1A4F7-5140-4806-AAC6-A62599D30848}"/>
               </a:ext>
             </a:extLst>
           </p:cNvPr>
@@ -11692,50 +11692,46 @@
               <a:t> sudo su - jenkins (do it as jenkins user.. </a:t>
             </a:r>
             <a:r>
+              <a:rPr lang="en-IN" sz="3200" smtClean="0"/>
+              <a:t>) </a:t>
+            </a:r>
+            <a:endParaRPr lang="en-IN" sz="3200" smtClean="0"/>
+          </a:p>
+          <a:p>
+            <a:pPr lvl="0">
+              <a:buSzPct val="45000"/>
+            </a:pPr>
+            <a:r>
+              <a:rPr lang="en-IN" sz="3200" smtClean="0">
+                <a:sym typeface="Wingdings" panose="05000000000000000000" pitchFamily="2" charset="2"/>
+              </a:rPr>
+              <a:t></a:t>
+            </a:r>
+            <a:r>
+              <a:rPr lang="en-IN" sz="3200" smtClean="0"/>
+              <a:t> </a:t>
+            </a:r>
+            <a:r>
+              <a:rPr lang="en-IN" sz="3200" dirty="0"/>
+              <a:t>ssh-keygen -t rsa (No Password</a:t>
+            </a:r>
+            <a:r>
               <a:rPr lang="en-IN" sz="3200" dirty="0" smtClean="0"/>
               <a:t>) </a:t>
             </a:r>
-            <a:r>
-              <a:rPr lang="en-IN" sz="3200" b="1" dirty="0" smtClean="0"/>
-              <a:t>(Automated)</a:t>
-            </a:r>
-            <a:endParaRPr lang="en-IN" sz="3200" b="1" dirty="0"/>
+            <a:endParaRPr lang="en-IN" sz="3200" dirty="0" smtClean="0"/>
           </a:p>
           <a:p>
             <a:pPr lvl="0">
               <a:buSzPct val="45000"/>
             </a:pPr>
             <a:r>
+              <a:rPr lang="en-IN" sz="3200" dirty="0" smtClean="0"/>
+              <a:t>AWS </a:t>
+            </a:r>
+            <a:r>
               <a:rPr lang="en-IN" sz="3200" dirty="0"/>
-              <a:t> </a:t>
-            </a:r>
-            <a:r>
-              <a:rPr lang="en-IN" sz="3200" dirty="0">
-                <a:sym typeface="Wingdings" panose="05000000000000000000" pitchFamily="2" charset="2"/>
-              </a:rPr>
-              <a:t></a:t>
-            </a:r>
-            <a:r>
-              <a:rPr lang="en-IN" sz="3200" dirty="0"/>
-              <a:t> ssh-keygen -t rsa (No Password</a:t>
-            </a:r>
-            <a:r>
-              <a:rPr lang="en-IN" sz="3200" dirty="0" smtClean="0"/>
-              <a:t>) </a:t>
-            </a:r>
-            <a:r>
-              <a:rPr lang="en-IN" sz="3200" b="1" dirty="0" smtClean="0"/>
-              <a:t>(Automated)</a:t>
-            </a:r>
-            <a:endParaRPr lang="en-IN" sz="3200" b="1" dirty="0"/>
-          </a:p>
-          <a:p>
-            <a:pPr lvl="0">
-              <a:buSzPct val="45000"/>
-            </a:pPr>
-            <a:r>
-              <a:rPr lang="en-IN" sz="3200" dirty="0"/>
-              <a:t>AWS CLI (Required when doing k8s set up using jenkins)</a:t>
+              <a:t>CLI (Required when doing k8s set up using jenkins)</a:t>
             </a:r>
           </a:p>
           <a:p>
@@ -11817,7 +11813,7 @@
           <p:cNvPr id="2" name="Title 1">
             <a:extLst>
               <a:ext uri="{FF2B5EF4-FFF2-40B4-BE49-F238E27FC236}">
-                <a16:creationId xmlns="" xmlns:a16="http://schemas.microsoft.com/office/drawing/2014/main" id="{8B40FE1C-B941-41B6-BE8A-B92E5071EA34}"/>
+                <a16:creationId xmlns:a16="http://schemas.microsoft.com/office/drawing/2014/main" xmlns="" id="{8B40FE1C-B941-41B6-BE8A-B92E5071EA34}"/>
               </a:ext>
             </a:extLst>
           </p:cNvPr>
@@ -11851,7 +11847,7 @@
           <p:cNvPr id="3" name="Text Placeholder 2">
             <a:extLst>
               <a:ext uri="{FF2B5EF4-FFF2-40B4-BE49-F238E27FC236}">
-                <a16:creationId xmlns="" xmlns:a16="http://schemas.microsoft.com/office/drawing/2014/main" id="{B1A800F4-7B45-4E8B-8E73-1F3CE53DD688}"/>
+                <a16:creationId xmlns:a16="http://schemas.microsoft.com/office/drawing/2014/main" xmlns="" id="{B1A800F4-7B45-4E8B-8E73-1F3CE53DD688}"/>
               </a:ext>
             </a:extLst>
           </p:cNvPr>
@@ -11957,7 +11953,7 @@
           <p:cNvPr id="2" name="Title 1">
             <a:extLst>
               <a:ext uri="{FF2B5EF4-FFF2-40B4-BE49-F238E27FC236}">
-                <a16:creationId xmlns="" xmlns:a16="http://schemas.microsoft.com/office/drawing/2014/main" id="{BB2D6542-FCC7-46F3-BA25-4D395007C678}"/>
+                <a16:creationId xmlns:a16="http://schemas.microsoft.com/office/drawing/2014/main" xmlns="" id="{BB2D6542-FCC7-46F3-BA25-4D395007C678}"/>
               </a:ext>
             </a:extLst>
           </p:cNvPr>
@@ -11991,7 +11987,7 @@
           <p:cNvPr id="3" name="Text Placeholder 2">
             <a:extLst>
               <a:ext uri="{FF2B5EF4-FFF2-40B4-BE49-F238E27FC236}">
-                <a16:creationId xmlns="" xmlns:a16="http://schemas.microsoft.com/office/drawing/2014/main" id="{A7DF62E9-C9DC-431C-8017-84C721E0190C}"/>
+                <a16:creationId xmlns:a16="http://schemas.microsoft.com/office/drawing/2014/main" xmlns="" id="{A7DF62E9-C9DC-431C-8017-84C721E0190C}"/>
               </a:ext>
             </a:extLst>
           </p:cNvPr>
@@ -12344,7 +12340,7 @@
           <p:cNvPr id="2" name="Title 1">
             <a:extLst>
               <a:ext uri="{FF2B5EF4-FFF2-40B4-BE49-F238E27FC236}">
-                <a16:creationId xmlns="" xmlns:a16="http://schemas.microsoft.com/office/drawing/2014/main" id="{07DA3091-5982-4260-921E-1C967D7A4B5B}"/>
+                <a16:creationId xmlns:a16="http://schemas.microsoft.com/office/drawing/2014/main" xmlns="" id="{07DA3091-5982-4260-921E-1C967D7A4B5B}"/>
               </a:ext>
             </a:extLst>
           </p:cNvPr>
@@ -12378,7 +12374,7 @@
           <p:cNvPr id="3" name="Text Placeholder 2">
             <a:extLst>
               <a:ext uri="{FF2B5EF4-FFF2-40B4-BE49-F238E27FC236}">
-                <a16:creationId xmlns="" xmlns:a16="http://schemas.microsoft.com/office/drawing/2014/main" id="{E8388A85-DB26-4BD1-B823-BED96DD920BA}"/>
+                <a16:creationId xmlns:a16="http://schemas.microsoft.com/office/drawing/2014/main" xmlns="" id="{E8388A85-DB26-4BD1-B823-BED96DD920BA}"/>
               </a:ext>
             </a:extLst>
           </p:cNvPr>
@@ -12691,7 +12687,7 @@
           <p:cNvPr id="2" name="Title 1">
             <a:extLst>
               <a:ext uri="{FF2B5EF4-FFF2-40B4-BE49-F238E27FC236}">
-                <a16:creationId xmlns="" xmlns:a16="http://schemas.microsoft.com/office/drawing/2014/main" id="{99BDD657-E132-42DD-A352-90D29F73337A}"/>
+                <a16:creationId xmlns:a16="http://schemas.microsoft.com/office/drawing/2014/main" xmlns="" id="{99BDD657-E132-42DD-A352-90D29F73337A}"/>
               </a:ext>
             </a:extLst>
           </p:cNvPr>
@@ -12725,7 +12721,7 @@
           <p:cNvPr id="3" name="Text Placeholder 2">
             <a:extLst>
               <a:ext uri="{FF2B5EF4-FFF2-40B4-BE49-F238E27FC236}">
-                <a16:creationId xmlns="" xmlns:a16="http://schemas.microsoft.com/office/drawing/2014/main" id="{D318E4CD-4906-4E5B-9221-79C4FA1A366C}"/>
+                <a16:creationId xmlns:a16="http://schemas.microsoft.com/office/drawing/2014/main" xmlns="" id="{D318E4CD-4906-4E5B-9221-79C4FA1A366C}"/>
               </a:ext>
             </a:extLst>
           </p:cNvPr>
@@ -13006,7 +13002,7 @@
           <p:cNvPr id="2" name="Title 1">
             <a:extLst>
               <a:ext uri="{FF2B5EF4-FFF2-40B4-BE49-F238E27FC236}">
-                <a16:creationId xmlns="" xmlns:a16="http://schemas.microsoft.com/office/drawing/2014/main" id="{AB53D059-0895-49BB-9D3D-12F4922FF2F1}"/>
+                <a16:creationId xmlns:a16="http://schemas.microsoft.com/office/drawing/2014/main" xmlns="" id="{AB53D059-0895-49BB-9D3D-12F4922FF2F1}"/>
               </a:ext>
             </a:extLst>
           </p:cNvPr>
@@ -13040,7 +13036,7 @@
           <p:cNvPr id="3" name="Text Placeholder 2">
             <a:extLst>
               <a:ext uri="{FF2B5EF4-FFF2-40B4-BE49-F238E27FC236}">
-                <a16:creationId xmlns="" xmlns:a16="http://schemas.microsoft.com/office/drawing/2014/main" id="{44751E96-821B-486D-AADC-087BA6798614}"/>
+                <a16:creationId xmlns:a16="http://schemas.microsoft.com/office/drawing/2014/main" xmlns="" id="{44751E96-821B-486D-AADC-087BA6798614}"/>
               </a:ext>
             </a:extLst>
           </p:cNvPr>
@@ -13316,7 +13312,7 @@
           <p:cNvPr id="2" name="Text Placeholder 1">
             <a:extLst>
               <a:ext uri="{FF2B5EF4-FFF2-40B4-BE49-F238E27FC236}">
-                <a16:creationId xmlns="" xmlns:a16="http://schemas.microsoft.com/office/drawing/2014/main" id="{C255E9E5-049E-4D01-9A18-0C5899A8DEBD}"/>
+                <a16:creationId xmlns:a16="http://schemas.microsoft.com/office/drawing/2014/main" xmlns="" id="{C255E9E5-049E-4D01-9A18-0C5899A8DEBD}"/>
               </a:ext>
             </a:extLst>
           </p:cNvPr>
@@ -13449,7 +13445,7 @@
           <p:cNvPr id="2" name="Text Placeholder 1">
             <a:extLst>
               <a:ext uri="{FF2B5EF4-FFF2-40B4-BE49-F238E27FC236}">
-                <a16:creationId xmlns="" xmlns:a16="http://schemas.microsoft.com/office/drawing/2014/main" id="{68CAB51A-FAF6-4160-8156-35AF7E423D9B}"/>
+                <a16:creationId xmlns:a16="http://schemas.microsoft.com/office/drawing/2014/main" xmlns="" id="{68CAB51A-FAF6-4160-8156-35AF7E423D9B}"/>
               </a:ext>
             </a:extLst>
           </p:cNvPr>
@@ -13492,7 +13488,7 @@
           <p:cNvPr id="3" name="Picture 2">
             <a:extLst>
               <a:ext uri="{FF2B5EF4-FFF2-40B4-BE49-F238E27FC236}">
-                <a16:creationId xmlns="" xmlns:a16="http://schemas.microsoft.com/office/drawing/2014/main" id="{DEC3AB5D-3DBD-4C19-964B-E0B5050AC7DF}"/>
+                <a16:creationId xmlns:a16="http://schemas.microsoft.com/office/drawing/2014/main" xmlns="" id="{DEC3AB5D-3DBD-4C19-964B-E0B5050AC7DF}"/>
               </a:ext>
             </a:extLst>
           </p:cNvPr>
@@ -13530,7 +13526,7 @@
           <p:cNvPr id="4" name="Freeform: Shape 3">
             <a:extLst>
               <a:ext uri="{FF2B5EF4-FFF2-40B4-BE49-F238E27FC236}">
-                <a16:creationId xmlns="" xmlns:a16="http://schemas.microsoft.com/office/drawing/2014/main" id="{41120107-62F0-4DEA-B7AB-136CE52150F4}"/>
+                <a16:creationId xmlns:a16="http://schemas.microsoft.com/office/drawing/2014/main" xmlns="" id="{41120107-62F0-4DEA-B7AB-136CE52150F4}"/>
               </a:ext>
             </a:extLst>
           </p:cNvPr>
@@ -13692,7 +13688,7 @@
           <p:cNvPr id="2" name="Title 1">
             <a:extLst>
               <a:ext uri="{FF2B5EF4-FFF2-40B4-BE49-F238E27FC236}">
-                <a16:creationId xmlns="" xmlns:a16="http://schemas.microsoft.com/office/drawing/2014/main" id="{0609E272-EE44-4B2C-9A1F-4728BD38DF8A}"/>
+                <a16:creationId xmlns:a16="http://schemas.microsoft.com/office/drawing/2014/main" xmlns="" id="{0609E272-EE44-4B2C-9A1F-4728BD38DF8A}"/>
               </a:ext>
             </a:extLst>
           </p:cNvPr>
@@ -13726,7 +13722,7 @@
           <p:cNvPr id="3" name="Text Placeholder 2">
             <a:extLst>
               <a:ext uri="{FF2B5EF4-FFF2-40B4-BE49-F238E27FC236}">
-                <a16:creationId xmlns="" xmlns:a16="http://schemas.microsoft.com/office/drawing/2014/main" id="{60199CC0-6E00-4298-ADB4-486C868EA665}"/>
+                <a16:creationId xmlns:a16="http://schemas.microsoft.com/office/drawing/2014/main" xmlns="" id="{60199CC0-6E00-4298-ADB4-486C868EA665}"/>
               </a:ext>
             </a:extLst>
           </p:cNvPr>
@@ -14040,7 +14036,7 @@
           <p:cNvPr id="2" name="Title 1">
             <a:extLst>
               <a:ext uri="{FF2B5EF4-FFF2-40B4-BE49-F238E27FC236}">
-                <a16:creationId xmlns="" xmlns:a16="http://schemas.microsoft.com/office/drawing/2014/main" id="{3BEFCDB7-AD27-4839-93D5-F017F5AC2269}"/>
+                <a16:creationId xmlns:a16="http://schemas.microsoft.com/office/drawing/2014/main" xmlns="" id="{3BEFCDB7-AD27-4839-93D5-F017F5AC2269}"/>
               </a:ext>
             </a:extLst>
           </p:cNvPr>
@@ -14081,7 +14077,7 @@
           <p:cNvPr id="4" name="Picture 3">
             <a:extLst>
               <a:ext uri="{FF2B5EF4-FFF2-40B4-BE49-F238E27FC236}">
-                <a16:creationId xmlns="" xmlns:a16="http://schemas.microsoft.com/office/drawing/2014/main" id="{376F493F-DAB5-42F9-96EA-4797DA832B4E}"/>
+                <a16:creationId xmlns:a16="http://schemas.microsoft.com/office/drawing/2014/main" xmlns="" id="{376F493F-DAB5-42F9-96EA-4797DA832B4E}"/>
               </a:ext>
             </a:extLst>
           </p:cNvPr>
@@ -14119,7 +14115,7 @@
           <p:cNvPr id="5" name="Picture 4">
             <a:extLst>
               <a:ext uri="{FF2B5EF4-FFF2-40B4-BE49-F238E27FC236}">
-                <a16:creationId xmlns="" xmlns:a16="http://schemas.microsoft.com/office/drawing/2014/main" id="{3D8B4824-2C46-490F-A2FD-FB898B58ECDF}"/>
+                <a16:creationId xmlns:a16="http://schemas.microsoft.com/office/drawing/2014/main" xmlns="" id="{3D8B4824-2C46-490F-A2FD-FB898B58ECDF}"/>
               </a:ext>
             </a:extLst>
           </p:cNvPr>
@@ -14157,7 +14153,7 @@
           <p:cNvPr id="6" name="Picture 5">
             <a:extLst>
               <a:ext uri="{FF2B5EF4-FFF2-40B4-BE49-F238E27FC236}">
-                <a16:creationId xmlns="" xmlns:a16="http://schemas.microsoft.com/office/drawing/2014/main" id="{52BE8CC5-908D-4E77-82DF-161B4A4EBB02}"/>
+                <a16:creationId xmlns:a16="http://schemas.microsoft.com/office/drawing/2014/main" xmlns="" id="{52BE8CC5-908D-4E77-82DF-161B4A4EBB02}"/>
               </a:ext>
             </a:extLst>
           </p:cNvPr>
@@ -14195,7 +14191,7 @@
           <p:cNvPr id="7" name="Picture 6">
             <a:extLst>
               <a:ext uri="{FF2B5EF4-FFF2-40B4-BE49-F238E27FC236}">
-                <a16:creationId xmlns="" xmlns:a16="http://schemas.microsoft.com/office/drawing/2014/main" id="{ADD009D9-A50F-4C30-9D8C-5B3002DF9222}"/>
+                <a16:creationId xmlns:a16="http://schemas.microsoft.com/office/drawing/2014/main" xmlns="" id="{ADD009D9-A50F-4C30-9D8C-5B3002DF9222}"/>
               </a:ext>
             </a:extLst>
           </p:cNvPr>
@@ -14233,7 +14229,7 @@
           <p:cNvPr id="8" name="Picture 7">
             <a:extLst>
               <a:ext uri="{FF2B5EF4-FFF2-40B4-BE49-F238E27FC236}">
-                <a16:creationId xmlns="" xmlns:a16="http://schemas.microsoft.com/office/drawing/2014/main" id="{CD373C25-4A52-45C5-B26E-D5B81E8EFE9C}"/>
+                <a16:creationId xmlns:a16="http://schemas.microsoft.com/office/drawing/2014/main" xmlns="" id="{CD373C25-4A52-45C5-B26E-D5B81E8EFE9C}"/>
               </a:ext>
             </a:extLst>
           </p:cNvPr>
@@ -14271,7 +14267,7 @@
           <p:cNvPr id="9" name="Picture 8">
             <a:extLst>
               <a:ext uri="{FF2B5EF4-FFF2-40B4-BE49-F238E27FC236}">
-                <a16:creationId xmlns="" xmlns:a16="http://schemas.microsoft.com/office/drawing/2014/main" id="{E1A52324-292E-4C31-B68B-3410E1DD7B3B}"/>
+                <a16:creationId xmlns:a16="http://schemas.microsoft.com/office/drawing/2014/main" xmlns="" id="{E1A52324-292E-4C31-B68B-3410E1DD7B3B}"/>
               </a:ext>
             </a:extLst>
           </p:cNvPr>
@@ -14309,7 +14305,7 @@
           <p:cNvPr id="10" name="Picture 9">
             <a:extLst>
               <a:ext uri="{FF2B5EF4-FFF2-40B4-BE49-F238E27FC236}">
-                <a16:creationId xmlns="" xmlns:a16="http://schemas.microsoft.com/office/drawing/2014/main" id="{8DF0B0E3-5D04-4A40-A38A-734395A43BDB}"/>
+                <a16:creationId xmlns:a16="http://schemas.microsoft.com/office/drawing/2014/main" xmlns="" id="{8DF0B0E3-5D04-4A40-A38A-734395A43BDB}"/>
               </a:ext>
             </a:extLst>
           </p:cNvPr>
@@ -14347,7 +14343,7 @@
           <p:cNvPr id="11" name="Freeform: Shape 10">
             <a:extLst>
               <a:ext uri="{FF2B5EF4-FFF2-40B4-BE49-F238E27FC236}">
-                <a16:creationId xmlns="" xmlns:a16="http://schemas.microsoft.com/office/drawing/2014/main" id="{E798B587-2894-48A6-B9FD-5157F741FC7D}"/>
+                <a16:creationId xmlns:a16="http://schemas.microsoft.com/office/drawing/2014/main" xmlns="" id="{E798B587-2894-48A6-B9FD-5157F741FC7D}"/>
               </a:ext>
             </a:extLst>
           </p:cNvPr>
@@ -14483,7 +14479,7 @@
           <p:cNvPr id="12" name="Freeform: Shape 11">
             <a:extLst>
               <a:ext uri="{FF2B5EF4-FFF2-40B4-BE49-F238E27FC236}">
-                <a16:creationId xmlns="" xmlns:a16="http://schemas.microsoft.com/office/drawing/2014/main" id="{8A732884-9B90-4D1E-8E30-D22C0932E732}"/>
+                <a16:creationId xmlns:a16="http://schemas.microsoft.com/office/drawing/2014/main" xmlns="" id="{8A732884-9B90-4D1E-8E30-D22C0932E732}"/>
               </a:ext>
             </a:extLst>
           </p:cNvPr>
@@ -14619,7 +14615,7 @@
           <p:cNvPr id="13" name="Freeform: Shape 12">
             <a:extLst>
               <a:ext uri="{FF2B5EF4-FFF2-40B4-BE49-F238E27FC236}">
-                <a16:creationId xmlns="" xmlns:a16="http://schemas.microsoft.com/office/drawing/2014/main" id="{7075A8BD-0951-4DD3-996E-8F24614B0EDE}"/>
+                <a16:creationId xmlns:a16="http://schemas.microsoft.com/office/drawing/2014/main" xmlns="" id="{7075A8BD-0951-4DD3-996E-8F24614B0EDE}"/>
               </a:ext>
             </a:extLst>
           </p:cNvPr>
@@ -14755,7 +14751,7 @@
           <p:cNvPr id="14" name="Freeform: Shape 13">
             <a:extLst>
               <a:ext uri="{FF2B5EF4-FFF2-40B4-BE49-F238E27FC236}">
-                <a16:creationId xmlns="" xmlns:a16="http://schemas.microsoft.com/office/drawing/2014/main" id="{5261C850-8283-4289-97B6-AFA36243C0E8}"/>
+                <a16:creationId xmlns:a16="http://schemas.microsoft.com/office/drawing/2014/main" xmlns="" id="{5261C850-8283-4289-97B6-AFA36243C0E8}"/>
               </a:ext>
             </a:extLst>
           </p:cNvPr>
@@ -14891,7 +14887,7 @@
           <p:cNvPr id="15" name="Freeform: Shape 14">
             <a:extLst>
               <a:ext uri="{FF2B5EF4-FFF2-40B4-BE49-F238E27FC236}">
-                <a16:creationId xmlns="" xmlns:a16="http://schemas.microsoft.com/office/drawing/2014/main" id="{1C7E24F9-94CE-4C49-81F9-297158C1B26D}"/>
+                <a16:creationId xmlns:a16="http://schemas.microsoft.com/office/drawing/2014/main" xmlns="" id="{1C7E24F9-94CE-4C49-81F9-297158C1B26D}"/>
               </a:ext>
             </a:extLst>
           </p:cNvPr>
@@ -15026,7 +15022,7 @@
           <p:cNvPr id="16" name="Freeform: Shape 15">
             <a:extLst>
               <a:ext uri="{FF2B5EF4-FFF2-40B4-BE49-F238E27FC236}">
-                <a16:creationId xmlns="" xmlns:a16="http://schemas.microsoft.com/office/drawing/2014/main" id="{3F7029D0-CDC6-4940-A4BD-452846970732}"/>
+                <a16:creationId xmlns:a16="http://schemas.microsoft.com/office/drawing/2014/main" xmlns="" id="{3F7029D0-CDC6-4940-A4BD-452846970732}"/>
               </a:ext>
             </a:extLst>
           </p:cNvPr>
@@ -15161,7 +15157,7 @@
           <p:cNvPr id="17" name="TextBox 16">
             <a:extLst>
               <a:ext uri="{FF2B5EF4-FFF2-40B4-BE49-F238E27FC236}">
-                <a16:creationId xmlns="" xmlns:a16="http://schemas.microsoft.com/office/drawing/2014/main" id="{902694FB-204A-422A-A370-0BF2180E5189}"/>
+                <a16:creationId xmlns:a16="http://schemas.microsoft.com/office/drawing/2014/main" xmlns="" id="{902694FB-204A-422A-A370-0BF2180E5189}"/>
               </a:ext>
             </a:extLst>
           </p:cNvPr>
@@ -15293,7 +15289,7 @@
           <p:cNvPr id="20" name="TextBox 19">
             <a:extLst>
               <a:ext uri="{FF2B5EF4-FFF2-40B4-BE49-F238E27FC236}">
-                <a16:creationId xmlns="" xmlns:a16="http://schemas.microsoft.com/office/drawing/2014/main" id="{FD65FB41-3EDF-44AD-9405-9F12DEBCB3ED}"/>
+                <a16:creationId xmlns:a16="http://schemas.microsoft.com/office/drawing/2014/main" xmlns="" id="{FD65FB41-3EDF-44AD-9405-9F12DEBCB3ED}"/>
               </a:ext>
             </a:extLst>
           </p:cNvPr>
@@ -15397,7 +15393,7 @@
           <p:cNvPr id="21" name="TextBox 20">
             <a:extLst>
               <a:ext uri="{FF2B5EF4-FFF2-40B4-BE49-F238E27FC236}">
-                <a16:creationId xmlns="" xmlns:a16="http://schemas.microsoft.com/office/drawing/2014/main" id="{8EFD4806-0FE4-4DB2-9325-4A2FC9300D08}"/>
+                <a16:creationId xmlns:a16="http://schemas.microsoft.com/office/drawing/2014/main" xmlns="" id="{8EFD4806-0FE4-4DB2-9325-4A2FC9300D08}"/>
               </a:ext>
             </a:extLst>
           </p:cNvPr>
@@ -15516,7 +15512,7 @@
           <p:cNvPr id="22" name="TextBox 21">
             <a:extLst>
               <a:ext uri="{FF2B5EF4-FFF2-40B4-BE49-F238E27FC236}">
-                <a16:creationId xmlns="" xmlns:a16="http://schemas.microsoft.com/office/drawing/2014/main" id="{709FA639-AFEC-4635-A05B-5B22ED4B83A4}"/>
+                <a16:creationId xmlns:a16="http://schemas.microsoft.com/office/drawing/2014/main" xmlns="" id="{709FA639-AFEC-4635-A05B-5B22ED4B83A4}"/>
               </a:ext>
             </a:extLst>
           </p:cNvPr>
@@ -15674,7 +15670,7 @@
           <p:cNvPr id="23" name="TextBox 22">
             <a:extLst>
               <a:ext uri="{FF2B5EF4-FFF2-40B4-BE49-F238E27FC236}">
-                <a16:creationId xmlns="" xmlns:a16="http://schemas.microsoft.com/office/drawing/2014/main" id="{5D3DECC9-8C46-4918-BB93-505DBD83A19A}"/>
+                <a16:creationId xmlns:a16="http://schemas.microsoft.com/office/drawing/2014/main" xmlns="" id="{5D3DECC9-8C46-4918-BB93-505DBD83A19A}"/>
               </a:ext>
             </a:extLst>
           </p:cNvPr>
@@ -15735,7 +15731,7 @@
           <p:cNvPr id="24" name="TextBox 23">
             <a:extLst>
               <a:ext uri="{FF2B5EF4-FFF2-40B4-BE49-F238E27FC236}">
-                <a16:creationId xmlns="" xmlns:a16="http://schemas.microsoft.com/office/drawing/2014/main" id="{35C248C7-BD99-44E2-9454-D52075D1631E}"/>
+                <a16:creationId xmlns:a16="http://schemas.microsoft.com/office/drawing/2014/main" xmlns="" id="{35C248C7-BD99-44E2-9454-D52075D1631E}"/>
               </a:ext>
             </a:extLst>
           </p:cNvPr>
@@ -15793,7 +15789,7 @@
           <p:cNvPr id="25" name="TextBox 24">
             <a:extLst>
               <a:ext uri="{FF2B5EF4-FFF2-40B4-BE49-F238E27FC236}">
-                <a16:creationId xmlns="" xmlns:a16="http://schemas.microsoft.com/office/drawing/2014/main" id="{3E6F5DA3-1859-4FBC-9617-F4A57FBA45BA}"/>
+                <a16:creationId xmlns:a16="http://schemas.microsoft.com/office/drawing/2014/main" xmlns="" id="{3E6F5DA3-1859-4FBC-9617-F4A57FBA45BA}"/>
               </a:ext>
             </a:extLst>
           </p:cNvPr>
@@ -15936,7 +15932,7 @@
           <p:cNvPr id="26" name="Picture 25">
             <a:extLst>
               <a:ext uri="{FF2B5EF4-FFF2-40B4-BE49-F238E27FC236}">
-                <a16:creationId xmlns="" xmlns:a16="http://schemas.microsoft.com/office/drawing/2014/main" id="{B323F0B7-4B10-45E5-99F9-5A6F48FF8772}"/>
+                <a16:creationId xmlns:a16="http://schemas.microsoft.com/office/drawing/2014/main" xmlns="" id="{B323F0B7-4B10-45E5-99F9-5A6F48FF8772}"/>
               </a:ext>
             </a:extLst>
           </p:cNvPr>
@@ -15974,7 +15970,7 @@
           <p:cNvPr id="27" name="Freeform: Shape 26">
             <a:extLst>
               <a:ext uri="{FF2B5EF4-FFF2-40B4-BE49-F238E27FC236}">
-                <a16:creationId xmlns="" xmlns:a16="http://schemas.microsoft.com/office/drawing/2014/main" id="{B5004C74-5551-46E6-B65A-7B48F3CA7650}"/>
+                <a16:creationId xmlns:a16="http://schemas.microsoft.com/office/drawing/2014/main" xmlns="" id="{B5004C74-5551-46E6-B65A-7B48F3CA7650}"/>
               </a:ext>
             </a:extLst>
           </p:cNvPr>
@@ -16109,7 +16105,7 @@
           <p:cNvPr id="28" name="TextBox 27">
             <a:extLst>
               <a:ext uri="{FF2B5EF4-FFF2-40B4-BE49-F238E27FC236}">
-                <a16:creationId xmlns="" xmlns:a16="http://schemas.microsoft.com/office/drawing/2014/main" id="{9EE78C95-CB4D-4EAA-B4BD-1DACF82027CF}"/>
+                <a16:creationId xmlns:a16="http://schemas.microsoft.com/office/drawing/2014/main" xmlns="" id="{9EE78C95-CB4D-4EAA-B4BD-1DACF82027CF}"/>
               </a:ext>
             </a:extLst>
           </p:cNvPr>
@@ -16314,7 +16310,7 @@
           <p:cNvPr id="29" name="Picture 28">
             <a:extLst>
               <a:ext uri="{FF2B5EF4-FFF2-40B4-BE49-F238E27FC236}">
-                <a16:creationId xmlns="" xmlns:a16="http://schemas.microsoft.com/office/drawing/2014/main" id="{05E3468D-ED51-4201-8957-2DD74632D4F3}"/>
+                <a16:creationId xmlns:a16="http://schemas.microsoft.com/office/drawing/2014/main" xmlns="" id="{05E3468D-ED51-4201-8957-2DD74632D4F3}"/>
               </a:ext>
             </a:extLst>
           </p:cNvPr>
@@ -16450,7 +16446,7 @@
           <p:cNvPr id="2" name="Title 1">
             <a:extLst>
               <a:ext uri="{FF2B5EF4-FFF2-40B4-BE49-F238E27FC236}">
-                <a16:creationId xmlns="" xmlns:a16="http://schemas.microsoft.com/office/drawing/2014/main" id="{4882B9C5-7CA3-4B68-9BF8-E84D0F77ADD6}"/>
+                <a16:creationId xmlns:a16="http://schemas.microsoft.com/office/drawing/2014/main" xmlns="" id="{4882B9C5-7CA3-4B68-9BF8-E84D0F77ADD6}"/>
               </a:ext>
             </a:extLst>
           </p:cNvPr>
@@ -16484,7 +16480,7 @@
           <p:cNvPr id="3" name="Text Placeholder 2">
             <a:extLst>
               <a:ext uri="{FF2B5EF4-FFF2-40B4-BE49-F238E27FC236}">
-                <a16:creationId xmlns="" xmlns:a16="http://schemas.microsoft.com/office/drawing/2014/main" id="{BCC89D3B-1BD9-43AA-8161-C66DC4326233}"/>
+                <a16:creationId xmlns:a16="http://schemas.microsoft.com/office/drawing/2014/main" xmlns="" id="{BCC89D3B-1BD9-43AA-8161-C66DC4326233}"/>
               </a:ext>
             </a:extLst>
           </p:cNvPr>
@@ -16971,7 +16967,7 @@
           <p:cNvPr id="2" name="Title 1">
             <a:extLst>
               <a:ext uri="{FF2B5EF4-FFF2-40B4-BE49-F238E27FC236}">
-                <a16:creationId xmlns="" xmlns:a16="http://schemas.microsoft.com/office/drawing/2014/main" id="{5BBF9AA3-2D73-4821-AD72-0E4DB4CEA964}"/>
+                <a16:creationId xmlns:a16="http://schemas.microsoft.com/office/drawing/2014/main" xmlns="" id="{5BBF9AA3-2D73-4821-AD72-0E4DB4CEA964}"/>
               </a:ext>
             </a:extLst>
           </p:cNvPr>
@@ -17009,7 +17005,7 @@
           <p:cNvPr id="4" name="Picture 3">
             <a:extLst>
               <a:ext uri="{FF2B5EF4-FFF2-40B4-BE49-F238E27FC236}">
-                <a16:creationId xmlns="" xmlns:a16="http://schemas.microsoft.com/office/drawing/2014/main" id="{1F6B7328-6BEA-4E81-833E-7A9FC2A6E200}"/>
+                <a16:creationId xmlns:a16="http://schemas.microsoft.com/office/drawing/2014/main" xmlns="" id="{1F6B7328-6BEA-4E81-833E-7A9FC2A6E200}"/>
               </a:ext>
             </a:extLst>
           </p:cNvPr>
@@ -17047,7 +17043,7 @@
           <p:cNvPr id="5" name="Picture 4">
             <a:extLst>
               <a:ext uri="{FF2B5EF4-FFF2-40B4-BE49-F238E27FC236}">
-                <a16:creationId xmlns="" xmlns:a16="http://schemas.microsoft.com/office/drawing/2014/main" id="{46CA633A-D369-4F7A-AC07-7C9C6BF07D86}"/>
+                <a16:creationId xmlns:a16="http://schemas.microsoft.com/office/drawing/2014/main" xmlns="" id="{46CA633A-D369-4F7A-AC07-7C9C6BF07D86}"/>
               </a:ext>
             </a:extLst>
           </p:cNvPr>
@@ -17085,7 +17081,7 @@
           <p:cNvPr id="6" name="Picture 5">
             <a:extLst>
               <a:ext uri="{FF2B5EF4-FFF2-40B4-BE49-F238E27FC236}">
-                <a16:creationId xmlns="" xmlns:a16="http://schemas.microsoft.com/office/drawing/2014/main" id="{3566252C-C12B-4058-929A-BAE691AB0545}"/>
+                <a16:creationId xmlns:a16="http://schemas.microsoft.com/office/drawing/2014/main" xmlns="" id="{3566252C-C12B-4058-929A-BAE691AB0545}"/>
               </a:ext>
             </a:extLst>
           </p:cNvPr>
@@ -17123,7 +17119,7 @@
           <p:cNvPr id="7" name="Picture 6">
             <a:extLst>
               <a:ext uri="{FF2B5EF4-FFF2-40B4-BE49-F238E27FC236}">
-                <a16:creationId xmlns="" xmlns:a16="http://schemas.microsoft.com/office/drawing/2014/main" id="{8B277D8F-CB10-4F6C-8FD6-D3D89F0FA255}"/>
+                <a16:creationId xmlns:a16="http://schemas.microsoft.com/office/drawing/2014/main" xmlns="" id="{8B277D8F-CB10-4F6C-8FD6-D3D89F0FA255}"/>
               </a:ext>
             </a:extLst>
           </p:cNvPr>
@@ -17161,7 +17157,7 @@
           <p:cNvPr id="8" name="Picture 7">
             <a:extLst>
               <a:ext uri="{FF2B5EF4-FFF2-40B4-BE49-F238E27FC236}">
-                <a16:creationId xmlns="" xmlns:a16="http://schemas.microsoft.com/office/drawing/2014/main" id="{E487CD9E-611A-4AD2-BE26-B28A6252E5A2}"/>
+                <a16:creationId xmlns:a16="http://schemas.microsoft.com/office/drawing/2014/main" xmlns="" id="{E487CD9E-611A-4AD2-BE26-B28A6252E5A2}"/>
               </a:ext>
             </a:extLst>
           </p:cNvPr>
@@ -17199,7 +17195,7 @@
           <p:cNvPr id="10" name="Freeform: Shape 9">
             <a:extLst>
               <a:ext uri="{FF2B5EF4-FFF2-40B4-BE49-F238E27FC236}">
-                <a16:creationId xmlns="" xmlns:a16="http://schemas.microsoft.com/office/drawing/2014/main" id="{2D8EB5AF-3154-4AF2-9BFC-1149DA6E4ED8}"/>
+                <a16:creationId xmlns:a16="http://schemas.microsoft.com/office/drawing/2014/main" xmlns="" id="{2D8EB5AF-3154-4AF2-9BFC-1149DA6E4ED8}"/>
               </a:ext>
             </a:extLst>
           </p:cNvPr>
@@ -17335,7 +17331,7 @@
           <p:cNvPr id="11" name="Freeform: Shape 10">
             <a:extLst>
               <a:ext uri="{FF2B5EF4-FFF2-40B4-BE49-F238E27FC236}">
-                <a16:creationId xmlns="" xmlns:a16="http://schemas.microsoft.com/office/drawing/2014/main" id="{F65028F0-0C85-42A2-A192-43F865B1D05C}"/>
+                <a16:creationId xmlns:a16="http://schemas.microsoft.com/office/drawing/2014/main" xmlns="" id="{F65028F0-0C85-42A2-A192-43F865B1D05C}"/>
               </a:ext>
             </a:extLst>
           </p:cNvPr>
@@ -17471,7 +17467,7 @@
           <p:cNvPr id="12" name="Freeform: Shape 11">
             <a:extLst>
               <a:ext uri="{FF2B5EF4-FFF2-40B4-BE49-F238E27FC236}">
-                <a16:creationId xmlns="" xmlns:a16="http://schemas.microsoft.com/office/drawing/2014/main" id="{3BEED2AF-61F5-42FF-A050-58E1E7BA3637}"/>
+                <a16:creationId xmlns:a16="http://schemas.microsoft.com/office/drawing/2014/main" xmlns="" id="{3BEED2AF-61F5-42FF-A050-58E1E7BA3637}"/>
               </a:ext>
             </a:extLst>
           </p:cNvPr>
@@ -17607,7 +17603,7 @@
           <p:cNvPr id="13" name="Freeform: Shape 12">
             <a:extLst>
               <a:ext uri="{FF2B5EF4-FFF2-40B4-BE49-F238E27FC236}">
-                <a16:creationId xmlns="" xmlns:a16="http://schemas.microsoft.com/office/drawing/2014/main" id="{AC229F0D-57D4-4DF5-B7BD-23CD890287DB}"/>
+                <a16:creationId xmlns:a16="http://schemas.microsoft.com/office/drawing/2014/main" xmlns="" id="{AC229F0D-57D4-4DF5-B7BD-23CD890287DB}"/>
               </a:ext>
             </a:extLst>
           </p:cNvPr>
@@ -17743,7 +17739,7 @@
           <p:cNvPr id="15" name="TextBox 14">
             <a:extLst>
               <a:ext uri="{FF2B5EF4-FFF2-40B4-BE49-F238E27FC236}">
-                <a16:creationId xmlns="" xmlns:a16="http://schemas.microsoft.com/office/drawing/2014/main" id="{04EFD583-92B7-4F2E-B4AE-61120D53F2A6}"/>
+                <a16:creationId xmlns:a16="http://schemas.microsoft.com/office/drawing/2014/main" xmlns="" id="{04EFD583-92B7-4F2E-B4AE-61120D53F2A6}"/>
               </a:ext>
             </a:extLst>
           </p:cNvPr>
@@ -17887,7 +17883,7 @@
           <p:cNvPr id="16" name="TextBox 15">
             <a:extLst>
               <a:ext uri="{FF2B5EF4-FFF2-40B4-BE49-F238E27FC236}">
-                <a16:creationId xmlns="" xmlns:a16="http://schemas.microsoft.com/office/drawing/2014/main" id="{73CCDDE2-FE16-412C-8F5F-3DE42927EB5B}"/>
+                <a16:creationId xmlns:a16="http://schemas.microsoft.com/office/drawing/2014/main" xmlns="" id="{73CCDDE2-FE16-412C-8F5F-3DE42927EB5B}"/>
               </a:ext>
             </a:extLst>
           </p:cNvPr>
@@ -17948,7 +17944,7 @@
           <p:cNvPr id="17" name="Picture 16">
             <a:extLst>
               <a:ext uri="{FF2B5EF4-FFF2-40B4-BE49-F238E27FC236}">
-                <a16:creationId xmlns="" xmlns:a16="http://schemas.microsoft.com/office/drawing/2014/main" id="{A7A36224-E603-43E7-97B3-9EB2686C2E7D}"/>
+                <a16:creationId xmlns:a16="http://schemas.microsoft.com/office/drawing/2014/main" xmlns="" id="{A7A36224-E603-43E7-97B3-9EB2686C2E7D}"/>
               </a:ext>
             </a:extLst>
           </p:cNvPr>
@@ -17986,7 +17982,7 @@
           <p:cNvPr id="18" name="TextBox 17">
             <a:extLst>
               <a:ext uri="{FF2B5EF4-FFF2-40B4-BE49-F238E27FC236}">
-                <a16:creationId xmlns="" xmlns:a16="http://schemas.microsoft.com/office/drawing/2014/main" id="{995B05FB-CEC6-47FF-848F-89598693900D}"/>
+                <a16:creationId xmlns:a16="http://schemas.microsoft.com/office/drawing/2014/main" xmlns="" id="{995B05FB-CEC6-47FF-848F-89598693900D}"/>
               </a:ext>
             </a:extLst>
           </p:cNvPr>
@@ -18105,7 +18101,7 @@
           <p:cNvPr id="19" name="TextBox 18">
             <a:extLst>
               <a:ext uri="{FF2B5EF4-FFF2-40B4-BE49-F238E27FC236}">
-                <a16:creationId xmlns="" xmlns:a16="http://schemas.microsoft.com/office/drawing/2014/main" id="{3E306993-1696-403B-9159-E53FBB234EFB}"/>
+                <a16:creationId xmlns:a16="http://schemas.microsoft.com/office/drawing/2014/main" xmlns="" id="{3E306993-1696-403B-9159-E53FBB234EFB}"/>
               </a:ext>
             </a:extLst>
           </p:cNvPr>
@@ -18166,7 +18162,7 @@
           <p:cNvPr id="20" name="TextBox 19">
             <a:extLst>
               <a:ext uri="{FF2B5EF4-FFF2-40B4-BE49-F238E27FC236}">
-                <a16:creationId xmlns="" xmlns:a16="http://schemas.microsoft.com/office/drawing/2014/main" id="{89631D48-DBC3-43F5-B051-5E11C6FC12CE}"/>
+                <a16:creationId xmlns:a16="http://schemas.microsoft.com/office/drawing/2014/main" xmlns="" id="{89631D48-DBC3-43F5-B051-5E11C6FC12CE}"/>
               </a:ext>
             </a:extLst>
           </p:cNvPr>
@@ -18227,7 +18223,7 @@
           <p:cNvPr id="21" name="Freeform: Shape 20">
             <a:extLst>
               <a:ext uri="{FF2B5EF4-FFF2-40B4-BE49-F238E27FC236}">
-                <a16:creationId xmlns="" xmlns:a16="http://schemas.microsoft.com/office/drawing/2014/main" id="{AC908714-12E7-4AE5-A2E1-E2F999159A86}"/>
+                <a16:creationId xmlns:a16="http://schemas.microsoft.com/office/drawing/2014/main" xmlns="" id="{AC908714-12E7-4AE5-A2E1-E2F999159A86}"/>
               </a:ext>
             </a:extLst>
           </p:cNvPr>
@@ -18373,7 +18369,7 @@
           <p:cNvPr id="22" name="Picture 21">
             <a:extLst>
               <a:ext uri="{FF2B5EF4-FFF2-40B4-BE49-F238E27FC236}">
-                <a16:creationId xmlns="" xmlns:a16="http://schemas.microsoft.com/office/drawing/2014/main" id="{7F3A833E-386C-4E6D-8C2C-C55C32FDCD5A}"/>
+                <a16:creationId xmlns:a16="http://schemas.microsoft.com/office/drawing/2014/main" xmlns="" id="{7F3A833E-386C-4E6D-8C2C-C55C32FDCD5A}"/>
               </a:ext>
             </a:extLst>
           </p:cNvPr>
@@ -18411,7 +18407,7 @@
           <p:cNvPr id="24" name="TextBox 23">
             <a:extLst>
               <a:ext uri="{FF2B5EF4-FFF2-40B4-BE49-F238E27FC236}">
-                <a16:creationId xmlns="" xmlns:a16="http://schemas.microsoft.com/office/drawing/2014/main" id="{7DFB7CB5-BEF5-4590-9060-ECAD96362745}"/>
+                <a16:creationId xmlns:a16="http://schemas.microsoft.com/office/drawing/2014/main" xmlns="" id="{7DFB7CB5-BEF5-4590-9060-ECAD96362745}"/>
               </a:ext>
             </a:extLst>
           </p:cNvPr>
@@ -18472,7 +18468,7 @@
           <p:cNvPr id="25" name="TextBox 24">
             <a:extLst>
               <a:ext uri="{FF2B5EF4-FFF2-40B4-BE49-F238E27FC236}">
-                <a16:creationId xmlns="" xmlns:a16="http://schemas.microsoft.com/office/drawing/2014/main" id="{667C970F-CF4E-409E-903C-C956C71C653D}"/>
+                <a16:creationId xmlns:a16="http://schemas.microsoft.com/office/drawing/2014/main" xmlns="" id="{667C970F-CF4E-409E-903C-C956C71C653D}"/>
               </a:ext>
             </a:extLst>
           </p:cNvPr>
@@ -18615,7 +18611,7 @@
           <p:cNvPr id="2" name="Title 1">
             <a:extLst>
               <a:ext uri="{FF2B5EF4-FFF2-40B4-BE49-F238E27FC236}">
-                <a16:creationId xmlns="" xmlns:a16="http://schemas.microsoft.com/office/drawing/2014/main" id="{F629ED5D-E185-40C1-8B04-97DEF47FB941}"/>
+                <a16:creationId xmlns:a16="http://schemas.microsoft.com/office/drawing/2014/main" xmlns="" id="{F629ED5D-E185-40C1-8B04-97DEF47FB941}"/>
               </a:ext>
             </a:extLst>
           </p:cNvPr>
@@ -18649,7 +18645,7 @@
           <p:cNvPr id="3" name="Picture 2">
             <a:extLst>
               <a:ext uri="{FF2B5EF4-FFF2-40B4-BE49-F238E27FC236}">
-                <a16:creationId xmlns="" xmlns:a16="http://schemas.microsoft.com/office/drawing/2014/main" id="{2A272A40-3DA5-4579-964C-52ED62D0B579}"/>
+                <a16:creationId xmlns:a16="http://schemas.microsoft.com/office/drawing/2014/main" xmlns="" id="{2A272A40-3DA5-4579-964C-52ED62D0B579}"/>
               </a:ext>
             </a:extLst>
           </p:cNvPr>
@@ -18687,7 +18683,7 @@
           <p:cNvPr id="4" name="Picture 3">
             <a:extLst>
               <a:ext uri="{FF2B5EF4-FFF2-40B4-BE49-F238E27FC236}">
-                <a16:creationId xmlns="" xmlns:a16="http://schemas.microsoft.com/office/drawing/2014/main" id="{AD6D72E2-0A06-42B8-96A9-917F392589A7}"/>
+                <a16:creationId xmlns:a16="http://schemas.microsoft.com/office/drawing/2014/main" xmlns="" id="{AD6D72E2-0A06-42B8-96A9-917F392589A7}"/>
               </a:ext>
             </a:extLst>
           </p:cNvPr>
@@ -18725,7 +18721,7 @@
           <p:cNvPr id="5" name="Picture 4">
             <a:extLst>
               <a:ext uri="{FF2B5EF4-FFF2-40B4-BE49-F238E27FC236}">
-                <a16:creationId xmlns="" xmlns:a16="http://schemas.microsoft.com/office/drawing/2014/main" id="{1E2F9F30-02B5-435A-91E3-C521A9701598}"/>
+                <a16:creationId xmlns:a16="http://schemas.microsoft.com/office/drawing/2014/main" xmlns="" id="{1E2F9F30-02B5-435A-91E3-C521A9701598}"/>
               </a:ext>
             </a:extLst>
           </p:cNvPr>
@@ -18763,7 +18759,7 @@
           <p:cNvPr id="6" name="Picture 5">
             <a:extLst>
               <a:ext uri="{FF2B5EF4-FFF2-40B4-BE49-F238E27FC236}">
-                <a16:creationId xmlns="" xmlns:a16="http://schemas.microsoft.com/office/drawing/2014/main" id="{6C86F9E1-0821-48F0-8FE2-73EEE7882EC1}"/>
+                <a16:creationId xmlns:a16="http://schemas.microsoft.com/office/drawing/2014/main" xmlns="" id="{6C86F9E1-0821-48F0-8FE2-73EEE7882EC1}"/>
               </a:ext>
             </a:extLst>
           </p:cNvPr>
@@ -18801,7 +18797,7 @@
           <p:cNvPr id="7" name="Picture 6">
             <a:extLst>
               <a:ext uri="{FF2B5EF4-FFF2-40B4-BE49-F238E27FC236}">
-                <a16:creationId xmlns="" xmlns:a16="http://schemas.microsoft.com/office/drawing/2014/main" id="{14DD1D71-7A6E-44A8-B5B9-271854B1AF0C}"/>
+                <a16:creationId xmlns:a16="http://schemas.microsoft.com/office/drawing/2014/main" xmlns="" id="{14DD1D71-7A6E-44A8-B5B9-271854B1AF0C}"/>
               </a:ext>
             </a:extLst>
           </p:cNvPr>
@@ -18839,7 +18835,7 @@
           <p:cNvPr id="8" name="Picture 7">
             <a:extLst>
               <a:ext uri="{FF2B5EF4-FFF2-40B4-BE49-F238E27FC236}">
-                <a16:creationId xmlns="" xmlns:a16="http://schemas.microsoft.com/office/drawing/2014/main" id="{AA8A7E31-8442-4E4E-94EB-30CB88FB92DD}"/>
+                <a16:creationId xmlns:a16="http://schemas.microsoft.com/office/drawing/2014/main" xmlns="" id="{AA8A7E31-8442-4E4E-94EB-30CB88FB92DD}"/>
               </a:ext>
             </a:extLst>
           </p:cNvPr>
@@ -18877,7 +18873,7 @@
           <p:cNvPr id="9" name="Picture 8">
             <a:extLst>
               <a:ext uri="{FF2B5EF4-FFF2-40B4-BE49-F238E27FC236}">
-                <a16:creationId xmlns="" xmlns:a16="http://schemas.microsoft.com/office/drawing/2014/main" id="{404FFD67-4317-4485-B379-6EFF070B2583}"/>
+                <a16:creationId xmlns:a16="http://schemas.microsoft.com/office/drawing/2014/main" xmlns="" id="{404FFD67-4317-4485-B379-6EFF070B2583}"/>
               </a:ext>
             </a:extLst>
           </p:cNvPr>
@@ -18915,7 +18911,7 @@
           <p:cNvPr id="10" name="Freeform: Shape 9">
             <a:extLst>
               <a:ext uri="{FF2B5EF4-FFF2-40B4-BE49-F238E27FC236}">
-                <a16:creationId xmlns="" xmlns:a16="http://schemas.microsoft.com/office/drawing/2014/main" id="{331A4B3C-60CD-46E6-84BD-6009852C1851}"/>
+                <a16:creationId xmlns:a16="http://schemas.microsoft.com/office/drawing/2014/main" xmlns="" id="{331A4B3C-60CD-46E6-84BD-6009852C1851}"/>
               </a:ext>
             </a:extLst>
           </p:cNvPr>
@@ -19051,7 +19047,7 @@
           <p:cNvPr id="11" name="Freeform: Shape 10">
             <a:extLst>
               <a:ext uri="{FF2B5EF4-FFF2-40B4-BE49-F238E27FC236}">
-                <a16:creationId xmlns="" xmlns:a16="http://schemas.microsoft.com/office/drawing/2014/main" id="{2A3A1582-1B4A-4B74-B2D5-130D65EE9494}"/>
+                <a16:creationId xmlns:a16="http://schemas.microsoft.com/office/drawing/2014/main" xmlns="" id="{2A3A1582-1B4A-4B74-B2D5-130D65EE9494}"/>
               </a:ext>
             </a:extLst>
           </p:cNvPr>
@@ -19187,7 +19183,7 @@
           <p:cNvPr id="12" name="Freeform: Shape 11">
             <a:extLst>
               <a:ext uri="{FF2B5EF4-FFF2-40B4-BE49-F238E27FC236}">
-                <a16:creationId xmlns="" xmlns:a16="http://schemas.microsoft.com/office/drawing/2014/main" id="{A24D4327-A034-4814-BC1F-B20E5206B590}"/>
+                <a16:creationId xmlns:a16="http://schemas.microsoft.com/office/drawing/2014/main" xmlns="" id="{A24D4327-A034-4814-BC1F-B20E5206B590}"/>
               </a:ext>
             </a:extLst>
           </p:cNvPr>
@@ -19323,7 +19319,7 @@
           <p:cNvPr id="13" name="Freeform: Shape 12">
             <a:extLst>
               <a:ext uri="{FF2B5EF4-FFF2-40B4-BE49-F238E27FC236}">
-                <a16:creationId xmlns="" xmlns:a16="http://schemas.microsoft.com/office/drawing/2014/main" id="{6E5BAECF-8F04-4615-A3FC-A2A9F7418220}"/>
+                <a16:creationId xmlns:a16="http://schemas.microsoft.com/office/drawing/2014/main" xmlns="" id="{6E5BAECF-8F04-4615-A3FC-A2A9F7418220}"/>
               </a:ext>
             </a:extLst>
           </p:cNvPr>
@@ -19459,7 +19455,7 @@
           <p:cNvPr id="14" name="Freeform: Shape 13">
             <a:extLst>
               <a:ext uri="{FF2B5EF4-FFF2-40B4-BE49-F238E27FC236}">
-                <a16:creationId xmlns="" xmlns:a16="http://schemas.microsoft.com/office/drawing/2014/main" id="{A45BB223-0844-42CD-B249-8D20C9DE1BE6}"/>
+                <a16:creationId xmlns:a16="http://schemas.microsoft.com/office/drawing/2014/main" xmlns="" id="{A45BB223-0844-42CD-B249-8D20C9DE1BE6}"/>
               </a:ext>
             </a:extLst>
           </p:cNvPr>
@@ -19595,7 +19591,7 @@
           <p:cNvPr id="15" name="Freeform: Shape 14">
             <a:extLst>
               <a:ext uri="{FF2B5EF4-FFF2-40B4-BE49-F238E27FC236}">
-                <a16:creationId xmlns="" xmlns:a16="http://schemas.microsoft.com/office/drawing/2014/main" id="{C5241B31-A95A-4B3B-9727-1AAF8B86C925}"/>
+                <a16:creationId xmlns:a16="http://schemas.microsoft.com/office/drawing/2014/main" xmlns="" id="{C5241B31-A95A-4B3B-9727-1AAF8B86C925}"/>
               </a:ext>
             </a:extLst>
           </p:cNvPr>
@@ -19731,7 +19727,7 @@
           <p:cNvPr id="16" name="TextBox 15">
             <a:extLst>
               <a:ext uri="{FF2B5EF4-FFF2-40B4-BE49-F238E27FC236}">
-                <a16:creationId xmlns="" xmlns:a16="http://schemas.microsoft.com/office/drawing/2014/main" id="{D4EC7696-C68C-483C-84D6-71251D9747CC}"/>
+                <a16:creationId xmlns:a16="http://schemas.microsoft.com/office/drawing/2014/main" xmlns="" id="{D4EC7696-C68C-483C-84D6-71251D9747CC}"/>
               </a:ext>
             </a:extLst>
           </p:cNvPr>
@@ -19821,7 +19817,7 @@
           <p:cNvPr id="17" name="TextBox 16">
             <a:extLst>
               <a:ext uri="{FF2B5EF4-FFF2-40B4-BE49-F238E27FC236}">
-                <a16:creationId xmlns="" xmlns:a16="http://schemas.microsoft.com/office/drawing/2014/main" id="{4541A9EE-A3D1-4F33-9A0B-20CCB9E25AFB}"/>
+                <a16:creationId xmlns:a16="http://schemas.microsoft.com/office/drawing/2014/main" xmlns="" id="{4541A9EE-A3D1-4F33-9A0B-20CCB9E25AFB}"/>
               </a:ext>
             </a:extLst>
           </p:cNvPr>
@@ -19936,7 +19932,7 @@
           <p:cNvPr id="18" name="TextBox 17">
             <a:extLst>
               <a:ext uri="{FF2B5EF4-FFF2-40B4-BE49-F238E27FC236}">
-                <a16:creationId xmlns="" xmlns:a16="http://schemas.microsoft.com/office/drawing/2014/main" id="{CCC70299-4794-4F68-9803-1DD1107BE88F}"/>
+                <a16:creationId xmlns:a16="http://schemas.microsoft.com/office/drawing/2014/main" xmlns="" id="{CCC70299-4794-4F68-9803-1DD1107BE88F}"/>
               </a:ext>
             </a:extLst>
           </p:cNvPr>
@@ -20034,7 +20030,7 @@
           <p:cNvPr id="19" name="TextBox 18">
             <a:extLst>
               <a:ext uri="{FF2B5EF4-FFF2-40B4-BE49-F238E27FC236}">
-                <a16:creationId xmlns="" xmlns:a16="http://schemas.microsoft.com/office/drawing/2014/main" id="{A58CC8A5-6FBA-4BD9-BAD5-CA5868BB2B87}"/>
+                <a16:creationId xmlns:a16="http://schemas.microsoft.com/office/drawing/2014/main" xmlns="" id="{A58CC8A5-6FBA-4BD9-BAD5-CA5868BB2B87}"/>
               </a:ext>
             </a:extLst>
           </p:cNvPr>
@@ -20153,7 +20149,7 @@
           <p:cNvPr id="20" name="TextBox 19">
             <a:extLst>
               <a:ext uri="{FF2B5EF4-FFF2-40B4-BE49-F238E27FC236}">
-                <a16:creationId xmlns="" xmlns:a16="http://schemas.microsoft.com/office/drawing/2014/main" id="{19B8FCED-F5FD-4BB1-9937-D026F7F33A5E}"/>
+                <a16:creationId xmlns:a16="http://schemas.microsoft.com/office/drawing/2014/main" xmlns="" id="{19B8FCED-F5FD-4BB1-9937-D026F7F33A5E}"/>
               </a:ext>
             </a:extLst>
           </p:cNvPr>
@@ -20243,7 +20239,7 @@
           <p:cNvPr id="21" name="TextBox 20">
             <a:extLst>
               <a:ext uri="{FF2B5EF4-FFF2-40B4-BE49-F238E27FC236}">
-                <a16:creationId xmlns="" xmlns:a16="http://schemas.microsoft.com/office/drawing/2014/main" id="{2CDD70E5-6229-4669-8EA6-75FC3CC1F9A1}"/>
+                <a16:creationId xmlns:a16="http://schemas.microsoft.com/office/drawing/2014/main" xmlns="" id="{2CDD70E5-6229-4669-8EA6-75FC3CC1F9A1}"/>
               </a:ext>
             </a:extLst>
           </p:cNvPr>
@@ -20333,7 +20329,7 @@
           <p:cNvPr id="22" name="TextBox 21">
             <a:extLst>
               <a:ext uri="{FF2B5EF4-FFF2-40B4-BE49-F238E27FC236}">
-                <a16:creationId xmlns="" xmlns:a16="http://schemas.microsoft.com/office/drawing/2014/main" id="{8C58EF38-2316-4A9F-97BA-EAFA44C2B223}"/>
+                <a16:creationId xmlns:a16="http://schemas.microsoft.com/office/drawing/2014/main" xmlns="" id="{8C58EF38-2316-4A9F-97BA-EAFA44C2B223}"/>
               </a:ext>
             </a:extLst>
           </p:cNvPr>
@@ -20394,7 +20390,7 @@
           <p:cNvPr id="23" name="Picture 22">
             <a:extLst>
               <a:ext uri="{FF2B5EF4-FFF2-40B4-BE49-F238E27FC236}">
-                <a16:creationId xmlns="" xmlns:a16="http://schemas.microsoft.com/office/drawing/2014/main" id="{DC74D50F-7F5E-4983-A54A-EDA2A647E1E4}"/>
+                <a16:creationId xmlns:a16="http://schemas.microsoft.com/office/drawing/2014/main" xmlns="" id="{DC74D50F-7F5E-4983-A54A-EDA2A647E1E4}"/>
               </a:ext>
             </a:extLst>
           </p:cNvPr>
@@ -20432,7 +20428,7 @@
           <p:cNvPr id="24" name="Freeform: Shape 23">
             <a:extLst>
               <a:ext uri="{FF2B5EF4-FFF2-40B4-BE49-F238E27FC236}">
-                <a16:creationId xmlns="" xmlns:a16="http://schemas.microsoft.com/office/drawing/2014/main" id="{7CB58DFF-3948-4B59-9989-1D2EFB75D986}"/>
+                <a16:creationId xmlns:a16="http://schemas.microsoft.com/office/drawing/2014/main" xmlns="" id="{7CB58DFF-3948-4B59-9989-1D2EFB75D986}"/>
               </a:ext>
             </a:extLst>
           </p:cNvPr>
@@ -20567,7 +20563,7 @@
           <p:cNvPr id="25" name="TextBox 24">
             <a:extLst>
               <a:ext uri="{FF2B5EF4-FFF2-40B4-BE49-F238E27FC236}">
-                <a16:creationId xmlns="" xmlns:a16="http://schemas.microsoft.com/office/drawing/2014/main" id="{F5E9A689-634C-42BC-8D18-BB508481D913}"/>
+                <a16:creationId xmlns:a16="http://schemas.microsoft.com/office/drawing/2014/main" xmlns="" id="{F5E9A689-634C-42BC-8D18-BB508481D913}"/>
               </a:ext>
             </a:extLst>
           </p:cNvPr>
@@ -20711,7 +20707,7 @@
           <p:cNvPr id="2" name="Title 1">
             <a:extLst>
               <a:ext uri="{FF2B5EF4-FFF2-40B4-BE49-F238E27FC236}">
-                <a16:creationId xmlns="" xmlns:a16="http://schemas.microsoft.com/office/drawing/2014/main" id="{56FE19BE-02A6-4DA5-A155-961AB48D7737}"/>
+                <a16:creationId xmlns:a16="http://schemas.microsoft.com/office/drawing/2014/main" xmlns="" id="{56FE19BE-02A6-4DA5-A155-961AB48D7737}"/>
               </a:ext>
             </a:extLst>
           </p:cNvPr>
@@ -20745,7 +20741,7 @@
           <p:cNvPr id="3" name="Subtitle 2">
             <a:extLst>
               <a:ext uri="{FF2B5EF4-FFF2-40B4-BE49-F238E27FC236}">
-                <a16:creationId xmlns="" xmlns:a16="http://schemas.microsoft.com/office/drawing/2014/main" id="{326F0998-17DD-4145-9D6E-A0912D430112}"/>
+                <a16:creationId xmlns:a16="http://schemas.microsoft.com/office/drawing/2014/main" xmlns="" id="{326F0998-17DD-4145-9D6E-A0912D430112}"/>
               </a:ext>
             </a:extLst>
           </p:cNvPr>
@@ -21319,7 +21315,7 @@
           <p:cNvPr id="2" name="Title 1">
             <a:extLst>
               <a:ext uri="{FF2B5EF4-FFF2-40B4-BE49-F238E27FC236}">
-                <a16:creationId xmlns="" xmlns:a16="http://schemas.microsoft.com/office/drawing/2014/main" id="{60D2B032-81DA-4F89-A5D6-4E3805567E43}"/>
+                <a16:creationId xmlns:a16="http://schemas.microsoft.com/office/drawing/2014/main" xmlns="" id="{60D2B032-81DA-4F89-A5D6-4E3805567E43}"/>
               </a:ext>
             </a:extLst>
           </p:cNvPr>
@@ -21353,7 +21349,7 @@
           <p:cNvPr id="3" name="Subtitle 2">
             <a:extLst>
               <a:ext uri="{FF2B5EF4-FFF2-40B4-BE49-F238E27FC236}">
-                <a16:creationId xmlns="" xmlns:a16="http://schemas.microsoft.com/office/drawing/2014/main" id="{70984409-32A6-4614-B370-2C4E4BDD75F7}"/>
+                <a16:creationId xmlns:a16="http://schemas.microsoft.com/office/drawing/2014/main" xmlns="" id="{70984409-32A6-4614-B370-2C4E4BDD75F7}"/>
               </a:ext>
             </a:extLst>
           </p:cNvPr>
@@ -21972,7 +21968,7 @@
           <p:cNvPr id="3" name="Subtitle 2">
             <a:extLst>
               <a:ext uri="{FF2B5EF4-FFF2-40B4-BE49-F238E27FC236}">
-                <a16:creationId xmlns="" xmlns:a16="http://schemas.microsoft.com/office/drawing/2014/main" id="{383EC5EF-217E-4D46-B55F-8949FDA75B87}"/>
+                <a16:creationId xmlns:a16="http://schemas.microsoft.com/office/drawing/2014/main" xmlns="" id="{383EC5EF-217E-4D46-B55F-8949FDA75B87}"/>
               </a:ext>
             </a:extLst>
           </p:cNvPr>
@@ -22390,7 +22386,7 @@
           <p:cNvPr id="2" name="Title 1">
             <a:extLst>
               <a:ext uri="{FF2B5EF4-FFF2-40B4-BE49-F238E27FC236}">
-                <a16:creationId xmlns="" xmlns:a16="http://schemas.microsoft.com/office/drawing/2014/main" id="{B470D714-F857-4376-9E8E-4959742496BC}"/>
+                <a16:creationId xmlns:a16="http://schemas.microsoft.com/office/drawing/2014/main" xmlns="" id="{B470D714-F857-4376-9E8E-4959742496BC}"/>
               </a:ext>
             </a:extLst>
           </p:cNvPr>
@@ -22424,7 +22420,7 @@
           <p:cNvPr id="3" name="Text Placeholder 2">
             <a:extLst>
               <a:ext uri="{FF2B5EF4-FFF2-40B4-BE49-F238E27FC236}">
-                <a16:creationId xmlns="" xmlns:a16="http://schemas.microsoft.com/office/drawing/2014/main" id="{4B4523A1-9070-43BD-B99D-C7768F374C3A}"/>
+                <a16:creationId xmlns:a16="http://schemas.microsoft.com/office/drawing/2014/main" xmlns="" id="{4B4523A1-9070-43BD-B99D-C7768F374C3A}"/>
               </a:ext>
             </a:extLst>
           </p:cNvPr>

</xml_diff>